<commit_message>
Adding slides, adding factory method to PredicateMatcher, assuming Predicates respond to toString() sensibly, and as though they could be a SAM type.
</commit_message>
<xml_diff>
--- a/bending-junit.pptx
+++ b/bending-junit.pptx
@@ -4,8 +4,20 @@
   <p:sldMasterIdLst>
     <p:sldMasterId id="2147483660" r:id="rId1"/>
   </p:sldMasterIdLst>
+  <p:notesMasterIdLst>
+    <p:notesMasterId r:id="rId12"/>
+  </p:notesMasterIdLst>
   <p:sldIdLst>
     <p:sldId id="256" r:id="rId2"/>
+    <p:sldId id="257" r:id="rId3"/>
+    <p:sldId id="258" r:id="rId4"/>
+    <p:sldId id="259" r:id="rId5"/>
+    <p:sldId id="260" r:id="rId6"/>
+    <p:sldId id="261" r:id="rId7"/>
+    <p:sldId id="262" r:id="rId8"/>
+    <p:sldId id="263" r:id="rId9"/>
+    <p:sldId id="264" r:id="rId10"/>
+    <p:sldId id="265" r:id="rId11"/>
   </p:sldIdLst>
   <p:sldSz cx="9144000" cy="6858000" type="screen4x3"/>
   <p:notesSz cx="6858000" cy="9144000"/>
@@ -107,6 +119,1092 @@
 </p:presentation>
 </file>
 
+<file path=ppt/notesMasters/notesMaster1.xml><?xml version="1.0" encoding="utf-8"?>
+<p:notesMaster xmlns:a="http://schemas.openxmlformats.org/drawingml/2006/main" xmlns:r="http://schemas.openxmlformats.org/officeDocument/2006/relationships" xmlns:p="http://schemas.openxmlformats.org/presentationml/2006/main">
+  <p:cSld>
+    <p:bg>
+      <p:bgRef idx="1001">
+        <a:schemeClr val="bg1"/>
+      </p:bgRef>
+    </p:bg>
+    <p:spTree>
+      <p:nvGrpSpPr>
+        <p:cNvPr id="1" name=""/>
+        <p:cNvGrpSpPr/>
+        <p:nvPr/>
+      </p:nvGrpSpPr>
+      <p:grpSpPr>
+        <a:xfrm>
+          <a:off x="0" y="0"/>
+          <a:ext cx="0" cy="0"/>
+          <a:chOff x="0" y="0"/>
+          <a:chExt cx="0" cy="0"/>
+        </a:xfrm>
+      </p:grpSpPr>
+      <p:sp>
+        <p:nvSpPr>
+          <p:cNvPr id="2" name="Header Placeholder 1"/>
+          <p:cNvSpPr>
+            <a:spLocks noGrp="1"/>
+          </p:cNvSpPr>
+          <p:nvPr>
+            <p:ph type="hdr" sz="quarter"/>
+          </p:nvPr>
+        </p:nvSpPr>
+        <p:spPr>
+          <a:xfrm>
+            <a:off x="0" y="0"/>
+            <a:ext cx="2971800" cy="457200"/>
+          </a:xfrm>
+          <a:prstGeom prst="rect">
+            <a:avLst/>
+          </a:prstGeom>
+        </p:spPr>
+        <p:txBody>
+          <a:bodyPr vert="horz" lIns="91440" tIns="45720" rIns="91440" bIns="45720" rtlCol="0"/>
+          <a:lstStyle>
+            <a:lvl1pPr algn="l">
+              <a:defRPr sz="1200"/>
+            </a:lvl1pPr>
+          </a:lstStyle>
+          <a:p>
+            <a:endParaRPr lang="en-US" dirty="0"/>
+          </a:p>
+        </p:txBody>
+      </p:sp>
+      <p:sp>
+        <p:nvSpPr>
+          <p:cNvPr id="3" name="Date Placeholder 2"/>
+          <p:cNvSpPr>
+            <a:spLocks noGrp="1"/>
+          </p:cNvSpPr>
+          <p:nvPr>
+            <p:ph type="dt" idx="1"/>
+          </p:nvPr>
+        </p:nvSpPr>
+        <p:spPr>
+          <a:xfrm>
+            <a:off x="3884613" y="0"/>
+            <a:ext cx="2971800" cy="457200"/>
+          </a:xfrm>
+          <a:prstGeom prst="rect">
+            <a:avLst/>
+          </a:prstGeom>
+        </p:spPr>
+        <p:txBody>
+          <a:bodyPr vert="horz" lIns="91440" tIns="45720" rIns="91440" bIns="45720" rtlCol="0"/>
+          <a:lstStyle>
+            <a:lvl1pPr algn="r">
+              <a:defRPr sz="1200"/>
+            </a:lvl1pPr>
+          </a:lstStyle>
+          <a:p>
+            <a:fld id="{05AE286E-9F28-6741-8610-9BEE110680A5}" type="datetimeFigureOut">
+              <a:rPr lang="en-US" smtClean="0"/>
+              <a:t>10/4/11</a:t>
+            </a:fld>
+            <a:endParaRPr lang="en-US" dirty="0"/>
+          </a:p>
+        </p:txBody>
+      </p:sp>
+      <p:sp>
+        <p:nvSpPr>
+          <p:cNvPr id="4" name="Slide Image Placeholder 3"/>
+          <p:cNvSpPr>
+            <a:spLocks noGrp="1" noRot="1" noChangeAspect="1"/>
+          </p:cNvSpPr>
+          <p:nvPr>
+            <p:ph type="sldImg" idx="2"/>
+          </p:nvPr>
+        </p:nvSpPr>
+        <p:spPr>
+          <a:xfrm>
+            <a:off x="1143000" y="685800"/>
+            <a:ext cx="4572000" cy="3429000"/>
+          </a:xfrm>
+          <a:prstGeom prst="rect">
+            <a:avLst/>
+          </a:prstGeom>
+          <a:noFill/>
+          <a:ln w="12700">
+            <a:solidFill>
+              <a:prstClr val="black"/>
+            </a:solidFill>
+          </a:ln>
+        </p:spPr>
+        <p:txBody>
+          <a:bodyPr vert="horz" lIns="91440" tIns="45720" rIns="91440" bIns="45720" rtlCol="0" anchor="ctr"/>
+          <a:lstStyle/>
+          <a:p>
+            <a:endParaRPr lang="en-US" dirty="0"/>
+          </a:p>
+        </p:txBody>
+      </p:sp>
+      <p:sp>
+        <p:nvSpPr>
+          <p:cNvPr id="5" name="Notes Placeholder 4"/>
+          <p:cNvSpPr>
+            <a:spLocks noGrp="1"/>
+          </p:cNvSpPr>
+          <p:nvPr>
+            <p:ph type="body" sz="quarter" idx="3"/>
+          </p:nvPr>
+        </p:nvSpPr>
+        <p:spPr>
+          <a:xfrm>
+            <a:off x="685800" y="4343400"/>
+            <a:ext cx="5486400" cy="4114800"/>
+          </a:xfrm>
+          <a:prstGeom prst="rect">
+            <a:avLst/>
+          </a:prstGeom>
+        </p:spPr>
+        <p:txBody>
+          <a:bodyPr vert="horz" lIns="91440" tIns="45720" rIns="91440" bIns="45720" rtlCol="0"/>
+          <a:lstStyle/>
+          <a:p>
+            <a:pPr lvl="0"/>
+            <a:r>
+              <a:rPr lang="en-US" smtClean="0"/>
+              <a:t>Click to edit Master text styles</a:t>
+            </a:r>
+          </a:p>
+          <a:p>
+            <a:pPr lvl="1"/>
+            <a:r>
+              <a:rPr lang="en-US" smtClean="0"/>
+              <a:t>Second level</a:t>
+            </a:r>
+          </a:p>
+          <a:p>
+            <a:pPr lvl="2"/>
+            <a:r>
+              <a:rPr lang="en-US" smtClean="0"/>
+              <a:t>Third level</a:t>
+            </a:r>
+          </a:p>
+          <a:p>
+            <a:pPr lvl="3"/>
+            <a:r>
+              <a:rPr lang="en-US" smtClean="0"/>
+              <a:t>Fourth level</a:t>
+            </a:r>
+          </a:p>
+          <a:p>
+            <a:pPr lvl="4"/>
+            <a:r>
+              <a:rPr lang="en-US" smtClean="0"/>
+              <a:t>Fifth level</a:t>
+            </a:r>
+            <a:endParaRPr lang="en-US"/>
+          </a:p>
+        </p:txBody>
+      </p:sp>
+      <p:sp>
+        <p:nvSpPr>
+          <p:cNvPr id="6" name="Footer Placeholder 5"/>
+          <p:cNvSpPr>
+            <a:spLocks noGrp="1"/>
+          </p:cNvSpPr>
+          <p:nvPr>
+            <p:ph type="ftr" sz="quarter" idx="4"/>
+          </p:nvPr>
+        </p:nvSpPr>
+        <p:spPr>
+          <a:xfrm>
+            <a:off x="0" y="8685213"/>
+            <a:ext cx="2971800" cy="457200"/>
+          </a:xfrm>
+          <a:prstGeom prst="rect">
+            <a:avLst/>
+          </a:prstGeom>
+        </p:spPr>
+        <p:txBody>
+          <a:bodyPr vert="horz" lIns="91440" tIns="45720" rIns="91440" bIns="45720" rtlCol="0" anchor="b"/>
+          <a:lstStyle>
+            <a:lvl1pPr algn="l">
+              <a:defRPr sz="1200"/>
+            </a:lvl1pPr>
+          </a:lstStyle>
+          <a:p>
+            <a:endParaRPr lang="en-US" dirty="0"/>
+          </a:p>
+        </p:txBody>
+      </p:sp>
+      <p:sp>
+        <p:nvSpPr>
+          <p:cNvPr id="7" name="Slide Number Placeholder 6"/>
+          <p:cNvSpPr>
+            <a:spLocks noGrp="1"/>
+          </p:cNvSpPr>
+          <p:nvPr>
+            <p:ph type="sldNum" sz="quarter" idx="5"/>
+          </p:nvPr>
+        </p:nvSpPr>
+        <p:spPr>
+          <a:xfrm>
+            <a:off x="3884613" y="8685213"/>
+            <a:ext cx="2971800" cy="457200"/>
+          </a:xfrm>
+          <a:prstGeom prst="rect">
+            <a:avLst/>
+          </a:prstGeom>
+        </p:spPr>
+        <p:txBody>
+          <a:bodyPr vert="horz" lIns="91440" tIns="45720" rIns="91440" bIns="45720" rtlCol="0" anchor="b"/>
+          <a:lstStyle>
+            <a:lvl1pPr algn="r">
+              <a:defRPr sz="1200"/>
+            </a:lvl1pPr>
+          </a:lstStyle>
+          <a:p>
+            <a:fld id="{A2044996-AC82-E94F-8AB5-A0DF814C394B}" type="slidenum">
+              <a:rPr lang="en-US" smtClean="0"/>
+              <a:t>‹#›</a:t>
+            </a:fld>
+            <a:endParaRPr lang="en-US" dirty="0"/>
+          </a:p>
+        </p:txBody>
+      </p:sp>
+    </p:spTree>
+    <p:extLst>
+      <p:ext uri="{BB962C8B-B14F-4D97-AF65-F5344CB8AC3E}">
+        <p14:creationId xmlns:p14="http://schemas.microsoft.com/office/powerpoint/2010/main" val="1357473145"/>
+      </p:ext>
+    </p:extLst>
+  </p:cSld>
+  <p:clrMap bg1="lt1" tx1="dk1" bg2="lt2" tx2="dk2" accent1="accent1" accent2="accent2" accent3="accent3" accent4="accent4" accent5="accent5" accent6="accent6" hlink="hlink" folHlink="folHlink"/>
+  <p:notesStyle>
+    <a:lvl1pPr marL="0" algn="l" defTabSz="457200" rtl="0" eaLnBrk="1" latinLnBrk="0" hangingPunct="1">
+      <a:defRPr sz="1200" kern="1200">
+        <a:solidFill>
+          <a:schemeClr val="tx1"/>
+        </a:solidFill>
+        <a:latin typeface="+mn-lt"/>
+        <a:ea typeface="+mn-ea"/>
+        <a:cs typeface="+mn-cs"/>
+      </a:defRPr>
+    </a:lvl1pPr>
+    <a:lvl2pPr marL="457200" algn="l" defTabSz="457200" rtl="0" eaLnBrk="1" latinLnBrk="0" hangingPunct="1">
+      <a:defRPr sz="1200" kern="1200">
+        <a:solidFill>
+          <a:schemeClr val="tx1"/>
+        </a:solidFill>
+        <a:latin typeface="+mn-lt"/>
+        <a:ea typeface="+mn-ea"/>
+        <a:cs typeface="+mn-cs"/>
+      </a:defRPr>
+    </a:lvl2pPr>
+    <a:lvl3pPr marL="914400" algn="l" defTabSz="457200" rtl="0" eaLnBrk="1" latinLnBrk="0" hangingPunct="1">
+      <a:defRPr sz="1200" kern="1200">
+        <a:solidFill>
+          <a:schemeClr val="tx1"/>
+        </a:solidFill>
+        <a:latin typeface="+mn-lt"/>
+        <a:ea typeface="+mn-ea"/>
+        <a:cs typeface="+mn-cs"/>
+      </a:defRPr>
+    </a:lvl3pPr>
+    <a:lvl4pPr marL="1371600" algn="l" defTabSz="457200" rtl="0" eaLnBrk="1" latinLnBrk="0" hangingPunct="1">
+      <a:defRPr sz="1200" kern="1200">
+        <a:solidFill>
+          <a:schemeClr val="tx1"/>
+        </a:solidFill>
+        <a:latin typeface="+mn-lt"/>
+        <a:ea typeface="+mn-ea"/>
+        <a:cs typeface="+mn-cs"/>
+      </a:defRPr>
+    </a:lvl4pPr>
+    <a:lvl5pPr marL="1828800" algn="l" defTabSz="457200" rtl="0" eaLnBrk="1" latinLnBrk="0" hangingPunct="1">
+      <a:defRPr sz="1200" kern="1200">
+        <a:solidFill>
+          <a:schemeClr val="tx1"/>
+        </a:solidFill>
+        <a:latin typeface="+mn-lt"/>
+        <a:ea typeface="+mn-ea"/>
+        <a:cs typeface="+mn-cs"/>
+      </a:defRPr>
+    </a:lvl5pPr>
+    <a:lvl6pPr marL="2286000" algn="l" defTabSz="457200" rtl="0" eaLnBrk="1" latinLnBrk="0" hangingPunct="1">
+      <a:defRPr sz="1200" kern="1200">
+        <a:solidFill>
+          <a:schemeClr val="tx1"/>
+        </a:solidFill>
+        <a:latin typeface="+mn-lt"/>
+        <a:ea typeface="+mn-ea"/>
+        <a:cs typeface="+mn-cs"/>
+      </a:defRPr>
+    </a:lvl6pPr>
+    <a:lvl7pPr marL="2743200" algn="l" defTabSz="457200" rtl="0" eaLnBrk="1" latinLnBrk="0" hangingPunct="1">
+      <a:defRPr sz="1200" kern="1200">
+        <a:solidFill>
+          <a:schemeClr val="tx1"/>
+        </a:solidFill>
+        <a:latin typeface="+mn-lt"/>
+        <a:ea typeface="+mn-ea"/>
+        <a:cs typeface="+mn-cs"/>
+      </a:defRPr>
+    </a:lvl7pPr>
+    <a:lvl8pPr marL="3200400" algn="l" defTabSz="457200" rtl="0" eaLnBrk="1" latinLnBrk="0" hangingPunct="1">
+      <a:defRPr sz="1200" kern="1200">
+        <a:solidFill>
+          <a:schemeClr val="tx1"/>
+        </a:solidFill>
+        <a:latin typeface="+mn-lt"/>
+        <a:ea typeface="+mn-ea"/>
+        <a:cs typeface="+mn-cs"/>
+      </a:defRPr>
+    </a:lvl8pPr>
+    <a:lvl9pPr marL="3657600" algn="l" defTabSz="457200" rtl="0" eaLnBrk="1" latinLnBrk="0" hangingPunct="1">
+      <a:defRPr sz="1200" kern="1200">
+        <a:solidFill>
+          <a:schemeClr val="tx1"/>
+        </a:solidFill>
+        <a:latin typeface="+mn-lt"/>
+        <a:ea typeface="+mn-ea"/>
+        <a:cs typeface="+mn-cs"/>
+      </a:defRPr>
+    </a:lvl9pPr>
+  </p:notesStyle>
+</p:notesMaster>
+</file>
+
+<file path=ppt/notesSlides/notesSlide1.xml><?xml version="1.0" encoding="utf-8"?>
+<p:notes xmlns:a="http://schemas.openxmlformats.org/drawingml/2006/main" xmlns:r="http://schemas.openxmlformats.org/officeDocument/2006/relationships" xmlns:p="http://schemas.openxmlformats.org/presentationml/2006/main">
+  <p:cSld>
+    <p:spTree>
+      <p:nvGrpSpPr>
+        <p:cNvPr id="1" name=""/>
+        <p:cNvGrpSpPr/>
+        <p:nvPr/>
+      </p:nvGrpSpPr>
+      <p:grpSpPr>
+        <a:xfrm>
+          <a:off x="0" y="0"/>
+          <a:ext cx="0" cy="0"/>
+          <a:chOff x="0" y="0"/>
+          <a:chExt cx="0" cy="0"/>
+        </a:xfrm>
+      </p:grpSpPr>
+      <p:sp>
+        <p:nvSpPr>
+          <p:cNvPr id="2" name="Slide Image Placeholder 1"/>
+          <p:cNvSpPr>
+            <a:spLocks noGrp="1" noRot="1" noChangeAspect="1"/>
+          </p:cNvSpPr>
+          <p:nvPr>
+            <p:ph type="sldImg"/>
+          </p:nvPr>
+        </p:nvSpPr>
+        <p:spPr/>
+      </p:sp>
+      <p:sp>
+        <p:nvSpPr>
+          <p:cNvPr id="3" name="Notes Placeholder 2"/>
+          <p:cNvSpPr>
+            <a:spLocks noGrp="1"/>
+          </p:cNvSpPr>
+          <p:nvPr>
+            <p:ph type="body" idx="1"/>
+          </p:nvPr>
+        </p:nvSpPr>
+        <p:spPr/>
+        <p:txBody>
+          <a:bodyPr/>
+          <a:lstStyle/>
+          <a:p>
+            <a:endParaRPr lang="en-US" dirty="0"/>
+          </a:p>
+        </p:txBody>
+      </p:sp>
+      <p:sp>
+        <p:nvSpPr>
+          <p:cNvPr id="4" name="Slide Number Placeholder 3"/>
+          <p:cNvSpPr>
+            <a:spLocks noGrp="1"/>
+          </p:cNvSpPr>
+          <p:nvPr>
+            <p:ph type="sldNum" sz="quarter" idx="10"/>
+          </p:nvPr>
+        </p:nvSpPr>
+        <p:spPr/>
+        <p:txBody>
+          <a:bodyPr/>
+          <a:lstStyle/>
+          <a:p>
+            <a:fld id="{A2044996-AC82-E94F-8AB5-A0DF814C394B}" type="slidenum">
+              <a:rPr lang="en-US" smtClean="0"/>
+              <a:t>1</a:t>
+            </a:fld>
+            <a:endParaRPr lang="en-US" dirty="0"/>
+          </a:p>
+        </p:txBody>
+      </p:sp>
+    </p:spTree>
+    <p:extLst>
+      <p:ext uri="{BB962C8B-B14F-4D97-AF65-F5344CB8AC3E}">
+        <p14:creationId xmlns:p14="http://schemas.microsoft.com/office/powerpoint/2010/main" val="2022185082"/>
+      </p:ext>
+    </p:extLst>
+  </p:cSld>
+  <p:clrMapOvr>
+    <a:masterClrMapping/>
+  </p:clrMapOvr>
+</p:notes>
+</file>
+
+<file path=ppt/notesSlides/notesSlide2.xml><?xml version="1.0" encoding="utf-8"?>
+<p:notes xmlns:a="http://schemas.openxmlformats.org/drawingml/2006/main" xmlns:r="http://schemas.openxmlformats.org/officeDocument/2006/relationships" xmlns:p="http://schemas.openxmlformats.org/presentationml/2006/main">
+  <p:cSld>
+    <p:spTree>
+      <p:nvGrpSpPr>
+        <p:cNvPr id="1" name=""/>
+        <p:cNvGrpSpPr/>
+        <p:nvPr/>
+      </p:nvGrpSpPr>
+      <p:grpSpPr>
+        <a:xfrm>
+          <a:off x="0" y="0"/>
+          <a:ext cx="0" cy="0"/>
+          <a:chOff x="0" y="0"/>
+          <a:chExt cx="0" cy="0"/>
+        </a:xfrm>
+      </p:grpSpPr>
+      <p:sp>
+        <p:nvSpPr>
+          <p:cNvPr id="2" name="Slide Image Placeholder 1"/>
+          <p:cNvSpPr>
+            <a:spLocks noGrp="1" noRot="1" noChangeAspect="1"/>
+          </p:cNvSpPr>
+          <p:nvPr>
+            <p:ph type="sldImg"/>
+          </p:nvPr>
+        </p:nvSpPr>
+        <p:spPr/>
+      </p:sp>
+      <p:sp>
+        <p:nvSpPr>
+          <p:cNvPr id="3" name="Notes Placeholder 2"/>
+          <p:cNvSpPr>
+            <a:spLocks noGrp="1"/>
+          </p:cNvSpPr>
+          <p:nvPr>
+            <p:ph type="body" idx="1"/>
+          </p:nvPr>
+        </p:nvSpPr>
+        <p:spPr/>
+        <p:txBody>
+          <a:bodyPr/>
+          <a:lstStyle/>
+          <a:p>
+            <a:r>
+              <a:rPr lang="en-US" dirty="0" smtClean="0"/>
+              <a:t>Philosophies – guiding</a:t>
+            </a:r>
+            <a:r>
+              <a:rPr lang="en-US" baseline="0" dirty="0" smtClean="0"/>
+              <a:t> principles, helps to understand why JUnit is the way it is.</a:t>
+            </a:r>
+          </a:p>
+          <a:p>
+            <a:endParaRPr lang="en-US" baseline="0" dirty="0" smtClean="0"/>
+          </a:p>
+          <a:p>
+            <a:r>
+              <a:rPr lang="en-US" baseline="0" dirty="0" smtClean="0"/>
+              <a:t>Review the changes in JUnit 4 that brought on the ability to flex in different ways.</a:t>
+            </a:r>
+          </a:p>
+          <a:p>
+            <a:endParaRPr lang="en-US" dirty="0" smtClean="0"/>
+          </a:p>
+          <a:p>
+            <a:r>
+              <a:rPr lang="en-US" dirty="0" smtClean="0"/>
+              <a:t>Some specific</a:t>
+            </a:r>
+            <a:r>
+              <a:rPr lang="en-US" baseline="0" dirty="0" smtClean="0"/>
+              <a:t> ways to plug into JUnit 4 – matchers, Rules</a:t>
+            </a:r>
+          </a:p>
+          <a:p>
+            <a:endParaRPr lang="en-US" baseline="0" dirty="0" smtClean="0"/>
+          </a:p>
+          <a:p>
+            <a:r>
+              <a:rPr lang="en-US" baseline="0" dirty="0" smtClean="0"/>
+              <a:t>…</a:t>
+            </a:r>
+          </a:p>
+          <a:p>
+            <a:endParaRPr lang="en-US" baseline="0" dirty="0" smtClean="0"/>
+          </a:p>
+          <a:p>
+            <a:r>
+              <a:rPr lang="en-US" baseline="0" dirty="0" smtClean="0"/>
+              <a:t>Custom Runners – the building blocks and how you can assemble them, and add your own.</a:t>
+            </a:r>
+          </a:p>
+        </p:txBody>
+      </p:sp>
+      <p:sp>
+        <p:nvSpPr>
+          <p:cNvPr id="4" name="Slide Number Placeholder 3"/>
+          <p:cNvSpPr>
+            <a:spLocks noGrp="1"/>
+          </p:cNvSpPr>
+          <p:nvPr>
+            <p:ph type="sldNum" sz="quarter" idx="10"/>
+          </p:nvPr>
+        </p:nvSpPr>
+        <p:spPr/>
+        <p:txBody>
+          <a:bodyPr/>
+          <a:lstStyle/>
+          <a:p>
+            <a:fld id="{A2044996-AC82-E94F-8AB5-A0DF814C394B}" type="slidenum">
+              <a:rPr lang="en-US" smtClean="0"/>
+              <a:t>2</a:t>
+            </a:fld>
+            <a:endParaRPr lang="en-US" dirty="0"/>
+          </a:p>
+        </p:txBody>
+      </p:sp>
+    </p:spTree>
+    <p:extLst>
+      <p:ext uri="{BB962C8B-B14F-4D97-AF65-F5344CB8AC3E}">
+        <p14:creationId xmlns:p14="http://schemas.microsoft.com/office/powerpoint/2010/main" val="1504453385"/>
+      </p:ext>
+    </p:extLst>
+  </p:cSld>
+  <p:clrMapOvr>
+    <a:masterClrMapping/>
+  </p:clrMapOvr>
+</p:notes>
+</file>
+
+<file path=ppt/notesSlides/notesSlide3.xml><?xml version="1.0" encoding="utf-8"?>
+<p:notes xmlns:a="http://schemas.openxmlformats.org/drawingml/2006/main" xmlns:r="http://schemas.openxmlformats.org/officeDocument/2006/relationships" xmlns:p="http://schemas.openxmlformats.org/presentationml/2006/main">
+  <p:cSld>
+    <p:spTree>
+      <p:nvGrpSpPr>
+        <p:cNvPr id="1" name=""/>
+        <p:cNvGrpSpPr/>
+        <p:nvPr/>
+      </p:nvGrpSpPr>
+      <p:grpSpPr>
+        <a:xfrm>
+          <a:off x="0" y="0"/>
+          <a:ext cx="0" cy="0"/>
+          <a:chOff x="0" y="0"/>
+          <a:chExt cx="0" cy="0"/>
+        </a:xfrm>
+      </p:grpSpPr>
+      <p:sp>
+        <p:nvSpPr>
+          <p:cNvPr id="2" name="Slide Image Placeholder 1"/>
+          <p:cNvSpPr>
+            <a:spLocks noGrp="1" noRot="1" noChangeAspect="1"/>
+          </p:cNvSpPr>
+          <p:nvPr>
+            <p:ph type="sldImg"/>
+          </p:nvPr>
+        </p:nvSpPr>
+        <p:spPr/>
+      </p:sp>
+      <p:sp>
+        <p:nvSpPr>
+          <p:cNvPr id="3" name="Notes Placeholder 2"/>
+          <p:cNvSpPr>
+            <a:spLocks noGrp="1"/>
+          </p:cNvSpPr>
+          <p:nvPr>
+            <p:ph type="body" idx="1"/>
+          </p:nvPr>
+        </p:nvSpPr>
+        <p:spPr/>
+        <p:txBody>
+          <a:bodyPr/>
+          <a:lstStyle/>
+          <a:p>
+            <a:r>
+              <a:rPr lang="en-US" dirty="0" smtClean="0"/>
+              <a:t>OCP – Classes should be open for extension but closed</a:t>
+            </a:r>
+            <a:r>
+              <a:rPr lang="en-US" baseline="0" dirty="0" smtClean="0"/>
+              <a:t> to modification.</a:t>
+            </a:r>
+            <a:endParaRPr lang="en-US" dirty="0"/>
+          </a:p>
+        </p:txBody>
+      </p:sp>
+      <p:sp>
+        <p:nvSpPr>
+          <p:cNvPr id="4" name="Slide Number Placeholder 3"/>
+          <p:cNvSpPr>
+            <a:spLocks noGrp="1"/>
+          </p:cNvSpPr>
+          <p:nvPr>
+            <p:ph type="sldNum" sz="quarter" idx="10"/>
+          </p:nvPr>
+        </p:nvSpPr>
+        <p:spPr/>
+        <p:txBody>
+          <a:bodyPr/>
+          <a:lstStyle/>
+          <a:p>
+            <a:fld id="{A2044996-AC82-E94F-8AB5-A0DF814C394B}" type="slidenum">
+              <a:rPr lang="en-US" smtClean="0"/>
+              <a:t>3</a:t>
+            </a:fld>
+            <a:endParaRPr lang="en-US" dirty="0"/>
+          </a:p>
+        </p:txBody>
+      </p:sp>
+    </p:spTree>
+    <p:extLst>
+      <p:ext uri="{BB962C8B-B14F-4D97-AF65-F5344CB8AC3E}">
+        <p14:creationId xmlns:p14="http://schemas.microsoft.com/office/powerpoint/2010/main" val="3714026632"/>
+      </p:ext>
+    </p:extLst>
+  </p:cSld>
+  <p:clrMapOvr>
+    <a:masterClrMapping/>
+  </p:clrMapOvr>
+</p:notes>
+</file>
+
+<file path=ppt/notesSlides/notesSlide4.xml><?xml version="1.0" encoding="utf-8"?>
+<p:notes xmlns:a="http://schemas.openxmlformats.org/drawingml/2006/main" xmlns:r="http://schemas.openxmlformats.org/officeDocument/2006/relationships" xmlns:p="http://schemas.openxmlformats.org/presentationml/2006/main">
+  <p:cSld>
+    <p:spTree>
+      <p:nvGrpSpPr>
+        <p:cNvPr id="1" name=""/>
+        <p:cNvGrpSpPr/>
+        <p:nvPr/>
+      </p:nvGrpSpPr>
+      <p:grpSpPr>
+        <a:xfrm>
+          <a:off x="0" y="0"/>
+          <a:ext cx="0" cy="0"/>
+          <a:chOff x="0" y="0"/>
+          <a:chExt cx="0" cy="0"/>
+        </a:xfrm>
+      </p:grpSpPr>
+      <p:sp>
+        <p:nvSpPr>
+          <p:cNvPr id="2" name="Slide Image Placeholder 1"/>
+          <p:cNvSpPr>
+            <a:spLocks noGrp="1" noRot="1" noChangeAspect="1"/>
+          </p:cNvSpPr>
+          <p:nvPr>
+            <p:ph type="sldImg"/>
+          </p:nvPr>
+        </p:nvSpPr>
+        <p:spPr/>
+      </p:sp>
+      <p:sp>
+        <p:nvSpPr>
+          <p:cNvPr id="3" name="Notes Placeholder 2"/>
+          <p:cNvSpPr>
+            <a:spLocks noGrp="1"/>
+          </p:cNvSpPr>
+          <p:nvPr>
+            <p:ph type="body" idx="1"/>
+          </p:nvPr>
+        </p:nvSpPr>
+        <p:spPr/>
+        <p:txBody>
+          <a:bodyPr/>
+          <a:lstStyle/>
+          <a:p>
+            <a:r>
+              <a:rPr lang="en-US" dirty="0" smtClean="0"/>
+              <a:t>Annotations over naming conventions</a:t>
+            </a:r>
+          </a:p>
+          <a:p>
+            <a:endParaRPr lang="en-US" dirty="0" smtClean="0"/>
+          </a:p>
+          <a:p>
+            <a:r>
+              <a:rPr lang="en-US" dirty="0" smtClean="0"/>
+              <a:t>No common superclass frees up superclass slot.</a:t>
+            </a:r>
+          </a:p>
+          <a:p>
+            <a:endParaRPr lang="en-US" dirty="0" smtClean="0"/>
+          </a:p>
+          <a:p>
+            <a:r>
+              <a:rPr lang="en-US" dirty="0" smtClean="0"/>
+              <a:t>Multiple @Before and @After are possible,</a:t>
+            </a:r>
+            <a:r>
+              <a:rPr lang="en-US" baseline="0" dirty="0" smtClean="0"/>
+              <a:t> even in </a:t>
+            </a:r>
+            <a:r>
+              <a:rPr lang="en-US" baseline="0" dirty="0" err="1" smtClean="0"/>
+              <a:t>superclasses</a:t>
+            </a:r>
+            <a:r>
+              <a:rPr lang="en-US" baseline="0" dirty="0" smtClean="0"/>
+              <a:t>.</a:t>
+            </a:r>
+          </a:p>
+          <a:p>
+            <a:endParaRPr lang="en-US" baseline="0" dirty="0" smtClean="0"/>
+          </a:p>
+          <a:p>
+            <a:r>
+              <a:rPr lang="en-US" baseline="0" dirty="0" smtClean="0"/>
+              <a:t>@</a:t>
+            </a:r>
+            <a:r>
+              <a:rPr lang="en-US" baseline="0" dirty="0" err="1" smtClean="0"/>
+              <a:t>Befores</a:t>
+            </a:r>
+            <a:r>
+              <a:rPr lang="en-US" baseline="0" dirty="0" smtClean="0"/>
+              <a:t> run in order from “top” of hierarchy to bottom, and reverse for @</a:t>
+            </a:r>
+            <a:r>
+              <a:rPr lang="en-US" baseline="0" dirty="0" err="1" smtClean="0"/>
+              <a:t>Afters</a:t>
+            </a:r>
+            <a:endParaRPr lang="en-US" baseline="0" dirty="0" smtClean="0"/>
+          </a:p>
+          <a:p>
+            <a:endParaRPr lang="en-US" dirty="0" smtClean="0"/>
+          </a:p>
+          <a:p>
+            <a:r>
+              <a:rPr lang="en-US" dirty="0" err="1" smtClean="0"/>
+              <a:t>TestCase</a:t>
+            </a:r>
+            <a:r>
+              <a:rPr lang="en-US" dirty="0" smtClean="0"/>
+              <a:t> extended</a:t>
+            </a:r>
+            <a:r>
+              <a:rPr lang="en-US" baseline="0" dirty="0" smtClean="0"/>
+              <a:t> Assert, so subclasses of </a:t>
+            </a:r>
+            <a:r>
+              <a:rPr lang="en-US" baseline="0" dirty="0" err="1" smtClean="0"/>
+              <a:t>TestCase</a:t>
+            </a:r>
+            <a:r>
+              <a:rPr lang="en-US" baseline="0" dirty="0" smtClean="0"/>
+              <a:t> got assertion methods for free. Now, you typically have static assertion methods on other classes, and you static import them.</a:t>
+            </a:r>
+          </a:p>
+          <a:p>
+            <a:endParaRPr lang="en-US" dirty="0" smtClean="0"/>
+          </a:p>
+          <a:p>
+            <a:r>
+              <a:rPr lang="en-US" dirty="0" err="1" smtClean="0"/>
+              <a:t>junit.framework</a:t>
+            </a:r>
+            <a:r>
+              <a:rPr lang="en-US" baseline="0" dirty="0" smtClean="0"/>
+              <a:t> hangs around for legacy tests</a:t>
+            </a:r>
+            <a:endParaRPr lang="en-US" dirty="0"/>
+          </a:p>
+        </p:txBody>
+      </p:sp>
+      <p:sp>
+        <p:nvSpPr>
+          <p:cNvPr id="4" name="Slide Number Placeholder 3"/>
+          <p:cNvSpPr>
+            <a:spLocks noGrp="1"/>
+          </p:cNvSpPr>
+          <p:nvPr>
+            <p:ph type="sldNum" sz="quarter" idx="10"/>
+          </p:nvPr>
+        </p:nvSpPr>
+        <p:spPr/>
+        <p:txBody>
+          <a:bodyPr/>
+          <a:lstStyle/>
+          <a:p>
+            <a:fld id="{A2044996-AC82-E94F-8AB5-A0DF814C394B}" type="slidenum">
+              <a:rPr lang="en-US" smtClean="0"/>
+              <a:t>5</a:t>
+            </a:fld>
+            <a:endParaRPr lang="en-US" dirty="0"/>
+          </a:p>
+        </p:txBody>
+      </p:sp>
+    </p:spTree>
+    <p:extLst>
+      <p:ext uri="{BB962C8B-B14F-4D97-AF65-F5344CB8AC3E}">
+        <p14:creationId xmlns:p14="http://schemas.microsoft.com/office/powerpoint/2010/main" val="2017318895"/>
+      </p:ext>
+    </p:extLst>
+  </p:cSld>
+  <p:clrMapOvr>
+    <a:masterClrMapping/>
+  </p:clrMapOvr>
+</p:notes>
+</file>
+
+<file path=ppt/notesSlides/notesSlide5.xml><?xml version="1.0" encoding="utf-8"?>
+<p:notes xmlns:a="http://schemas.openxmlformats.org/drawingml/2006/main" xmlns:r="http://schemas.openxmlformats.org/officeDocument/2006/relationships" xmlns:p="http://schemas.openxmlformats.org/presentationml/2006/main">
+  <p:cSld>
+    <p:spTree>
+      <p:nvGrpSpPr>
+        <p:cNvPr id="1" name=""/>
+        <p:cNvGrpSpPr/>
+        <p:nvPr/>
+      </p:nvGrpSpPr>
+      <p:grpSpPr>
+        <a:xfrm>
+          <a:off x="0" y="0"/>
+          <a:ext cx="0" cy="0"/>
+          <a:chOff x="0" y="0"/>
+          <a:chExt cx="0" cy="0"/>
+        </a:xfrm>
+      </p:grpSpPr>
+      <p:sp>
+        <p:nvSpPr>
+          <p:cNvPr id="2" name="Slide Image Placeholder 1"/>
+          <p:cNvSpPr>
+            <a:spLocks noGrp="1" noRot="1" noChangeAspect="1"/>
+          </p:cNvSpPr>
+          <p:nvPr>
+            <p:ph type="sldImg"/>
+          </p:nvPr>
+        </p:nvSpPr>
+        <p:spPr/>
+      </p:sp>
+      <p:sp>
+        <p:nvSpPr>
+          <p:cNvPr id="3" name="Notes Placeholder 2"/>
+          <p:cNvSpPr>
+            <a:spLocks noGrp="1"/>
+          </p:cNvSpPr>
+          <p:nvPr>
+            <p:ph type="body" idx="1"/>
+          </p:nvPr>
+        </p:nvSpPr>
+        <p:spPr/>
+        <p:txBody>
+          <a:bodyPr/>
+          <a:lstStyle/>
+          <a:p>
+            <a:r>
+              <a:rPr lang="en-US" dirty="0" smtClean="0"/>
+              <a:t>It is common for users of JUnit</a:t>
+            </a:r>
+            <a:r>
+              <a:rPr lang="en-US" baseline="0" dirty="0" smtClean="0"/>
+              <a:t> to swap expected and actual </a:t>
+            </a:r>
+            <a:r>
+              <a:rPr lang="en-US" baseline="0" dirty="0" err="1" smtClean="0"/>
+              <a:t>args</a:t>
+            </a:r>
+            <a:r>
+              <a:rPr lang="en-US" baseline="0" dirty="0" smtClean="0"/>
+              <a:t>. When the assertion pops, you want the message that is displayed to be accurate.</a:t>
+            </a:r>
+          </a:p>
+          <a:p>
+            <a:endParaRPr lang="en-US" dirty="0"/>
+          </a:p>
+        </p:txBody>
+      </p:sp>
+      <p:sp>
+        <p:nvSpPr>
+          <p:cNvPr id="4" name="Slide Number Placeholder 3"/>
+          <p:cNvSpPr>
+            <a:spLocks noGrp="1"/>
+          </p:cNvSpPr>
+          <p:nvPr>
+            <p:ph type="sldNum" sz="quarter" idx="10"/>
+          </p:nvPr>
+        </p:nvSpPr>
+        <p:spPr/>
+        <p:txBody>
+          <a:bodyPr/>
+          <a:lstStyle/>
+          <a:p>
+            <a:fld id="{A2044996-AC82-E94F-8AB5-A0DF814C394B}" type="slidenum">
+              <a:rPr lang="en-US" smtClean="0"/>
+              <a:t>6</a:t>
+            </a:fld>
+            <a:endParaRPr lang="en-US" dirty="0"/>
+          </a:p>
+        </p:txBody>
+      </p:sp>
+    </p:spTree>
+    <p:extLst>
+      <p:ext uri="{BB962C8B-B14F-4D97-AF65-F5344CB8AC3E}">
+        <p14:creationId xmlns:p14="http://schemas.microsoft.com/office/powerpoint/2010/main" val="3387312171"/>
+      </p:ext>
+    </p:extLst>
+  </p:cSld>
+  <p:clrMapOvr>
+    <a:masterClrMapping/>
+  </p:clrMapOvr>
+</p:notes>
+</file>
+
+<file path=ppt/notesSlides/notesSlide6.xml><?xml version="1.0" encoding="utf-8"?>
+<p:notes xmlns:a="http://schemas.openxmlformats.org/drawingml/2006/main" xmlns:r="http://schemas.openxmlformats.org/officeDocument/2006/relationships" xmlns:p="http://schemas.openxmlformats.org/presentationml/2006/main">
+  <p:cSld>
+    <p:spTree>
+      <p:nvGrpSpPr>
+        <p:cNvPr id="1" name=""/>
+        <p:cNvGrpSpPr/>
+        <p:nvPr/>
+      </p:nvGrpSpPr>
+      <p:grpSpPr>
+        <a:xfrm>
+          <a:off x="0" y="0"/>
+          <a:ext cx="0" cy="0"/>
+          <a:chOff x="0" y="0"/>
+          <a:chExt cx="0" cy="0"/>
+        </a:xfrm>
+      </p:grpSpPr>
+      <p:sp>
+        <p:nvSpPr>
+          <p:cNvPr id="2" name="Slide Image Placeholder 1"/>
+          <p:cNvSpPr>
+            <a:spLocks noGrp="1" noRot="1" noChangeAspect="1"/>
+          </p:cNvSpPr>
+          <p:nvPr>
+            <p:ph type="sldImg"/>
+          </p:nvPr>
+        </p:nvSpPr>
+        <p:spPr/>
+      </p:sp>
+      <p:sp>
+        <p:nvSpPr>
+          <p:cNvPr id="3" name="Notes Placeholder 2"/>
+          <p:cNvSpPr>
+            <a:spLocks noGrp="1"/>
+          </p:cNvSpPr>
+          <p:nvPr>
+            <p:ph type="body" idx="1"/>
+          </p:nvPr>
+        </p:nvSpPr>
+        <p:spPr/>
+        <p:txBody>
+          <a:bodyPr/>
+          <a:lstStyle/>
+          <a:p>
+            <a:r>
+              <a:rPr lang="en-US" dirty="0" smtClean="0"/>
+              <a:t>The</a:t>
+            </a:r>
+            <a:r>
+              <a:rPr lang="en-US" baseline="0" dirty="0" smtClean="0"/>
+              <a:t> matcher needs to be constructed in a way that enables it to compare the actual to some expectation.</a:t>
+            </a:r>
+          </a:p>
+          <a:p>
+            <a:endParaRPr lang="en-US" baseline="0" dirty="0" smtClean="0"/>
+          </a:p>
+          <a:p>
+            <a:r>
+              <a:rPr lang="en-US" baseline="0" dirty="0" err="1" smtClean="0"/>
+              <a:t>Hamcrest</a:t>
+            </a:r>
+            <a:r>
+              <a:rPr lang="en-US" baseline="0" dirty="0" smtClean="0"/>
+              <a:t> is a library that sprang from Joe </a:t>
+            </a:r>
+            <a:r>
+              <a:rPr lang="en-US" baseline="0" dirty="0" err="1" smtClean="0"/>
+              <a:t>Walnes</a:t>
+            </a:r>
+            <a:r>
+              <a:rPr lang="en-US" baseline="0" dirty="0" smtClean="0"/>
+              <a:t>’ original </a:t>
+            </a:r>
+            <a:r>
+              <a:rPr lang="en-US" baseline="0" dirty="0" err="1" smtClean="0"/>
+              <a:t>assertThat</a:t>
+            </a:r>
+            <a:r>
+              <a:rPr lang="en-US" baseline="0" dirty="0" smtClean="0"/>
+              <a:t>() article. It has some basic matchers, and means to compose them (and, or, not, any, all).</a:t>
+            </a:r>
+          </a:p>
+          <a:p>
+            <a:endParaRPr lang="en-US" baseline="0" dirty="0" smtClean="0"/>
+          </a:p>
+          <a:p>
+            <a:r>
+              <a:rPr lang="en-US" baseline="0" dirty="0" smtClean="0"/>
+              <a:t>JUnit has some matchers too.</a:t>
+            </a:r>
+          </a:p>
+          <a:p>
+            <a:endParaRPr lang="en-US" baseline="0" dirty="0" smtClean="0"/>
+          </a:p>
+          <a:p>
+            <a:r>
+              <a:rPr lang="en-US" baseline="0" dirty="0" smtClean="0"/>
+              <a:t>Why the name “</a:t>
+            </a:r>
+            <a:r>
+              <a:rPr lang="en-US" baseline="0" dirty="0" err="1" smtClean="0"/>
+              <a:t>Hamcrest</a:t>
+            </a:r>
+            <a:r>
+              <a:rPr lang="en-US" baseline="0" dirty="0" smtClean="0"/>
+              <a:t>”? 8^)</a:t>
+            </a:r>
+          </a:p>
+          <a:p>
+            <a:endParaRPr lang="en-US" baseline="0" dirty="0" smtClean="0"/>
+          </a:p>
+        </p:txBody>
+      </p:sp>
+      <p:sp>
+        <p:nvSpPr>
+          <p:cNvPr id="4" name="Slide Number Placeholder 3"/>
+          <p:cNvSpPr>
+            <a:spLocks noGrp="1"/>
+          </p:cNvSpPr>
+          <p:nvPr>
+            <p:ph type="sldNum" sz="quarter" idx="10"/>
+          </p:nvPr>
+        </p:nvSpPr>
+        <p:spPr/>
+        <p:txBody>
+          <a:bodyPr/>
+          <a:lstStyle/>
+          <a:p>
+            <a:fld id="{A2044996-AC82-E94F-8AB5-A0DF814C394B}" type="slidenum">
+              <a:rPr lang="en-US" smtClean="0"/>
+              <a:t>7</a:t>
+            </a:fld>
+            <a:endParaRPr lang="en-US" dirty="0"/>
+          </a:p>
+        </p:txBody>
+      </p:sp>
+    </p:spTree>
+    <p:extLst>
+      <p:ext uri="{BB962C8B-B14F-4D97-AF65-F5344CB8AC3E}">
+        <p14:creationId xmlns:p14="http://schemas.microsoft.com/office/powerpoint/2010/main" val="1143722323"/>
+      </p:ext>
+    </p:extLst>
+  </p:cSld>
+  <p:clrMapOvr>
+    <a:masterClrMapping/>
+  </p:clrMapOvr>
+</p:notes>
+</file>
+
 <file path=ppt/slideLayouts/slideLayout1.xml><?xml version="1.0" encoding="utf-8"?>
 <p:sldLayout xmlns:a="http://schemas.openxmlformats.org/drawingml/2006/main" xmlns:r="http://schemas.openxmlformats.org/officeDocument/2006/relationships" xmlns:p="http://schemas.openxmlformats.org/presentationml/2006/main" type="title" preserve="1">
   <p:cSld name="Title Slide">
@@ -167,7 +1265,7 @@
               <a:rPr lang="en-US" smtClean="0"/>
               <a:t>‹#›</a:t>
             </a:fld>
-            <a:endParaRPr lang="en-US"/>
+            <a:endParaRPr lang="en-US" dirty="0"/>
           </a:p>
         </p:txBody>
       </p:sp>
@@ -344,7 +1442,7 @@
               <a:rPr lang="en-US" smtClean="0"/>
               <a:t>10/4/11</a:t>
             </a:fld>
-            <a:endParaRPr lang="en-US"/>
+            <a:endParaRPr lang="en-US" dirty="0"/>
           </a:p>
         </p:txBody>
       </p:sp>
@@ -363,7 +1461,7 @@
           <a:bodyPr/>
           <a:lstStyle/>
           <a:p>
-            <a:endParaRPr lang="en-US"/>
+            <a:endParaRPr lang="en-US" dirty="0"/>
           </a:p>
         </p:txBody>
       </p:sp>
@@ -435,7 +1533,7 @@
               <a:rPr lang="en-US" smtClean="0"/>
               <a:t>10/4/11</a:t>
             </a:fld>
-            <a:endParaRPr lang="en-US"/>
+            <a:endParaRPr lang="en-US" dirty="0"/>
           </a:p>
         </p:txBody>
       </p:sp>
@@ -454,7 +1552,7 @@
           <a:bodyPr/>
           <a:lstStyle/>
           <a:p>
-            <a:endParaRPr lang="en-US"/>
+            <a:endParaRPr lang="en-US" dirty="0"/>
           </a:p>
         </p:txBody>
       </p:sp>
@@ -477,7 +1575,7 @@
               <a:rPr lang="en-US" smtClean="0"/>
               <a:t>‹#›</a:t>
             </a:fld>
-            <a:endParaRPr lang="en-US"/>
+            <a:endParaRPr lang="en-US" dirty="0"/>
           </a:p>
         </p:txBody>
       </p:sp>
@@ -738,7 +1836,7 @@
               <a:rPr lang="en-US" smtClean="0"/>
               <a:t>10/4/11</a:t>
             </a:fld>
-            <a:endParaRPr lang="en-US"/>
+            <a:endParaRPr lang="en-US" dirty="0"/>
           </a:p>
         </p:txBody>
       </p:sp>
@@ -757,7 +1855,7 @@
           <a:bodyPr/>
           <a:lstStyle/>
           <a:p>
-            <a:endParaRPr lang="en-US"/>
+            <a:endParaRPr lang="en-US" dirty="0"/>
           </a:p>
         </p:txBody>
       </p:sp>
@@ -780,7 +1878,7 @@
               <a:rPr lang="en-US" smtClean="0"/>
               <a:t>‹#›</a:t>
             </a:fld>
-            <a:endParaRPr lang="en-US"/>
+            <a:endParaRPr lang="en-US" dirty="0"/>
           </a:p>
         </p:txBody>
       </p:sp>
@@ -959,7 +2057,7 @@
               <a:rPr lang="en-US" smtClean="0"/>
               <a:t>10/4/11</a:t>
             </a:fld>
-            <a:endParaRPr lang="en-US"/>
+            <a:endParaRPr lang="en-US" dirty="0"/>
           </a:p>
         </p:txBody>
       </p:sp>
@@ -983,7 +2081,7 @@
           <a:bodyPr/>
           <a:lstStyle/>
           <a:p>
-            <a:endParaRPr lang="en-US"/>
+            <a:endParaRPr lang="en-US" dirty="0"/>
           </a:p>
         </p:txBody>
       </p:sp>
@@ -1006,7 +2104,7 @@
               <a:rPr lang="en-US" smtClean="0"/>
               <a:t>‹#›</a:t>
             </a:fld>
-            <a:endParaRPr lang="en-US"/>
+            <a:endParaRPr lang="en-US" dirty="0"/>
           </a:p>
         </p:txBody>
       </p:sp>
@@ -1085,10 +2183,10 @@
           </a:lstStyle>
           <a:p>
             <a:r>
-              <a:rPr lang="en-US" smtClean="0"/>
+              <a:rPr lang="en-US" dirty="0" smtClean="0"/>
               <a:t>Drag picture to placeholder or click icon to add</a:t>
             </a:r>
-            <a:endParaRPr/>
+            <a:endParaRPr dirty="0"/>
           </a:p>
         </p:txBody>
       </p:sp>
@@ -1246,10 +2344,10 @@
           </a:lstStyle>
           <a:p>
             <a:r>
-              <a:rPr lang="en-US" smtClean="0"/>
+              <a:rPr lang="en-US" dirty="0" smtClean="0"/>
               <a:t>Drag picture to placeholder or click icon to add</a:t>
             </a:r>
-            <a:endParaRPr/>
+            <a:endParaRPr dirty="0"/>
           </a:p>
         </p:txBody>
       </p:sp>
@@ -1347,7 +2445,7 @@
               <a:rPr lang="en-US" smtClean="0"/>
               <a:t>10/4/11</a:t>
             </a:fld>
-            <a:endParaRPr lang="en-US"/>
+            <a:endParaRPr lang="en-US" dirty="0"/>
           </a:p>
         </p:txBody>
       </p:sp>
@@ -1371,7 +2469,7 @@
           <a:bodyPr/>
           <a:lstStyle/>
           <a:p>
-            <a:endParaRPr lang="en-US"/>
+            <a:endParaRPr lang="en-US" dirty="0"/>
           </a:p>
         </p:txBody>
       </p:sp>
@@ -1394,7 +2492,7 @@
               <a:rPr lang="en-US" smtClean="0"/>
               <a:t>‹#›</a:t>
             </a:fld>
-            <a:endParaRPr lang="en-US"/>
+            <a:endParaRPr lang="en-US" dirty="0"/>
           </a:p>
         </p:txBody>
       </p:sp>
@@ -1554,10 +2652,10 @@
           </a:lstStyle>
           <a:p>
             <a:r>
-              <a:rPr lang="en-US" smtClean="0"/>
+              <a:rPr lang="en-US" dirty="0" smtClean="0"/>
               <a:t>Drag picture to placeholder or click icon to add</a:t>
             </a:r>
-            <a:endParaRPr/>
+            <a:endParaRPr dirty="0"/>
           </a:p>
         </p:txBody>
       </p:sp>
@@ -1655,7 +2753,7 @@
               <a:rPr lang="en-US" smtClean="0"/>
               <a:t>10/4/11</a:t>
             </a:fld>
-            <a:endParaRPr lang="en-US"/>
+            <a:endParaRPr lang="en-US" dirty="0"/>
           </a:p>
         </p:txBody>
       </p:sp>
@@ -1679,7 +2777,7 @@
           <a:bodyPr/>
           <a:lstStyle/>
           <a:p>
-            <a:endParaRPr lang="en-US"/>
+            <a:endParaRPr lang="en-US" dirty="0"/>
           </a:p>
         </p:txBody>
       </p:sp>
@@ -1702,7 +2800,7 @@
               <a:rPr lang="en-US" smtClean="0"/>
               <a:t>‹#›</a:t>
             </a:fld>
-            <a:endParaRPr lang="en-US"/>
+            <a:endParaRPr lang="en-US" dirty="0"/>
           </a:p>
         </p:txBody>
       </p:sp>
@@ -1853,7 +2951,7 @@
               <a:rPr lang="en-US" smtClean="0"/>
               <a:t>10/4/11</a:t>
             </a:fld>
-            <a:endParaRPr lang="en-US"/>
+            <a:endParaRPr lang="en-US" dirty="0"/>
           </a:p>
         </p:txBody>
       </p:sp>
@@ -1872,7 +2970,7 @@
           <a:bodyPr/>
           <a:lstStyle/>
           <a:p>
-            <a:endParaRPr lang="en-US"/>
+            <a:endParaRPr lang="en-US" dirty="0"/>
           </a:p>
         </p:txBody>
       </p:sp>
@@ -1895,7 +2993,7 @@
               <a:rPr lang="en-US" smtClean="0"/>
               <a:t>‹#›</a:t>
             </a:fld>
-            <a:endParaRPr lang="en-US"/>
+            <a:endParaRPr lang="en-US" dirty="0"/>
           </a:p>
         </p:txBody>
       </p:sp>
@@ -2056,7 +3154,7 @@
               <a:rPr lang="en-US" smtClean="0"/>
               <a:t>10/4/11</a:t>
             </a:fld>
-            <a:endParaRPr lang="en-US"/>
+            <a:endParaRPr lang="en-US" dirty="0"/>
           </a:p>
         </p:txBody>
       </p:sp>
@@ -2075,7 +3173,7 @@
           <a:bodyPr/>
           <a:lstStyle/>
           <a:p>
-            <a:endParaRPr lang="en-US"/>
+            <a:endParaRPr lang="en-US" dirty="0"/>
           </a:p>
         </p:txBody>
       </p:sp>
@@ -2098,7 +3196,7 @@
               <a:rPr lang="en-US" smtClean="0"/>
               <a:t>‹#›</a:t>
             </a:fld>
-            <a:endParaRPr lang="en-US"/>
+            <a:endParaRPr lang="en-US" dirty="0"/>
           </a:p>
         </p:txBody>
       </p:sp>
@@ -2249,7 +3347,7 @@
               <a:rPr lang="en-US" smtClean="0"/>
               <a:t>10/4/11</a:t>
             </a:fld>
-            <a:endParaRPr lang="en-US"/>
+            <a:endParaRPr lang="en-US" dirty="0"/>
           </a:p>
         </p:txBody>
       </p:sp>
@@ -2268,7 +3366,7 @@
           <a:bodyPr/>
           <a:lstStyle/>
           <a:p>
-            <a:endParaRPr lang="en-US"/>
+            <a:endParaRPr lang="en-US" dirty="0"/>
           </a:p>
         </p:txBody>
       </p:sp>
@@ -2291,7 +3389,7 @@
               <a:rPr lang="en-US" smtClean="0"/>
               <a:t>‹#›</a:t>
             </a:fld>
-            <a:endParaRPr lang="en-US"/>
+            <a:endParaRPr lang="en-US" dirty="0"/>
           </a:p>
         </p:txBody>
       </p:sp>
@@ -2521,7 +3619,7 @@
               <a:rPr lang="en-US" smtClean="0"/>
               <a:t>10/4/11</a:t>
             </a:fld>
-            <a:endParaRPr lang="en-US"/>
+            <a:endParaRPr lang="en-US" dirty="0"/>
           </a:p>
         </p:txBody>
       </p:sp>
@@ -2540,7 +3638,7 @@
           <a:bodyPr/>
           <a:lstStyle/>
           <a:p>
-            <a:endParaRPr lang="en-US"/>
+            <a:endParaRPr lang="en-US" dirty="0"/>
           </a:p>
         </p:txBody>
       </p:sp>
@@ -2563,7 +3661,7 @@
               <a:rPr lang="en-US" smtClean="0"/>
               <a:t>‹#›</a:t>
             </a:fld>
-            <a:endParaRPr lang="en-US"/>
+            <a:endParaRPr lang="en-US" dirty="0"/>
           </a:p>
         </p:txBody>
       </p:sp>
@@ -2832,7 +3930,7 @@
               <a:rPr lang="en-US" smtClean="0"/>
               <a:t>10/4/11</a:t>
             </a:fld>
-            <a:endParaRPr lang="en-US"/>
+            <a:endParaRPr lang="en-US" dirty="0"/>
           </a:p>
         </p:txBody>
       </p:sp>
@@ -2851,7 +3949,7 @@
           <a:bodyPr/>
           <a:lstStyle/>
           <a:p>
-            <a:endParaRPr lang="en-US"/>
+            <a:endParaRPr lang="en-US" dirty="0"/>
           </a:p>
         </p:txBody>
       </p:sp>
@@ -2874,7 +3972,7 @@
               <a:rPr lang="en-US" smtClean="0"/>
               <a:t>‹#›</a:t>
             </a:fld>
-            <a:endParaRPr lang="en-US"/>
+            <a:endParaRPr lang="en-US" dirty="0"/>
           </a:p>
         </p:txBody>
       </p:sp>
@@ -3298,7 +4396,7 @@
               <a:rPr lang="en-US" smtClean="0"/>
               <a:t>10/4/11</a:t>
             </a:fld>
-            <a:endParaRPr lang="en-US"/>
+            <a:endParaRPr lang="en-US" dirty="0"/>
           </a:p>
         </p:txBody>
       </p:sp>
@@ -3317,7 +4415,7 @@
           <a:bodyPr/>
           <a:lstStyle/>
           <a:p>
-            <a:endParaRPr lang="en-US"/>
+            <a:endParaRPr lang="en-US" dirty="0"/>
           </a:p>
         </p:txBody>
       </p:sp>
@@ -3340,7 +4438,7 @@
               <a:rPr lang="en-US" smtClean="0"/>
               <a:t>‹#›</a:t>
             </a:fld>
-            <a:endParaRPr lang="en-US"/>
+            <a:endParaRPr lang="en-US" dirty="0"/>
           </a:p>
         </p:txBody>
       </p:sp>
@@ -3662,7 +4760,7 @@
               <a:rPr lang="en-US" smtClean="0"/>
               <a:t>10/4/11</a:t>
             </a:fld>
-            <a:endParaRPr lang="en-US"/>
+            <a:endParaRPr lang="en-US" dirty="0"/>
           </a:p>
         </p:txBody>
       </p:sp>
@@ -3681,7 +4779,7 @@
           <a:bodyPr/>
           <a:lstStyle/>
           <a:p>
-            <a:endParaRPr lang="en-US"/>
+            <a:endParaRPr lang="en-US" dirty="0"/>
           </a:p>
         </p:txBody>
       </p:sp>
@@ -3704,7 +4802,7 @@
               <a:rPr lang="en-US" smtClean="0"/>
               <a:t>‹#›</a:t>
             </a:fld>
-            <a:endParaRPr lang="en-US"/>
+            <a:endParaRPr lang="en-US" dirty="0"/>
           </a:p>
         </p:txBody>
       </p:sp>
@@ -3973,7 +5071,7 @@
               <a:rPr lang="en-US" smtClean="0"/>
               <a:t>10/4/11</a:t>
             </a:fld>
-            <a:endParaRPr lang="en-US"/>
+            <a:endParaRPr lang="en-US" dirty="0"/>
           </a:p>
         </p:txBody>
       </p:sp>
@@ -3992,7 +5090,7 @@
           <a:bodyPr/>
           <a:lstStyle/>
           <a:p>
-            <a:endParaRPr lang="en-US"/>
+            <a:endParaRPr lang="en-US" dirty="0"/>
           </a:p>
         </p:txBody>
       </p:sp>
@@ -4015,7 +5113,7 @@
               <a:rPr lang="en-US" smtClean="0"/>
               <a:t>‹#›</a:t>
             </a:fld>
-            <a:endParaRPr lang="en-US"/>
+            <a:endParaRPr lang="en-US" dirty="0"/>
           </a:p>
         </p:txBody>
       </p:sp>
@@ -4284,7 +5382,7 @@
               <a:rPr lang="en-US" smtClean="0"/>
               <a:t>10/4/11</a:t>
             </a:fld>
-            <a:endParaRPr lang="en-US"/>
+            <a:endParaRPr lang="en-US" dirty="0"/>
           </a:p>
         </p:txBody>
       </p:sp>
@@ -4303,7 +5401,7 @@
           <a:bodyPr/>
           <a:lstStyle/>
           <a:p>
-            <a:endParaRPr lang="en-US"/>
+            <a:endParaRPr lang="en-US" dirty="0"/>
           </a:p>
         </p:txBody>
       </p:sp>
@@ -4326,7 +5424,7 @@
               <a:rPr lang="en-US" smtClean="0"/>
               <a:t>‹#›</a:t>
             </a:fld>
-            <a:endParaRPr lang="en-US"/>
+            <a:endParaRPr lang="en-US" dirty="0"/>
           </a:p>
         </p:txBody>
       </p:sp>
@@ -4769,7 +5867,7 @@
               <a:rPr lang="en-US" smtClean="0"/>
               <a:t>10/4/11</a:t>
             </a:fld>
-            <a:endParaRPr lang="en-US"/>
+            <a:endParaRPr lang="en-US" dirty="0"/>
           </a:p>
         </p:txBody>
       </p:sp>
@@ -4788,7 +5886,7 @@
           <a:bodyPr/>
           <a:lstStyle/>
           <a:p>
-            <a:endParaRPr lang="en-US"/>
+            <a:endParaRPr lang="en-US" dirty="0"/>
           </a:p>
         </p:txBody>
       </p:sp>
@@ -4811,7 +5909,7 @@
               <a:rPr lang="en-US" smtClean="0"/>
               <a:t>‹#›</a:t>
             </a:fld>
-            <a:endParaRPr lang="en-US"/>
+            <a:endParaRPr lang="en-US" dirty="0"/>
           </a:p>
         </p:txBody>
       </p:sp>
@@ -5032,7 +6130,7 @@
               <a:rPr lang="en-US" smtClean="0"/>
               <a:t>10/4/11</a:t>
             </a:fld>
-            <a:endParaRPr lang="en-US"/>
+            <a:endParaRPr lang="en-US" dirty="0"/>
           </a:p>
         </p:txBody>
       </p:sp>
@@ -5067,7 +6165,7 @@
             </a:lvl1pPr>
           </a:lstStyle>
           <a:p>
-            <a:endParaRPr lang="en-US"/>
+            <a:endParaRPr lang="en-US" dirty="0"/>
           </a:p>
         </p:txBody>
       </p:sp>
@@ -5106,7 +6204,7 @@
               <a:rPr lang="en-US" smtClean="0"/>
               <a:t>‹#›</a:t>
             </a:fld>
-            <a:endParaRPr lang="en-US"/>
+            <a:endParaRPr lang="en-US" dirty="0"/>
           </a:p>
         </p:txBody>
       </p:sp>
@@ -5418,15 +6516,7 @@
           <a:p>
             <a:r>
               <a:rPr lang="en-US" dirty="0" smtClean="0"/>
-              <a:t>Bending </a:t>
-            </a:r>
-            <a:r>
-              <a:rPr lang="en-US" dirty="0" err="1" smtClean="0"/>
-              <a:t>JUnit</a:t>
-            </a:r>
-            <a:r>
-              <a:rPr lang="en-US" dirty="0" smtClean="0"/>
-              <a:t> To Your Will</a:t>
+              <a:t>Bending JUnit To Your Will</a:t>
             </a:r>
             <a:endParaRPr lang="en-US" dirty="0"/>
           </a:p>
@@ -5459,10 +6549,9 @@
           </a:p>
           <a:p>
             <a:r>
-              <a:rPr lang="en-US" smtClean="0"/>
+              <a:rPr lang="en-US" dirty="0" smtClean="0"/>
               <a:t>October 7, 2011</a:t>
             </a:r>
-            <a:endParaRPr lang="en-US" dirty="0" smtClean="0"/>
           </a:p>
         </p:txBody>
       </p:sp>
@@ -5470,6 +6559,1233 @@
     <p:extLst>
       <p:ext uri="{BB962C8B-B14F-4D97-AF65-F5344CB8AC3E}">
         <p14:creationId xmlns:p14="http://schemas.microsoft.com/office/powerpoint/2010/main" val="2879147803"/>
+      </p:ext>
+    </p:extLst>
+  </p:cSld>
+  <p:clrMapOvr>
+    <a:masterClrMapping/>
+  </p:clrMapOvr>
+</p:sld>
+</file>
+
+<file path=ppt/slides/slide10.xml><?xml version="1.0" encoding="utf-8"?>
+<p:sld xmlns:a="http://schemas.openxmlformats.org/drawingml/2006/main" xmlns:r="http://schemas.openxmlformats.org/officeDocument/2006/relationships" xmlns:p="http://schemas.openxmlformats.org/presentationml/2006/main">
+  <p:cSld>
+    <p:spTree>
+      <p:nvGrpSpPr>
+        <p:cNvPr id="1" name=""/>
+        <p:cNvGrpSpPr/>
+        <p:nvPr/>
+      </p:nvGrpSpPr>
+      <p:grpSpPr>
+        <a:xfrm>
+          <a:off x="0" y="0"/>
+          <a:ext cx="0" cy="0"/>
+          <a:chOff x="0" y="0"/>
+          <a:chExt cx="0" cy="0"/>
+        </a:xfrm>
+      </p:grpSpPr>
+      <p:sp>
+        <p:nvSpPr>
+          <p:cNvPr id="2" name="Title 1"/>
+          <p:cNvSpPr>
+            <a:spLocks noGrp="1"/>
+          </p:cNvSpPr>
+          <p:nvPr>
+            <p:ph type="title"/>
+          </p:nvPr>
+        </p:nvSpPr>
+        <p:spPr/>
+        <p:txBody>
+          <a:bodyPr/>
+          <a:lstStyle/>
+          <a:p>
+            <a:r>
+              <a:rPr lang="en-US" dirty="0" smtClean="0"/>
+              <a:t>Don’t Repeat Yourself (DRY)</a:t>
+            </a:r>
+            <a:endParaRPr lang="en-US" dirty="0"/>
+          </a:p>
+        </p:txBody>
+      </p:sp>
+      <p:sp>
+        <p:nvSpPr>
+          <p:cNvPr id="3" name="Content Placeholder 2"/>
+          <p:cNvSpPr>
+            <a:spLocks noGrp="1"/>
+          </p:cNvSpPr>
+          <p:nvPr>
+            <p:ph idx="1"/>
+          </p:nvPr>
+        </p:nvSpPr>
+        <p:spPr/>
+        <p:txBody>
+          <a:bodyPr/>
+          <a:lstStyle/>
+          <a:p>
+            <a:r>
+              <a:rPr lang="en-US" dirty="0" smtClean="0"/>
+              <a:t>Wouldn’t it be nice to say:</a:t>
+            </a:r>
+          </a:p>
+          <a:p>
+            <a:pPr marL="0" indent="0">
+              <a:buNone/>
+            </a:pPr>
+            <a:r>
+              <a:rPr lang="en-US" dirty="0">
+                <a:latin typeface="Courier New"/>
+                <a:cs typeface="Courier New"/>
+              </a:rPr>
+              <a:t> </a:t>
+            </a:r>
+            <a:r>
+              <a:rPr lang="en-US" dirty="0" smtClean="0">
+                <a:latin typeface="Courier New"/>
+                <a:cs typeface="Courier New"/>
+              </a:rPr>
+              <a:t>   </a:t>
+            </a:r>
+            <a:r>
+              <a:rPr lang="en-US" sz="2000" dirty="0" err="1" smtClean="0">
+                <a:latin typeface="Courier New"/>
+                <a:cs typeface="Courier New"/>
+              </a:rPr>
+              <a:t>assertThat</a:t>
+            </a:r>
+            <a:r>
+              <a:rPr lang="en-US" sz="2000" dirty="0" smtClean="0">
+                <a:latin typeface="Courier New"/>
+                <a:cs typeface="Courier New"/>
+              </a:rPr>
+              <a:t>("aba", #</a:t>
+            </a:r>
+            <a:r>
+              <a:rPr lang="en-US" sz="2000" dirty="0" err="1" smtClean="0">
+                <a:latin typeface="Courier New"/>
+                <a:cs typeface="Courier New"/>
+              </a:rPr>
+              <a:t>Strings.isPalindrome</a:t>
+            </a:r>
+            <a:r>
+              <a:rPr lang="en-US" sz="2000" smtClean="0">
+                <a:latin typeface="Courier New"/>
+                <a:cs typeface="Courier New"/>
+              </a:rPr>
+              <a:t>);</a:t>
+            </a:r>
+          </a:p>
+          <a:p>
+            <a:endParaRPr lang="en-US" sz="2000" dirty="0">
+              <a:cs typeface="Courier New"/>
+            </a:endParaRPr>
+          </a:p>
+        </p:txBody>
+      </p:sp>
+    </p:spTree>
+    <p:extLst>
+      <p:ext uri="{BB962C8B-B14F-4D97-AF65-F5344CB8AC3E}">
+        <p14:creationId xmlns:p14="http://schemas.microsoft.com/office/powerpoint/2010/main" val="3470414221"/>
+      </p:ext>
+    </p:extLst>
+  </p:cSld>
+  <p:clrMapOvr>
+    <a:masterClrMapping/>
+  </p:clrMapOvr>
+</p:sld>
+</file>
+
+<file path=ppt/slides/slide2.xml><?xml version="1.0" encoding="utf-8"?>
+<p:sld xmlns:a="http://schemas.openxmlformats.org/drawingml/2006/main" xmlns:r="http://schemas.openxmlformats.org/officeDocument/2006/relationships" xmlns:p="http://schemas.openxmlformats.org/presentationml/2006/main">
+  <p:cSld>
+    <p:spTree>
+      <p:nvGrpSpPr>
+        <p:cNvPr id="1" name=""/>
+        <p:cNvGrpSpPr/>
+        <p:nvPr/>
+      </p:nvGrpSpPr>
+      <p:grpSpPr>
+        <a:xfrm>
+          <a:off x="0" y="0"/>
+          <a:ext cx="0" cy="0"/>
+          <a:chOff x="0" y="0"/>
+          <a:chExt cx="0" cy="0"/>
+        </a:xfrm>
+      </p:grpSpPr>
+      <p:sp>
+        <p:nvSpPr>
+          <p:cNvPr id="2" name="Title 1"/>
+          <p:cNvSpPr>
+            <a:spLocks noGrp="1"/>
+          </p:cNvSpPr>
+          <p:nvPr>
+            <p:ph type="title"/>
+          </p:nvPr>
+        </p:nvSpPr>
+        <p:spPr/>
+        <p:txBody>
+          <a:bodyPr/>
+          <a:lstStyle/>
+          <a:p>
+            <a:r>
+              <a:rPr lang="en-US" dirty="0" smtClean="0"/>
+              <a:t>Agenda</a:t>
+            </a:r>
+            <a:endParaRPr lang="en-US" dirty="0"/>
+          </a:p>
+        </p:txBody>
+      </p:sp>
+      <p:sp>
+        <p:nvSpPr>
+          <p:cNvPr id="3" name="Content Placeholder 2"/>
+          <p:cNvSpPr>
+            <a:spLocks noGrp="1"/>
+          </p:cNvSpPr>
+          <p:nvPr>
+            <p:ph idx="1"/>
+          </p:nvPr>
+        </p:nvSpPr>
+        <p:spPr/>
+        <p:txBody>
+          <a:bodyPr/>
+          <a:lstStyle/>
+          <a:p>
+            <a:r>
+              <a:rPr lang="en-US" dirty="0" smtClean="0"/>
+              <a:t>JUnit Philosophies</a:t>
+            </a:r>
+          </a:p>
+          <a:p>
+            <a:r>
+              <a:rPr lang="en-US" dirty="0" smtClean="0"/>
+              <a:t>From JUnit 3 to JUnit 4</a:t>
+            </a:r>
+          </a:p>
+          <a:p>
+            <a:r>
+              <a:rPr lang="en-US" dirty="0" smtClean="0"/>
+              <a:t>Matchers and Assertions</a:t>
+            </a:r>
+          </a:p>
+          <a:p>
+            <a:r>
+              <a:rPr lang="en-US" dirty="0" smtClean="0"/>
+              <a:t>Rules</a:t>
+            </a:r>
+          </a:p>
+          <a:p>
+            <a:r>
+              <a:rPr lang="en-US" dirty="0" smtClean="0"/>
+              <a:t>Alternative Runners</a:t>
+            </a:r>
+          </a:p>
+          <a:p>
+            <a:r>
+              <a:rPr lang="en-US" dirty="0" smtClean="0"/>
+              <a:t>Theories and Assumptions</a:t>
+            </a:r>
+          </a:p>
+          <a:p>
+            <a:r>
+              <a:rPr lang="en-US" dirty="0" smtClean="0"/>
+              <a:t>Runners: Behind the Music</a:t>
+            </a:r>
+            <a:endParaRPr lang="en-US" dirty="0"/>
+          </a:p>
+        </p:txBody>
+      </p:sp>
+    </p:spTree>
+    <p:extLst>
+      <p:ext uri="{BB962C8B-B14F-4D97-AF65-F5344CB8AC3E}">
+        <p14:creationId xmlns:p14="http://schemas.microsoft.com/office/powerpoint/2010/main" val="938692618"/>
+      </p:ext>
+    </p:extLst>
+  </p:cSld>
+  <p:clrMapOvr>
+    <a:masterClrMapping/>
+  </p:clrMapOvr>
+</p:sld>
+</file>
+
+<file path=ppt/slides/slide3.xml><?xml version="1.0" encoding="utf-8"?>
+<p:sld xmlns:a="http://schemas.openxmlformats.org/drawingml/2006/main" xmlns:r="http://schemas.openxmlformats.org/officeDocument/2006/relationships" xmlns:p="http://schemas.openxmlformats.org/presentationml/2006/main">
+  <p:cSld>
+    <p:spTree>
+      <p:nvGrpSpPr>
+        <p:cNvPr id="1" name=""/>
+        <p:cNvGrpSpPr/>
+        <p:nvPr/>
+      </p:nvGrpSpPr>
+      <p:grpSpPr>
+        <a:xfrm>
+          <a:off x="0" y="0"/>
+          <a:ext cx="0" cy="0"/>
+          <a:chOff x="0" y="0"/>
+          <a:chExt cx="0" cy="0"/>
+        </a:xfrm>
+      </p:grpSpPr>
+      <p:sp>
+        <p:nvSpPr>
+          <p:cNvPr id="2" name="Title 1"/>
+          <p:cNvSpPr>
+            <a:spLocks noGrp="1"/>
+          </p:cNvSpPr>
+          <p:nvPr>
+            <p:ph type="title"/>
+          </p:nvPr>
+        </p:nvSpPr>
+        <p:spPr/>
+        <p:txBody>
+          <a:bodyPr/>
+          <a:lstStyle/>
+          <a:p>
+            <a:r>
+              <a:rPr lang="en-US" dirty="0" smtClean="0"/>
+              <a:t>Philosophies: Keep the Core Small</a:t>
+            </a:r>
+            <a:endParaRPr lang="en-US" dirty="0"/>
+          </a:p>
+        </p:txBody>
+      </p:sp>
+      <p:sp>
+        <p:nvSpPr>
+          <p:cNvPr id="3" name="Content Placeholder 2"/>
+          <p:cNvSpPr>
+            <a:spLocks noGrp="1"/>
+          </p:cNvSpPr>
+          <p:nvPr>
+            <p:ph idx="1"/>
+          </p:nvPr>
+        </p:nvSpPr>
+        <p:spPr/>
+        <p:txBody>
+          <a:bodyPr/>
+          <a:lstStyle/>
+          <a:p>
+            <a:r>
+              <a:rPr lang="en-US" dirty="0"/>
+              <a:t>A framework that you have to rework every time something new comes along isn't much </a:t>
+            </a:r>
+            <a:r>
+              <a:rPr lang="en-US" dirty="0" smtClean="0"/>
+              <a:t>of a framework.</a:t>
+            </a:r>
+          </a:p>
+          <a:p>
+            <a:r>
+              <a:rPr lang="en-US" dirty="0"/>
+              <a:t>You want degrees of freedom where you know you need them, and nowhere </a:t>
+            </a:r>
+            <a:r>
+              <a:rPr lang="en-US" dirty="0" smtClean="0"/>
+              <a:t>else.</a:t>
+            </a:r>
+            <a:endParaRPr lang="en-US" dirty="0"/>
+          </a:p>
+        </p:txBody>
+      </p:sp>
+    </p:spTree>
+    <p:extLst>
+      <p:ext uri="{BB962C8B-B14F-4D97-AF65-F5344CB8AC3E}">
+        <p14:creationId xmlns:p14="http://schemas.microsoft.com/office/powerpoint/2010/main" val="3259273908"/>
+      </p:ext>
+    </p:extLst>
+  </p:cSld>
+  <p:clrMapOvr>
+    <a:masterClrMapping/>
+  </p:clrMapOvr>
+</p:sld>
+</file>
+
+<file path=ppt/slides/slide4.xml><?xml version="1.0" encoding="utf-8"?>
+<p:sld xmlns:a="http://schemas.openxmlformats.org/drawingml/2006/main" xmlns:r="http://schemas.openxmlformats.org/officeDocument/2006/relationships" xmlns:p="http://schemas.openxmlformats.org/presentationml/2006/main">
+  <p:cSld>
+    <p:spTree>
+      <p:nvGrpSpPr>
+        <p:cNvPr id="1" name=""/>
+        <p:cNvGrpSpPr/>
+        <p:nvPr/>
+      </p:nvGrpSpPr>
+      <p:grpSpPr>
+        <a:xfrm>
+          <a:off x="0" y="0"/>
+          <a:ext cx="0" cy="0"/>
+          <a:chOff x="0" y="0"/>
+          <a:chExt cx="0" cy="0"/>
+        </a:xfrm>
+      </p:grpSpPr>
+      <p:sp>
+        <p:nvSpPr>
+          <p:cNvPr id="2" name="Title 1"/>
+          <p:cNvSpPr>
+            <a:spLocks noGrp="1"/>
+          </p:cNvSpPr>
+          <p:nvPr>
+            <p:ph type="title"/>
+          </p:nvPr>
+        </p:nvSpPr>
+        <p:spPr/>
+        <p:txBody>
+          <a:bodyPr/>
+          <a:lstStyle/>
+          <a:p>
+            <a:r>
+              <a:rPr lang="en-US" dirty="0" smtClean="0"/>
+              <a:t>Philosophies: Tests</a:t>
+            </a:r>
+            <a:endParaRPr lang="en-US" dirty="0"/>
+          </a:p>
+        </p:txBody>
+      </p:sp>
+      <p:sp>
+        <p:nvSpPr>
+          <p:cNvPr id="3" name="Content Placeholder 2"/>
+          <p:cNvSpPr>
+            <a:spLocks noGrp="1"/>
+          </p:cNvSpPr>
+          <p:nvPr>
+            <p:ph idx="1"/>
+          </p:nvPr>
+        </p:nvSpPr>
+        <p:spPr/>
+        <p:txBody>
+          <a:bodyPr/>
+          <a:lstStyle/>
+          <a:p>
+            <a:r>
+              <a:rPr lang="en-US" dirty="0" smtClean="0"/>
+              <a:t>Small, focused</a:t>
+            </a:r>
+          </a:p>
+          <a:p>
+            <a:r>
+              <a:rPr lang="en-US" dirty="0" smtClean="0"/>
+              <a:t>Fast (</a:t>
+            </a:r>
+            <a:r>
+              <a:rPr lang="en-US" dirty="0" err="1" smtClean="0"/>
+              <a:t>nK</a:t>
+            </a:r>
+            <a:r>
+              <a:rPr lang="en-US" dirty="0" smtClean="0"/>
+              <a:t>/sec)</a:t>
+            </a:r>
+          </a:p>
+          <a:p>
+            <a:r>
+              <a:rPr lang="en-US" dirty="0" smtClean="0"/>
+              <a:t>Isolated</a:t>
+            </a:r>
+          </a:p>
+          <a:p>
+            <a:r>
+              <a:rPr lang="en-US" dirty="0" smtClean="0"/>
+              <a:t>Order-independent</a:t>
+            </a:r>
+          </a:p>
+          <a:p>
+            <a:r>
+              <a:rPr lang="en-US" dirty="0" smtClean="0"/>
+              <a:t>Repeatable</a:t>
+            </a:r>
+          </a:p>
+          <a:p>
+            <a:r>
+              <a:rPr lang="en-US" dirty="0" smtClean="0"/>
+              <a:t>One reason to fail</a:t>
+            </a:r>
+          </a:p>
+          <a:p>
+            <a:r>
+              <a:rPr lang="en-US" dirty="0" smtClean="0"/>
+              <a:t>Clearly, concisely communicate intent</a:t>
+            </a:r>
+          </a:p>
+        </p:txBody>
+      </p:sp>
+    </p:spTree>
+    <p:extLst>
+      <p:ext uri="{BB962C8B-B14F-4D97-AF65-F5344CB8AC3E}">
+        <p14:creationId xmlns:p14="http://schemas.microsoft.com/office/powerpoint/2010/main" val="1788189544"/>
+      </p:ext>
+    </p:extLst>
+  </p:cSld>
+  <p:clrMapOvr>
+    <a:masterClrMapping/>
+  </p:clrMapOvr>
+</p:sld>
+</file>
+
+<file path=ppt/slides/slide5.xml><?xml version="1.0" encoding="utf-8"?>
+<p:sld xmlns:a="http://schemas.openxmlformats.org/drawingml/2006/main" xmlns:r="http://schemas.openxmlformats.org/officeDocument/2006/relationships" xmlns:p="http://schemas.openxmlformats.org/presentationml/2006/main">
+  <p:cSld>
+    <p:spTree>
+      <p:nvGrpSpPr>
+        <p:cNvPr id="1" name=""/>
+        <p:cNvGrpSpPr/>
+        <p:nvPr/>
+      </p:nvGrpSpPr>
+      <p:grpSpPr>
+        <a:xfrm>
+          <a:off x="0" y="0"/>
+          <a:ext cx="0" cy="0"/>
+          <a:chOff x="0" y="0"/>
+          <a:chExt cx="0" cy="0"/>
+        </a:xfrm>
+      </p:grpSpPr>
+      <p:sp>
+        <p:nvSpPr>
+          <p:cNvPr id="2" name="Title 1"/>
+          <p:cNvSpPr>
+            <a:spLocks noGrp="1"/>
+          </p:cNvSpPr>
+          <p:nvPr>
+            <p:ph type="title"/>
+          </p:nvPr>
+        </p:nvSpPr>
+        <p:spPr/>
+        <p:txBody>
+          <a:bodyPr/>
+          <a:lstStyle/>
+          <a:p>
+            <a:r>
+              <a:rPr lang="en-US" dirty="0" smtClean="0"/>
+              <a:t>From JUnit 3 to JUnit 4</a:t>
+            </a:r>
+            <a:endParaRPr lang="en-US" dirty="0"/>
+          </a:p>
+        </p:txBody>
+      </p:sp>
+      <p:sp>
+        <p:nvSpPr>
+          <p:cNvPr id="3" name="Content Placeholder 2"/>
+          <p:cNvSpPr>
+            <a:spLocks noGrp="1"/>
+          </p:cNvSpPr>
+          <p:nvPr>
+            <p:ph idx="1"/>
+          </p:nvPr>
+        </p:nvSpPr>
+        <p:spPr/>
+        <p:txBody>
+          <a:bodyPr/>
+          <a:lstStyle/>
+          <a:p>
+            <a:r>
+              <a:rPr lang="en-US" dirty="0" err="1" smtClean="0">
+                <a:latin typeface="Courier New"/>
+                <a:cs typeface="Courier New"/>
+              </a:rPr>
+              <a:t>TestCase</a:t>
+            </a:r>
+            <a:r>
+              <a:rPr lang="en-US" dirty="0" smtClean="0"/>
+              <a:t> subclass </a:t>
+            </a:r>
+            <a:r>
+              <a:rPr lang="en-US" dirty="0" smtClean="0">
+                <a:sym typeface="Wingdings"/>
+              </a:rPr>
+              <a:t> no common superclass</a:t>
+            </a:r>
+          </a:p>
+          <a:p>
+            <a:r>
+              <a:rPr lang="en-US" dirty="0">
+                <a:latin typeface="Courier New"/>
+                <a:cs typeface="Courier New"/>
+              </a:rPr>
+              <a:t>t</a:t>
+            </a:r>
+            <a:r>
+              <a:rPr lang="en-US" dirty="0" smtClean="0">
+                <a:latin typeface="Courier New"/>
+                <a:cs typeface="Courier New"/>
+              </a:rPr>
+              <a:t>est___()</a:t>
+            </a:r>
+            <a:r>
+              <a:rPr lang="en-US" dirty="0" smtClean="0"/>
+              <a:t> method </a:t>
+            </a:r>
+            <a:r>
+              <a:rPr lang="en-US" dirty="0" smtClean="0">
+                <a:sym typeface="Wingdings"/>
+              </a:rPr>
+              <a:t> method marked </a:t>
+            </a:r>
+            <a:r>
+              <a:rPr lang="en-US" dirty="0" smtClean="0">
+                <a:latin typeface="Courier New"/>
+                <a:cs typeface="Courier New"/>
+                <a:sym typeface="Wingdings"/>
+              </a:rPr>
+              <a:t>@Test</a:t>
+            </a:r>
+            <a:endParaRPr lang="en-US" dirty="0">
+              <a:latin typeface="Courier New"/>
+              <a:cs typeface="Courier New"/>
+              <a:sym typeface="Wingdings"/>
+            </a:endParaRPr>
+          </a:p>
+          <a:p>
+            <a:r>
+              <a:rPr lang="en-US" dirty="0" err="1" smtClean="0">
+                <a:latin typeface="Courier New"/>
+                <a:cs typeface="Courier New"/>
+                <a:sym typeface="Wingdings"/>
+              </a:rPr>
+              <a:t>setUp</a:t>
+            </a:r>
+            <a:r>
+              <a:rPr lang="en-US" dirty="0" smtClean="0">
+                <a:latin typeface="Courier New"/>
+                <a:cs typeface="Courier New"/>
+                <a:sym typeface="Wingdings"/>
+              </a:rPr>
+              <a:t>()/</a:t>
+            </a:r>
+            <a:r>
+              <a:rPr lang="en-US" dirty="0" err="1" smtClean="0">
+                <a:latin typeface="Courier New"/>
+                <a:cs typeface="Courier New"/>
+                <a:sym typeface="Wingdings"/>
+              </a:rPr>
+              <a:t>tearDown</a:t>
+            </a:r>
+            <a:r>
+              <a:rPr lang="en-US" dirty="0" smtClean="0">
+                <a:latin typeface="Courier New"/>
+                <a:cs typeface="Courier New"/>
+                <a:sym typeface="Wingdings"/>
+              </a:rPr>
+              <a:t>()</a:t>
+            </a:r>
+            <a:r>
+              <a:rPr lang="en-US" dirty="0" smtClean="0">
+                <a:cs typeface="Courier New"/>
+                <a:sym typeface="Wingdings"/>
+              </a:rPr>
+              <a:t>  </a:t>
+            </a:r>
+            <a:r>
+              <a:rPr lang="en-US" dirty="0" smtClean="0">
+                <a:latin typeface="Courier New"/>
+                <a:cs typeface="Courier New"/>
+                <a:sym typeface="Wingdings"/>
+              </a:rPr>
+              <a:t>@Before</a:t>
+            </a:r>
+            <a:r>
+              <a:rPr lang="en-US" dirty="0" smtClean="0">
+                <a:cs typeface="Courier New"/>
+                <a:sym typeface="Wingdings"/>
+              </a:rPr>
+              <a:t>/</a:t>
+            </a:r>
+            <a:r>
+              <a:rPr lang="en-US" dirty="0" smtClean="0">
+                <a:latin typeface="Courier New"/>
+                <a:cs typeface="Courier New"/>
+                <a:sym typeface="Wingdings"/>
+              </a:rPr>
+              <a:t>@After</a:t>
+            </a:r>
+          </a:p>
+          <a:p>
+            <a:r>
+              <a:rPr lang="en-US" dirty="0" smtClean="0">
+                <a:cs typeface="Courier New"/>
+                <a:sym typeface="Wingdings"/>
+              </a:rPr>
+              <a:t>Assertions static importable</a:t>
+            </a:r>
+          </a:p>
+          <a:p>
+            <a:r>
+              <a:rPr lang="en-US" dirty="0" err="1" smtClean="0">
+                <a:latin typeface="Courier New"/>
+                <a:cs typeface="Courier New"/>
+                <a:sym typeface="Wingdings"/>
+              </a:rPr>
+              <a:t>junit.framework</a:t>
+            </a:r>
+            <a:r>
+              <a:rPr lang="en-US" dirty="0" smtClean="0">
+                <a:cs typeface="Courier New"/>
+                <a:sym typeface="Wingdings"/>
+              </a:rPr>
+              <a:t>  </a:t>
+            </a:r>
+            <a:r>
+              <a:rPr lang="en-US" dirty="0" err="1" smtClean="0">
+                <a:latin typeface="Courier New"/>
+                <a:cs typeface="Courier New"/>
+                <a:sym typeface="Wingdings"/>
+              </a:rPr>
+              <a:t>org.junit</a:t>
+            </a:r>
+            <a:endParaRPr lang="en-US" dirty="0" smtClean="0">
+              <a:latin typeface="Courier New"/>
+              <a:cs typeface="Courier New"/>
+              <a:sym typeface="Wingdings"/>
+            </a:endParaRPr>
+          </a:p>
+          <a:p>
+            <a:endParaRPr lang="en-US" dirty="0" smtClean="0">
+              <a:cs typeface="Courier New"/>
+              <a:sym typeface="Wingdings"/>
+            </a:endParaRPr>
+          </a:p>
+        </p:txBody>
+      </p:sp>
+    </p:spTree>
+    <p:extLst>
+      <p:ext uri="{BB962C8B-B14F-4D97-AF65-F5344CB8AC3E}">
+        <p14:creationId xmlns:p14="http://schemas.microsoft.com/office/powerpoint/2010/main" val="2899353599"/>
+      </p:ext>
+    </p:extLst>
+  </p:cSld>
+  <p:clrMapOvr>
+    <a:masterClrMapping/>
+  </p:clrMapOvr>
+</p:sld>
+</file>
+
+<file path=ppt/slides/slide6.xml><?xml version="1.0" encoding="utf-8"?>
+<p:sld xmlns:a="http://schemas.openxmlformats.org/drawingml/2006/main" xmlns:r="http://schemas.openxmlformats.org/officeDocument/2006/relationships" xmlns:p="http://schemas.openxmlformats.org/presentationml/2006/main">
+  <p:cSld>
+    <p:spTree>
+      <p:nvGrpSpPr>
+        <p:cNvPr id="1" name=""/>
+        <p:cNvGrpSpPr/>
+        <p:nvPr/>
+      </p:nvGrpSpPr>
+      <p:grpSpPr>
+        <a:xfrm>
+          <a:off x="0" y="0"/>
+          <a:ext cx="0" cy="0"/>
+          <a:chOff x="0" y="0"/>
+          <a:chExt cx="0" cy="0"/>
+        </a:xfrm>
+      </p:grpSpPr>
+      <p:sp>
+        <p:nvSpPr>
+          <p:cNvPr id="2" name="Title 1"/>
+          <p:cNvSpPr>
+            <a:spLocks noGrp="1"/>
+          </p:cNvSpPr>
+          <p:nvPr>
+            <p:ph type="title"/>
+          </p:nvPr>
+        </p:nvSpPr>
+        <p:spPr/>
+        <p:txBody>
+          <a:bodyPr/>
+          <a:lstStyle/>
+          <a:p>
+            <a:r>
+              <a:rPr lang="en-US" dirty="0" smtClean="0"/>
+              <a:t>Assertions</a:t>
+            </a:r>
+            <a:endParaRPr lang="en-US" dirty="0"/>
+          </a:p>
+        </p:txBody>
+      </p:sp>
+      <p:sp>
+        <p:nvSpPr>
+          <p:cNvPr id="3" name="Content Placeholder 2"/>
+          <p:cNvSpPr>
+            <a:spLocks noGrp="1"/>
+          </p:cNvSpPr>
+          <p:nvPr>
+            <p:ph idx="1"/>
+          </p:nvPr>
+        </p:nvSpPr>
+        <p:spPr/>
+        <p:txBody>
+          <a:bodyPr/>
+          <a:lstStyle/>
+          <a:p>
+            <a:r>
+              <a:rPr lang="en-US" dirty="0" smtClean="0">
+                <a:latin typeface="Courier New"/>
+                <a:cs typeface="Courier New"/>
+              </a:rPr>
+              <a:t>assert____([message,] expected, actual)</a:t>
+            </a:r>
+          </a:p>
+          <a:p>
+            <a:r>
+              <a:rPr lang="en-US" dirty="0" smtClean="0"/>
+              <a:t>Equality, nullity, sameness, true/false…</a:t>
+            </a:r>
+          </a:p>
+          <a:p>
+            <a:r>
+              <a:rPr lang="en-US" dirty="0" smtClean="0"/>
+              <a:t>What about </a:t>
+            </a:r>
+            <a:r>
+              <a:rPr lang="en-US" dirty="0" err="1" smtClean="0">
+                <a:latin typeface="Courier New"/>
+                <a:cs typeface="Courier New"/>
+              </a:rPr>
+              <a:t>assertNotEquals</a:t>
+            </a:r>
+            <a:r>
+              <a:rPr lang="en-US" dirty="0" smtClean="0">
+                <a:latin typeface="Courier New"/>
+                <a:cs typeface="Courier New"/>
+              </a:rPr>
+              <a:t>()</a:t>
+            </a:r>
+            <a:r>
+              <a:rPr lang="en-US" dirty="0" smtClean="0"/>
+              <a:t>?</a:t>
+            </a:r>
+          </a:p>
+          <a:p>
+            <a:r>
+              <a:rPr lang="en-US" dirty="0" smtClean="0"/>
+              <a:t>What about arrays?...</a:t>
+            </a:r>
+          </a:p>
+          <a:p>
+            <a:r>
+              <a:rPr lang="en-US" dirty="0" smtClean="0"/>
+              <a:t>Which </a:t>
+            </a:r>
+            <a:r>
+              <a:rPr lang="en-US" dirty="0" err="1" smtClean="0"/>
+              <a:t>arg</a:t>
+            </a:r>
+            <a:r>
+              <a:rPr lang="en-US" dirty="0" smtClean="0"/>
+              <a:t> comes first?</a:t>
+            </a:r>
+          </a:p>
+          <a:p>
+            <a:pPr marL="860425" lvl="3" indent="0">
+              <a:buNone/>
+            </a:pPr>
+            <a:r>
+              <a:rPr lang="en-US" dirty="0" err="1" smtClean="0">
+                <a:latin typeface="Courier New"/>
+                <a:cs typeface="Courier New"/>
+              </a:rPr>
+              <a:t>assertEquals</a:t>
+            </a:r>
+            <a:r>
+              <a:rPr lang="en-US" dirty="0" smtClean="0">
+                <a:latin typeface="Courier New"/>
+                <a:cs typeface="Courier New"/>
+              </a:rPr>
+              <a:t>(</a:t>
+            </a:r>
+            <a:r>
+              <a:rPr lang="en-US" dirty="0" err="1" smtClean="0">
+                <a:latin typeface="Courier New"/>
+                <a:cs typeface="Courier New"/>
+              </a:rPr>
+              <a:t>foo.bar</a:t>
+            </a:r>
+            <a:r>
+              <a:rPr lang="en-US" dirty="0" smtClean="0">
+                <a:latin typeface="Courier New"/>
+                <a:cs typeface="Courier New"/>
+              </a:rPr>
+              <a:t>(), 2);</a:t>
+            </a:r>
+          </a:p>
+        </p:txBody>
+      </p:sp>
+    </p:spTree>
+    <p:extLst>
+      <p:ext uri="{BB962C8B-B14F-4D97-AF65-F5344CB8AC3E}">
+        <p14:creationId xmlns:p14="http://schemas.microsoft.com/office/powerpoint/2010/main" val="3218192193"/>
+      </p:ext>
+    </p:extLst>
+  </p:cSld>
+  <p:clrMapOvr>
+    <a:masterClrMapping/>
+  </p:clrMapOvr>
+</p:sld>
+</file>
+
+<file path=ppt/slides/slide7.xml><?xml version="1.0" encoding="utf-8"?>
+<p:sld xmlns:a="http://schemas.openxmlformats.org/drawingml/2006/main" xmlns:r="http://schemas.openxmlformats.org/officeDocument/2006/relationships" xmlns:p="http://schemas.openxmlformats.org/presentationml/2006/main">
+  <p:cSld>
+    <p:spTree>
+      <p:nvGrpSpPr>
+        <p:cNvPr id="1" name=""/>
+        <p:cNvGrpSpPr/>
+        <p:nvPr/>
+      </p:nvGrpSpPr>
+      <p:grpSpPr>
+        <a:xfrm>
+          <a:off x="0" y="0"/>
+          <a:ext cx="0" cy="0"/>
+          <a:chOff x="0" y="0"/>
+          <a:chExt cx="0" cy="0"/>
+        </a:xfrm>
+      </p:grpSpPr>
+      <p:sp>
+        <p:nvSpPr>
+          <p:cNvPr id="2" name="Title 1"/>
+          <p:cNvSpPr>
+            <a:spLocks noGrp="1"/>
+          </p:cNvSpPr>
+          <p:nvPr>
+            <p:ph type="title"/>
+          </p:nvPr>
+        </p:nvSpPr>
+        <p:spPr/>
+        <p:txBody>
+          <a:bodyPr/>
+          <a:lstStyle/>
+          <a:p>
+            <a:r>
+              <a:rPr lang="en-US" dirty="0" err="1" smtClean="0"/>
+              <a:t>assertThat</a:t>
+            </a:r>
+            <a:r>
+              <a:rPr lang="en-US" dirty="0" smtClean="0"/>
+              <a:t>() + Matchers</a:t>
+            </a:r>
+            <a:endParaRPr lang="en-US" dirty="0"/>
+          </a:p>
+        </p:txBody>
+      </p:sp>
+      <p:sp>
+        <p:nvSpPr>
+          <p:cNvPr id="3" name="Content Placeholder 2"/>
+          <p:cNvSpPr>
+            <a:spLocks noGrp="1"/>
+          </p:cNvSpPr>
+          <p:nvPr>
+            <p:ph idx="1"/>
+          </p:nvPr>
+        </p:nvSpPr>
+        <p:spPr/>
+        <p:txBody>
+          <a:bodyPr/>
+          <a:lstStyle/>
+          <a:p>
+            <a:r>
+              <a:rPr lang="en-US" dirty="0" smtClean="0"/>
+              <a:t>Separate the asserting mechanism from the condition that pops the assertion</a:t>
+            </a:r>
+          </a:p>
+          <a:p>
+            <a:pPr marL="0" indent="0">
+              <a:buNone/>
+            </a:pPr>
+            <a:r>
+              <a:rPr lang="en-US" sz="1800" dirty="0" smtClean="0">
+                <a:latin typeface="Courier New"/>
+                <a:cs typeface="Courier New"/>
+              </a:rPr>
+              <a:t>   </a:t>
+            </a:r>
+            <a:r>
+              <a:rPr lang="en-US" sz="1800" dirty="0" err="1" smtClean="0">
+                <a:latin typeface="Courier New"/>
+                <a:cs typeface="Courier New"/>
+              </a:rPr>
+              <a:t>assertThat</a:t>
+            </a:r>
+            <a:r>
+              <a:rPr lang="en-US" sz="1800" dirty="0" smtClean="0">
+                <a:latin typeface="Courier New"/>
+                <a:cs typeface="Courier New"/>
+              </a:rPr>
+              <a:t>(T actual, Matcher&lt;? super T&gt; matcher)</a:t>
+            </a:r>
+          </a:p>
+          <a:p>
+            <a:pPr marL="0" indent="0">
+              <a:buNone/>
+            </a:pPr>
+            <a:r>
+              <a:rPr lang="en-US" dirty="0">
+                <a:cs typeface="Courier New"/>
+              </a:rPr>
+              <a:t> </a:t>
+            </a:r>
+            <a:r>
+              <a:rPr lang="en-US" dirty="0" smtClean="0">
+                <a:cs typeface="Courier New"/>
+              </a:rPr>
+              <a:t>   where</a:t>
+            </a:r>
+          </a:p>
+          <a:p>
+            <a:pPr marL="0" indent="0">
+              <a:lnSpc>
+                <a:spcPct val="50000"/>
+              </a:lnSpc>
+              <a:buNone/>
+            </a:pPr>
+            <a:r>
+              <a:rPr lang="en-US" dirty="0">
+                <a:cs typeface="Courier New"/>
+              </a:rPr>
+              <a:t> </a:t>
+            </a:r>
+            <a:r>
+              <a:rPr lang="en-US" dirty="0" smtClean="0">
+                <a:cs typeface="Courier New"/>
+              </a:rPr>
+              <a:t>   </a:t>
+            </a:r>
+            <a:r>
+              <a:rPr lang="en-US" dirty="0" smtClean="0">
+                <a:latin typeface="Courier New"/>
+                <a:cs typeface="Courier New"/>
+              </a:rPr>
+              <a:t>interface Matcher&lt;T&gt; {</a:t>
+            </a:r>
+          </a:p>
+          <a:p>
+            <a:pPr marL="0" indent="0">
+              <a:lnSpc>
+                <a:spcPct val="50000"/>
+              </a:lnSpc>
+              <a:buNone/>
+            </a:pPr>
+            <a:r>
+              <a:rPr lang="en-US" dirty="0">
+                <a:latin typeface="Courier New"/>
+                <a:cs typeface="Courier New"/>
+              </a:rPr>
+              <a:t> </a:t>
+            </a:r>
+            <a:r>
+              <a:rPr lang="en-US" dirty="0" smtClean="0">
+                <a:latin typeface="Courier New"/>
+                <a:cs typeface="Courier New"/>
+              </a:rPr>
+              <a:t> </a:t>
+            </a:r>
+            <a:r>
+              <a:rPr lang="en-US" dirty="0">
+                <a:latin typeface="Courier New"/>
+                <a:cs typeface="Courier New"/>
+              </a:rPr>
+              <a:t> </a:t>
+            </a:r>
+            <a:r>
+              <a:rPr lang="en-US" dirty="0" smtClean="0">
+                <a:latin typeface="Courier New"/>
+                <a:cs typeface="Courier New"/>
+              </a:rPr>
+              <a:t>   </a:t>
+            </a:r>
+            <a:r>
+              <a:rPr lang="en-US" dirty="0" err="1" smtClean="0">
+                <a:latin typeface="Courier New"/>
+                <a:cs typeface="Courier New"/>
+              </a:rPr>
+              <a:t>boolean</a:t>
+            </a:r>
+            <a:r>
+              <a:rPr lang="en-US" dirty="0" smtClean="0">
+                <a:latin typeface="Courier New"/>
+                <a:cs typeface="Courier New"/>
+              </a:rPr>
+              <a:t> matches(Object actual);</a:t>
+            </a:r>
+          </a:p>
+          <a:p>
+            <a:pPr marL="0" indent="0">
+              <a:lnSpc>
+                <a:spcPct val="50000"/>
+              </a:lnSpc>
+              <a:buNone/>
+            </a:pPr>
+            <a:r>
+              <a:rPr lang="en-US" dirty="0">
+                <a:latin typeface="Courier New"/>
+                <a:cs typeface="Courier New"/>
+              </a:rPr>
+              <a:t> </a:t>
+            </a:r>
+            <a:r>
+              <a:rPr lang="en-US" dirty="0" smtClean="0">
+                <a:latin typeface="Courier New"/>
+                <a:cs typeface="Courier New"/>
+              </a:rPr>
+              <a:t> }</a:t>
+            </a:r>
+          </a:p>
+          <a:p>
+            <a:r>
+              <a:rPr lang="en-US" dirty="0" err="1" smtClean="0">
+                <a:cs typeface="Courier New"/>
+              </a:rPr>
+              <a:t>Hamcrest</a:t>
+            </a:r>
+            <a:endParaRPr lang="en-US" dirty="0">
+              <a:cs typeface="Courier New"/>
+            </a:endParaRPr>
+          </a:p>
+        </p:txBody>
+      </p:sp>
+    </p:spTree>
+    <p:extLst>
+      <p:ext uri="{BB962C8B-B14F-4D97-AF65-F5344CB8AC3E}">
+        <p14:creationId xmlns:p14="http://schemas.microsoft.com/office/powerpoint/2010/main" val="2674528357"/>
+      </p:ext>
+    </p:extLst>
+  </p:cSld>
+  <p:clrMapOvr>
+    <a:masterClrMapping/>
+  </p:clrMapOvr>
+</p:sld>
+</file>
+
+<file path=ppt/slides/slide8.xml><?xml version="1.0" encoding="utf-8"?>
+<p:sld xmlns:a="http://schemas.openxmlformats.org/drawingml/2006/main" xmlns:r="http://schemas.openxmlformats.org/officeDocument/2006/relationships" xmlns:p="http://schemas.openxmlformats.org/presentationml/2006/main">
+  <p:cSld>
+    <p:spTree>
+      <p:nvGrpSpPr>
+        <p:cNvPr id="1" name=""/>
+        <p:cNvGrpSpPr/>
+        <p:nvPr/>
+      </p:nvGrpSpPr>
+      <p:grpSpPr>
+        <a:xfrm>
+          <a:off x="0" y="0"/>
+          <a:ext cx="0" cy="0"/>
+          <a:chOff x="0" y="0"/>
+          <a:chExt cx="0" cy="0"/>
+        </a:xfrm>
+      </p:grpSpPr>
+      <p:sp>
+        <p:nvSpPr>
+          <p:cNvPr id="2" name="Title 1"/>
+          <p:cNvSpPr>
+            <a:spLocks noGrp="1"/>
+          </p:cNvSpPr>
+          <p:nvPr>
+            <p:ph type="title"/>
+          </p:nvPr>
+        </p:nvSpPr>
+        <p:spPr/>
+        <p:txBody>
+          <a:bodyPr/>
+          <a:lstStyle/>
+          <a:p>
+            <a:r>
+              <a:rPr lang="en-US" dirty="0" smtClean="0"/>
+              <a:t>Example: Palindromes</a:t>
+            </a:r>
+            <a:endParaRPr lang="en-US" dirty="0"/>
+          </a:p>
+        </p:txBody>
+      </p:sp>
+      <p:sp>
+        <p:nvSpPr>
+          <p:cNvPr id="3" name="Content Placeholder 2"/>
+          <p:cNvSpPr>
+            <a:spLocks noGrp="1"/>
+          </p:cNvSpPr>
+          <p:nvPr>
+            <p:ph idx="1"/>
+          </p:nvPr>
+        </p:nvSpPr>
+        <p:spPr/>
+        <p:txBody>
+          <a:bodyPr/>
+          <a:lstStyle/>
+          <a:p>
+            <a:pPr marL="0" indent="0">
+              <a:buNone/>
+            </a:pPr>
+            <a:endParaRPr lang="en-US" dirty="0"/>
+          </a:p>
+        </p:txBody>
+      </p:sp>
+    </p:spTree>
+    <p:extLst>
+      <p:ext uri="{BB962C8B-B14F-4D97-AF65-F5344CB8AC3E}">
+        <p14:creationId xmlns:p14="http://schemas.microsoft.com/office/powerpoint/2010/main" val="1579463657"/>
+      </p:ext>
+    </p:extLst>
+  </p:cSld>
+  <p:clrMapOvr>
+    <a:masterClrMapping/>
+  </p:clrMapOvr>
+</p:sld>
+</file>
+
+<file path=ppt/slides/slide9.xml><?xml version="1.0" encoding="utf-8"?>
+<p:sld xmlns:a="http://schemas.openxmlformats.org/drawingml/2006/main" xmlns:r="http://schemas.openxmlformats.org/officeDocument/2006/relationships" xmlns:p="http://schemas.openxmlformats.org/presentationml/2006/main">
+  <p:cSld>
+    <p:spTree>
+      <p:nvGrpSpPr>
+        <p:cNvPr id="1" name=""/>
+        <p:cNvGrpSpPr/>
+        <p:nvPr/>
+      </p:nvGrpSpPr>
+      <p:grpSpPr>
+        <a:xfrm>
+          <a:off x="0" y="0"/>
+          <a:ext cx="0" cy="0"/>
+          <a:chOff x="0" y="0"/>
+          <a:chExt cx="0" cy="0"/>
+        </a:xfrm>
+      </p:grpSpPr>
+      <p:sp>
+        <p:nvSpPr>
+          <p:cNvPr id="2" name="Title 1"/>
+          <p:cNvSpPr>
+            <a:spLocks noGrp="1"/>
+          </p:cNvSpPr>
+          <p:nvPr>
+            <p:ph type="title"/>
+          </p:nvPr>
+        </p:nvSpPr>
+        <p:spPr/>
+        <p:txBody>
+          <a:bodyPr/>
+          <a:lstStyle/>
+          <a:p>
+            <a:r>
+              <a:rPr lang="en-US" dirty="0" smtClean="0"/>
+              <a:t>Example: Collection contents</a:t>
+            </a:r>
+            <a:endParaRPr lang="en-US" dirty="0"/>
+          </a:p>
+        </p:txBody>
+      </p:sp>
+      <p:sp>
+        <p:nvSpPr>
+          <p:cNvPr id="3" name="Content Placeholder 2"/>
+          <p:cNvSpPr>
+            <a:spLocks noGrp="1"/>
+          </p:cNvSpPr>
+          <p:nvPr>
+            <p:ph idx="1"/>
+          </p:nvPr>
+        </p:nvSpPr>
+        <p:spPr/>
+        <p:txBody>
+          <a:bodyPr/>
+          <a:lstStyle/>
+          <a:p>
+            <a:pPr marL="0" indent="0">
+              <a:buNone/>
+            </a:pPr>
+            <a:endParaRPr lang="en-US" dirty="0"/>
+          </a:p>
+        </p:txBody>
+      </p:sp>
+    </p:spTree>
+    <p:extLst>
+      <p:ext uri="{BB962C8B-B14F-4D97-AF65-F5344CB8AC3E}">
+        <p14:creationId xmlns:p14="http://schemas.microsoft.com/office/powerpoint/2010/main" val="1010526997"/>
       </p:ext>
     </p:extLst>
   </p:cSld>
@@ -5733,4 +8049,324 @@
   </a:objectDefaults>
   <a:extraClrSchemeLst/>
 </a:theme>
+</file>
+
+<file path=ppt/theme/theme2.xml><?xml version="1.0" encoding="utf-8"?>
+<a:theme xmlns:a="http://schemas.openxmlformats.org/drawingml/2006/main" name="Office Theme">
+  <a:themeElements>
+    <a:clrScheme name="Office">
+      <a:dk1>
+        <a:sysClr val="windowText" lastClr="000000"/>
+      </a:dk1>
+      <a:lt1>
+        <a:sysClr val="window" lastClr="FFFFFF"/>
+      </a:lt1>
+      <a:dk2>
+        <a:srgbClr val="1F497D"/>
+      </a:dk2>
+      <a:lt2>
+        <a:srgbClr val="EEECE1"/>
+      </a:lt2>
+      <a:accent1>
+        <a:srgbClr val="4F81BD"/>
+      </a:accent1>
+      <a:accent2>
+        <a:srgbClr val="C0504D"/>
+      </a:accent2>
+      <a:accent3>
+        <a:srgbClr val="9BBB59"/>
+      </a:accent3>
+      <a:accent4>
+        <a:srgbClr val="8064A2"/>
+      </a:accent4>
+      <a:accent5>
+        <a:srgbClr val="4BACC6"/>
+      </a:accent5>
+      <a:accent6>
+        <a:srgbClr val="F79646"/>
+      </a:accent6>
+      <a:hlink>
+        <a:srgbClr val="0000FF"/>
+      </a:hlink>
+      <a:folHlink>
+        <a:srgbClr val="800080"/>
+      </a:folHlink>
+    </a:clrScheme>
+    <a:fontScheme name="Office">
+      <a:majorFont>
+        <a:latin typeface="Calibri"/>
+        <a:ea typeface=""/>
+        <a:cs typeface=""/>
+        <a:font script="Jpan" typeface="ＭＳ Ｐゴシック"/>
+        <a:font script="Hang" typeface="맑은 고딕"/>
+        <a:font script="Hans" typeface="宋体"/>
+        <a:font script="Hant" typeface="新細明體"/>
+        <a:font script="Arab" typeface="Times New Roman"/>
+        <a:font script="Hebr" typeface="Times New Roman"/>
+        <a:font script="Thai" typeface="Angsana New"/>
+        <a:font script="Ethi" typeface="Nyala"/>
+        <a:font script="Beng" typeface="Vrinda"/>
+        <a:font script="Gujr" typeface="Shruti"/>
+        <a:font script="Khmr" typeface="MoolBoran"/>
+        <a:font script="Knda" typeface="Tunga"/>
+        <a:font script="Guru" typeface="Raavi"/>
+        <a:font script="Cans" typeface="Euphemia"/>
+        <a:font script="Cher" typeface="Plantagenet Cherokee"/>
+        <a:font script="Yiii" typeface="Microsoft Yi Baiti"/>
+        <a:font script="Tibt" typeface="Microsoft Himalaya"/>
+        <a:font script="Thaa" typeface="MV Boli"/>
+        <a:font script="Deva" typeface="Mangal"/>
+        <a:font script="Telu" typeface="Gautami"/>
+        <a:font script="Taml" typeface="Latha"/>
+        <a:font script="Syrc" typeface="Estrangelo Edessa"/>
+        <a:font script="Orya" typeface="Kalinga"/>
+        <a:font script="Mlym" typeface="Kartika"/>
+        <a:font script="Laoo" typeface="DokChampa"/>
+        <a:font script="Sinh" typeface="Iskoola Pota"/>
+        <a:font script="Mong" typeface="Mongolian Baiti"/>
+        <a:font script="Viet" typeface="Times New Roman"/>
+        <a:font script="Uigh" typeface="Microsoft Uighur"/>
+        <a:font script="Geor" typeface="Sylfaen"/>
+      </a:majorFont>
+      <a:minorFont>
+        <a:latin typeface="Calibri"/>
+        <a:ea typeface=""/>
+        <a:cs typeface=""/>
+        <a:font script="Jpan" typeface="ＭＳ Ｐゴシック"/>
+        <a:font script="Hang" typeface="맑은 고딕"/>
+        <a:font script="Hans" typeface="宋体"/>
+        <a:font script="Hant" typeface="新細明體"/>
+        <a:font script="Arab" typeface="Arial"/>
+        <a:font script="Hebr" typeface="Arial"/>
+        <a:font script="Thai" typeface="Cordia New"/>
+        <a:font script="Ethi" typeface="Nyala"/>
+        <a:font script="Beng" typeface="Vrinda"/>
+        <a:font script="Gujr" typeface="Shruti"/>
+        <a:font script="Khmr" typeface="DaunPenh"/>
+        <a:font script="Knda" typeface="Tunga"/>
+        <a:font script="Guru" typeface="Raavi"/>
+        <a:font script="Cans" typeface="Euphemia"/>
+        <a:font script="Cher" typeface="Plantagenet Cherokee"/>
+        <a:font script="Yiii" typeface="Microsoft Yi Baiti"/>
+        <a:font script="Tibt" typeface="Microsoft Himalaya"/>
+        <a:font script="Thaa" typeface="MV Boli"/>
+        <a:font script="Deva" typeface="Mangal"/>
+        <a:font script="Telu" typeface="Gautami"/>
+        <a:font script="Taml" typeface="Latha"/>
+        <a:font script="Syrc" typeface="Estrangelo Edessa"/>
+        <a:font script="Orya" typeface="Kalinga"/>
+        <a:font script="Mlym" typeface="Kartika"/>
+        <a:font script="Laoo" typeface="DokChampa"/>
+        <a:font script="Sinh" typeface="Iskoola Pota"/>
+        <a:font script="Mong" typeface="Mongolian Baiti"/>
+        <a:font script="Viet" typeface="Arial"/>
+        <a:font script="Uigh" typeface="Microsoft Uighur"/>
+        <a:font script="Geor" typeface="Sylfaen"/>
+      </a:minorFont>
+    </a:fontScheme>
+    <a:fmtScheme name="Office">
+      <a:fillStyleLst>
+        <a:solidFill>
+          <a:schemeClr val="phClr"/>
+        </a:solidFill>
+        <a:gradFill rotWithShape="1">
+          <a:gsLst>
+            <a:gs pos="0">
+              <a:schemeClr val="phClr">
+                <a:tint val="50000"/>
+                <a:satMod val="300000"/>
+              </a:schemeClr>
+            </a:gs>
+            <a:gs pos="35000">
+              <a:schemeClr val="phClr">
+                <a:tint val="37000"/>
+                <a:satMod val="300000"/>
+              </a:schemeClr>
+            </a:gs>
+            <a:gs pos="100000">
+              <a:schemeClr val="phClr">
+                <a:tint val="15000"/>
+                <a:satMod val="350000"/>
+              </a:schemeClr>
+            </a:gs>
+          </a:gsLst>
+          <a:lin ang="16200000" scaled="1"/>
+        </a:gradFill>
+        <a:gradFill rotWithShape="1">
+          <a:gsLst>
+            <a:gs pos="0">
+              <a:schemeClr val="phClr">
+                <a:tint val="100000"/>
+                <a:shade val="100000"/>
+                <a:satMod val="130000"/>
+              </a:schemeClr>
+            </a:gs>
+            <a:gs pos="100000">
+              <a:schemeClr val="phClr">
+                <a:tint val="50000"/>
+                <a:shade val="100000"/>
+                <a:satMod val="350000"/>
+              </a:schemeClr>
+            </a:gs>
+          </a:gsLst>
+          <a:lin ang="16200000" scaled="0"/>
+        </a:gradFill>
+      </a:fillStyleLst>
+      <a:lnStyleLst>
+        <a:ln w="9525" cap="flat" cmpd="sng" algn="ctr">
+          <a:solidFill>
+            <a:schemeClr val="phClr">
+              <a:shade val="95000"/>
+              <a:satMod val="105000"/>
+            </a:schemeClr>
+          </a:solidFill>
+          <a:prstDash val="solid"/>
+        </a:ln>
+        <a:ln w="25400" cap="flat" cmpd="sng" algn="ctr">
+          <a:solidFill>
+            <a:schemeClr val="phClr"/>
+          </a:solidFill>
+          <a:prstDash val="solid"/>
+        </a:ln>
+        <a:ln w="38100" cap="flat" cmpd="sng" algn="ctr">
+          <a:solidFill>
+            <a:schemeClr val="phClr"/>
+          </a:solidFill>
+          <a:prstDash val="solid"/>
+        </a:ln>
+      </a:lnStyleLst>
+      <a:effectStyleLst>
+        <a:effectStyle>
+          <a:effectLst>
+            <a:outerShdw blurRad="40000" dist="20000" dir="5400000" rotWithShape="0">
+              <a:srgbClr val="000000">
+                <a:alpha val="38000"/>
+              </a:srgbClr>
+            </a:outerShdw>
+          </a:effectLst>
+        </a:effectStyle>
+        <a:effectStyle>
+          <a:effectLst>
+            <a:outerShdw blurRad="40000" dist="23000" dir="5400000" rotWithShape="0">
+              <a:srgbClr val="000000">
+                <a:alpha val="35000"/>
+              </a:srgbClr>
+            </a:outerShdw>
+          </a:effectLst>
+        </a:effectStyle>
+        <a:effectStyle>
+          <a:effectLst>
+            <a:outerShdw blurRad="40000" dist="23000" dir="5400000" rotWithShape="0">
+              <a:srgbClr val="000000">
+                <a:alpha val="35000"/>
+              </a:srgbClr>
+            </a:outerShdw>
+          </a:effectLst>
+          <a:scene3d>
+            <a:camera prst="orthographicFront">
+              <a:rot lat="0" lon="0" rev="0"/>
+            </a:camera>
+            <a:lightRig rig="threePt" dir="t">
+              <a:rot lat="0" lon="0" rev="1200000"/>
+            </a:lightRig>
+          </a:scene3d>
+          <a:sp3d>
+            <a:bevelT w="63500" h="25400"/>
+          </a:sp3d>
+        </a:effectStyle>
+      </a:effectStyleLst>
+      <a:bgFillStyleLst>
+        <a:solidFill>
+          <a:schemeClr val="phClr"/>
+        </a:solidFill>
+        <a:gradFill rotWithShape="1">
+          <a:gsLst>
+            <a:gs pos="0">
+              <a:schemeClr val="phClr">
+                <a:tint val="40000"/>
+                <a:satMod val="350000"/>
+              </a:schemeClr>
+            </a:gs>
+            <a:gs pos="40000">
+              <a:schemeClr val="phClr">
+                <a:tint val="45000"/>
+                <a:shade val="99000"/>
+                <a:satMod val="350000"/>
+              </a:schemeClr>
+            </a:gs>
+            <a:gs pos="100000">
+              <a:schemeClr val="phClr">
+                <a:shade val="20000"/>
+                <a:satMod val="255000"/>
+              </a:schemeClr>
+            </a:gs>
+          </a:gsLst>
+          <a:path path="circle">
+            <a:fillToRect l="50000" t="-80000" r="50000" b="180000"/>
+          </a:path>
+        </a:gradFill>
+        <a:gradFill rotWithShape="1">
+          <a:gsLst>
+            <a:gs pos="0">
+              <a:schemeClr val="phClr">
+                <a:tint val="80000"/>
+                <a:satMod val="300000"/>
+              </a:schemeClr>
+            </a:gs>
+            <a:gs pos="100000">
+              <a:schemeClr val="phClr">
+                <a:shade val="30000"/>
+                <a:satMod val="200000"/>
+              </a:schemeClr>
+            </a:gs>
+          </a:gsLst>
+          <a:path path="circle">
+            <a:fillToRect l="50000" t="50000" r="50000" b="50000"/>
+          </a:path>
+        </a:gradFill>
+      </a:bgFillStyleLst>
+    </a:fmtScheme>
+  </a:themeElements>
+  <a:objectDefaults>
+    <a:spDef>
+      <a:spPr/>
+      <a:bodyPr/>
+      <a:lstStyle/>
+      <a:style>
+        <a:lnRef idx="1">
+          <a:schemeClr val="accent1"/>
+        </a:lnRef>
+        <a:fillRef idx="3">
+          <a:schemeClr val="accent1"/>
+        </a:fillRef>
+        <a:effectRef idx="2">
+          <a:schemeClr val="accent1"/>
+        </a:effectRef>
+        <a:fontRef idx="minor">
+          <a:schemeClr val="lt1"/>
+        </a:fontRef>
+      </a:style>
+    </a:spDef>
+    <a:lnDef>
+      <a:spPr/>
+      <a:bodyPr/>
+      <a:lstStyle/>
+      <a:style>
+        <a:lnRef idx="2">
+          <a:schemeClr val="accent1"/>
+        </a:lnRef>
+        <a:fillRef idx="0">
+          <a:schemeClr val="accent1"/>
+        </a:fillRef>
+        <a:effectRef idx="1">
+          <a:schemeClr val="accent1"/>
+        </a:effectRef>
+        <a:fontRef idx="minor">
+          <a:schemeClr val="tx1"/>
+        </a:fontRef>
+      </a:style>
+    </a:lnDef>
+  </a:objectDefaults>
+  <a:extraClrSchemeLst/>
+</a:theme>
 </file>
</xml_diff>

<commit_message>
remove outline; slide tweaks
</commit_message>
<xml_diff>
--- a/bending-junit.pptx
+++ b/bending-junit.pptx
@@ -8727,7 +8727,7 @@
           <a:lstStyle/>
           <a:p>
             <a:r>
-              <a:rPr lang="en-US" smtClean="0"/>
+              <a:rPr lang="en-US" dirty="0" smtClean="0"/>
               <a:t>Paul Holser</a:t>
             </a:r>
           </a:p>
@@ -8760,6 +8760,13 @@
   <p:clrMapOvr>
     <a:masterClrMapping/>
   </p:clrMapOvr>
+  <p:timing>
+    <p:tnLst>
+      <p:par>
+        <p:cTn xmlns:p14="http://schemas.microsoft.com/office/powerpoint/2010/main" id="1" dur="indefinite" restart="never" nodeType="tmRoot"/>
+      </p:par>
+    </p:tnLst>
+  </p:timing>
 </p:sld>
 </file>
 
@@ -8895,6 +8902,13 @@
   <p:clrMapOvr>
     <a:masterClrMapping/>
   </p:clrMapOvr>
+  <p:timing>
+    <p:tnLst>
+      <p:par>
+        <p:cTn xmlns:p14="http://schemas.microsoft.com/office/powerpoint/2010/main" id="1" dur="indefinite" restart="never" nodeType="tmRoot"/>
+      </p:par>
+    </p:tnLst>
+  </p:timing>
 </p:sld>
 </file>
 
@@ -9171,6 +9185,13 @@
   <p:clrMapOvr>
     <a:masterClrMapping/>
   </p:clrMapOvr>
+  <p:timing>
+    <p:tnLst>
+      <p:par>
+        <p:cTn xmlns:p14="http://schemas.microsoft.com/office/powerpoint/2010/main" id="1" dur="indefinite" restart="never" nodeType="tmRoot"/>
+      </p:par>
+    </p:tnLst>
+  </p:timing>
 </p:sld>
 </file>
 
@@ -9227,7 +9248,7 @@
         <p:spPr/>
         <p:txBody>
           <a:bodyPr>
-            <a:normAutofit/>
+            <a:normAutofit lnSpcReduction="10000"/>
           </a:bodyPr>
           <a:lstStyle/>
           <a:p>
@@ -9450,6 +9471,18 @@
               </a:rPr>
               <a:t>}</a:t>
             </a:r>
+          </a:p>
+          <a:p>
+            <a:pPr marL="0" indent="0">
+              <a:lnSpc>
+                <a:spcPct val="60000"/>
+              </a:lnSpc>
+              <a:buNone/>
+            </a:pPr>
+            <a:endParaRPr lang="en-US" sz="1800" dirty="0" smtClean="0">
+              <a:latin typeface="Courier New"/>
+              <a:cs typeface="Courier New"/>
+            </a:endParaRPr>
           </a:p>
           <a:p>
             <a:pPr marL="0" indent="0">
@@ -9547,6 +9580,13 @@
   <p:clrMapOvr>
     <a:masterClrMapping/>
   </p:clrMapOvr>
+  <p:timing>
+    <p:tnLst>
+      <p:par>
+        <p:cTn xmlns:p14="http://schemas.microsoft.com/office/powerpoint/2010/main" id="1" dur="indefinite" restart="never" nodeType="tmRoot"/>
+      </p:par>
+    </p:tnLst>
+  </p:timing>
 </p:sld>
 </file>
 
@@ -9610,6 +9650,9 @@
           <a:lstStyle/>
           <a:p>
             <a:pPr marL="0" indent="0">
+              <a:lnSpc>
+                <a:spcPct val="60000"/>
+              </a:lnSpc>
               <a:buNone/>
             </a:pPr>
             <a:r>
@@ -9622,6 +9665,9 @@
           </a:p>
           <a:p>
             <a:pPr marL="0" indent="0">
+              <a:lnSpc>
+                <a:spcPct val="60000"/>
+              </a:lnSpc>
               <a:buNone/>
             </a:pPr>
             <a:r>
@@ -9655,6 +9701,9 @@
           </a:p>
           <a:p>
             <a:pPr marL="0" indent="0">
+              <a:lnSpc>
+                <a:spcPct val="60000"/>
+              </a:lnSpc>
               <a:buNone/>
             </a:pPr>
             <a:r>
@@ -9674,6 +9723,9 @@
           </a:p>
           <a:p>
             <a:pPr marL="0" indent="0">
+              <a:lnSpc>
+                <a:spcPct val="60000"/>
+              </a:lnSpc>
               <a:buNone/>
             </a:pPr>
             <a:r>
@@ -9700,6 +9752,9 @@
           </a:p>
           <a:p>
             <a:pPr marL="0" indent="0">
+              <a:lnSpc>
+                <a:spcPct val="60000"/>
+              </a:lnSpc>
               <a:buNone/>
             </a:pPr>
             <a:r>
@@ -9719,6 +9774,9 @@
           </a:p>
           <a:p>
             <a:pPr marL="0" indent="0">
+              <a:lnSpc>
+                <a:spcPct val="60000"/>
+              </a:lnSpc>
               <a:buNone/>
             </a:pPr>
             <a:r>
@@ -9747,6 +9805,13 @@
   <p:clrMapOvr>
     <a:masterClrMapping/>
   </p:clrMapOvr>
+  <p:timing>
+    <p:tnLst>
+      <p:par>
+        <p:cTn xmlns:p14="http://schemas.microsoft.com/office/powerpoint/2010/main" id="1" dur="indefinite" restart="never" nodeType="tmRoot"/>
+      </p:par>
+    </p:tnLst>
+  </p:timing>
 </p:sld>
 </file>
 
@@ -9808,6 +9873,9 @@
           <a:lstStyle/>
           <a:p>
             <a:pPr marL="0" indent="0">
+              <a:lnSpc>
+                <a:spcPct val="60000"/>
+              </a:lnSpc>
               <a:buNone/>
             </a:pPr>
             <a:r>
@@ -9834,6 +9902,9 @@
           </a:p>
           <a:p>
             <a:pPr marL="0" indent="0">
+              <a:lnSpc>
+                <a:spcPct val="60000"/>
+              </a:lnSpc>
               <a:buNone/>
             </a:pPr>
             <a:r>
@@ -9853,6 +9924,9 @@
           </a:p>
           <a:p>
             <a:pPr marL="0" indent="0">
+              <a:lnSpc>
+                <a:spcPct val="60000"/>
+              </a:lnSpc>
               <a:buNone/>
             </a:pPr>
             <a:r>
@@ -9883,6 +9957,9 @@
           </a:p>
           <a:p>
             <a:pPr marL="0" indent="0">
+              <a:lnSpc>
+                <a:spcPct val="60000"/>
+              </a:lnSpc>
               <a:buNone/>
             </a:pPr>
             <a:r>
@@ -9918,6 +9995,13 @@
   <p:clrMapOvr>
     <a:masterClrMapping/>
   </p:clrMapOvr>
+  <p:timing>
+    <p:tnLst>
+      <p:par>
+        <p:cTn xmlns:p14="http://schemas.microsoft.com/office/powerpoint/2010/main" id="1" dur="indefinite" restart="never" nodeType="tmRoot"/>
+      </p:par>
+    </p:tnLst>
+  </p:timing>
 </p:sld>
 </file>
 
@@ -9974,11 +10058,14 @@
         <p:spPr/>
         <p:txBody>
           <a:bodyPr>
-            <a:normAutofit fontScale="92500" lnSpcReduction="20000"/>
+            <a:normAutofit/>
           </a:bodyPr>
           <a:lstStyle/>
           <a:p>
             <a:pPr marL="0" indent="0">
+              <a:lnSpc>
+                <a:spcPct val="60000"/>
+              </a:lnSpc>
               <a:buNone/>
             </a:pPr>
             <a:r>
@@ -10005,6 +10092,9 @@
           </a:p>
           <a:p>
             <a:pPr marL="0" indent="0">
+              <a:lnSpc>
+                <a:spcPct val="60000"/>
+              </a:lnSpc>
               <a:buNone/>
             </a:pPr>
             <a:r>
@@ -10038,6 +10128,9 @@
           </a:p>
           <a:p>
             <a:pPr marL="0" indent="0">
+              <a:lnSpc>
+                <a:spcPct val="60000"/>
+              </a:lnSpc>
               <a:buNone/>
             </a:pPr>
             <a:endParaRPr lang="en-US" sz="1800" dirty="0" smtClean="0">
@@ -10047,6 +10140,9 @@
           </a:p>
           <a:p>
             <a:pPr marL="0" indent="0">
+              <a:lnSpc>
+                <a:spcPct val="60000"/>
+              </a:lnSpc>
               <a:buNone/>
             </a:pPr>
             <a:r>
@@ -10059,6 +10155,9 @@
           </a:p>
           <a:p>
             <a:pPr marL="0" indent="0">
+              <a:lnSpc>
+                <a:spcPct val="60000"/>
+              </a:lnSpc>
               <a:buNone/>
             </a:pPr>
             <a:r>
@@ -10106,6 +10205,9 @@
           </a:p>
           <a:p>
             <a:pPr marL="0" indent="0">
+              <a:lnSpc>
+                <a:spcPct val="60000"/>
+              </a:lnSpc>
               <a:buNone/>
             </a:pPr>
             <a:r>
@@ -10139,6 +10241,9 @@
           </a:p>
           <a:p>
             <a:pPr marL="0" indent="0">
+              <a:lnSpc>
+                <a:spcPct val="60000"/>
+              </a:lnSpc>
               <a:buNone/>
             </a:pPr>
             <a:r>
@@ -10186,6 +10291,9 @@
           </a:p>
           <a:p>
             <a:pPr marL="0" indent="0">
+              <a:lnSpc>
+                <a:spcPct val="60000"/>
+              </a:lnSpc>
               <a:buNone/>
             </a:pPr>
             <a:r>
@@ -10216,6 +10324,9 @@
           </a:p>
           <a:p>
             <a:pPr marL="0" indent="0">
+              <a:lnSpc>
+                <a:spcPct val="60000"/>
+              </a:lnSpc>
               <a:buNone/>
             </a:pPr>
             <a:r>
@@ -10270,6 +10381,13 @@
   <p:clrMapOvr>
     <a:masterClrMapping/>
   </p:clrMapOvr>
+  <p:timing>
+    <p:tnLst>
+      <p:par>
+        <p:cTn xmlns:p14="http://schemas.microsoft.com/office/powerpoint/2010/main" id="1" dur="indefinite" restart="never" nodeType="tmRoot"/>
+      </p:par>
+    </p:tnLst>
+  </p:timing>
 </p:sld>
 </file>
 
@@ -10331,6 +10449,9 @@
           <a:lstStyle/>
           <a:p>
             <a:pPr marL="0" indent="0">
+              <a:lnSpc>
+                <a:spcPct val="60000"/>
+              </a:lnSpc>
               <a:buNone/>
             </a:pPr>
             <a:r>
@@ -10371,6 +10492,9 @@
           </a:p>
           <a:p>
             <a:pPr marL="0" indent="0">
+              <a:lnSpc>
+                <a:spcPct val="60000"/>
+              </a:lnSpc>
               <a:buNone/>
             </a:pPr>
             <a:r>
@@ -10404,6 +10528,9 @@
           </a:p>
           <a:p>
             <a:pPr marL="0" indent="0">
+              <a:lnSpc>
+                <a:spcPct val="60000"/>
+              </a:lnSpc>
               <a:buNone/>
             </a:pPr>
             <a:endParaRPr lang="en-US" sz="1800" dirty="0" smtClean="0">
@@ -10413,6 +10540,9 @@
           </a:p>
           <a:p>
             <a:pPr marL="0" indent="0">
+              <a:lnSpc>
+                <a:spcPct val="60000"/>
+              </a:lnSpc>
               <a:buNone/>
             </a:pPr>
             <a:r>
@@ -10425,6 +10555,9 @@
           </a:p>
           <a:p>
             <a:pPr marL="0" indent="0">
+              <a:lnSpc>
+                <a:spcPct val="60000"/>
+              </a:lnSpc>
               <a:buNone/>
             </a:pPr>
             <a:r>
@@ -10458,6 +10591,9 @@
           </a:p>
           <a:p>
             <a:pPr marL="0" indent="0">
+              <a:lnSpc>
+                <a:spcPct val="60000"/>
+              </a:lnSpc>
               <a:buNone/>
             </a:pPr>
             <a:r>
@@ -10498,6 +10634,9 @@
           </a:p>
           <a:p>
             <a:pPr marL="0" indent="0">
+              <a:lnSpc>
+                <a:spcPct val="60000"/>
+              </a:lnSpc>
               <a:buNone/>
             </a:pPr>
             <a:r>
@@ -10545,6 +10684,9 @@
           </a:p>
           <a:p>
             <a:pPr marL="0" indent="0">
+              <a:lnSpc>
+                <a:spcPct val="60000"/>
+              </a:lnSpc>
               <a:buNone/>
             </a:pPr>
             <a:r>
@@ -10567,6 +10709,13 @@
   <p:clrMapOvr>
     <a:masterClrMapping/>
   </p:clrMapOvr>
+  <p:timing>
+    <p:tnLst>
+      <p:par>
+        <p:cTn xmlns:p14="http://schemas.microsoft.com/office/powerpoint/2010/main" id="1" dur="indefinite" restart="never" nodeType="tmRoot"/>
+      </p:par>
+    </p:tnLst>
+  </p:timing>
 </p:sld>
 </file>
 
@@ -10628,6 +10777,9 @@
           <a:lstStyle/>
           <a:p>
             <a:pPr marL="0" indent="0">
+              <a:lnSpc>
+                <a:spcPct val="60000"/>
+              </a:lnSpc>
               <a:buNone/>
             </a:pPr>
             <a:r>
@@ -10635,7 +10787,36 @@
                 <a:latin typeface="Courier New"/>
                 <a:cs typeface="Courier New"/>
               </a:rPr>
-              <a:t>@Rule public final </a:t>
+              <a:t>@</a:t>
+            </a:r>
+            <a:r>
+              <a:rPr lang="en-US" sz="1800" dirty="0" smtClean="0">
+                <a:latin typeface="Courier New"/>
+                <a:cs typeface="Courier New"/>
+              </a:rPr>
+              <a:t>Rule</a:t>
+            </a:r>
+          </a:p>
+          <a:p>
+            <a:pPr marL="0" indent="0">
+              <a:lnSpc>
+                <a:spcPct val="60000"/>
+              </a:lnSpc>
+              <a:buNone/>
+            </a:pPr>
+            <a:r>
+              <a:rPr lang="en-US" sz="1800" dirty="0" smtClean="0">
+                <a:latin typeface="Courier New"/>
+                <a:cs typeface="Courier New"/>
+              </a:rPr>
+              <a:t>public </a:t>
+            </a:r>
+            <a:r>
+              <a:rPr lang="en-US" sz="1800" dirty="0" smtClean="0">
+                <a:latin typeface="Courier New"/>
+                <a:cs typeface="Courier New"/>
+              </a:rPr>
+              <a:t>final </a:t>
             </a:r>
             <a:r>
               <a:rPr lang="en-US" sz="1800" dirty="0" err="1" smtClean="0">
@@ -10675,6 +10856,9 @@
           </a:p>
           <a:p>
             <a:pPr marL="0" indent="0">
+              <a:lnSpc>
+                <a:spcPct val="60000"/>
+              </a:lnSpc>
               <a:buNone/>
             </a:pPr>
             <a:endParaRPr lang="en-US" sz="1800" dirty="0" smtClean="0">
@@ -10684,6 +10868,9 @@
           </a:p>
           <a:p>
             <a:pPr marL="0" indent="0">
+              <a:lnSpc>
+                <a:spcPct val="60000"/>
+              </a:lnSpc>
               <a:buNone/>
             </a:pPr>
             <a:r>
@@ -10696,6 +10883,9 @@
           </a:p>
           <a:p>
             <a:pPr marL="0" indent="0">
+              <a:lnSpc>
+                <a:spcPct val="60000"/>
+              </a:lnSpc>
               <a:buNone/>
             </a:pPr>
             <a:r>
@@ -10736,6 +10926,9 @@
           </a:p>
           <a:p>
             <a:pPr marL="0" indent="0">
+              <a:lnSpc>
+                <a:spcPct val="60000"/>
+              </a:lnSpc>
               <a:buNone/>
             </a:pPr>
             <a:r>
@@ -10780,6 +10973,9 @@
           </a:p>
           <a:p>
             <a:pPr marL="0" indent="0">
+              <a:lnSpc>
+                <a:spcPct val="60000"/>
+              </a:lnSpc>
               <a:buNone/>
             </a:pPr>
             <a:r>
@@ -10802,6 +10998,13 @@
   <p:clrMapOvr>
     <a:masterClrMapping/>
   </p:clrMapOvr>
+  <p:timing>
+    <p:tnLst>
+      <p:par>
+        <p:cTn xmlns:p14="http://schemas.microsoft.com/office/powerpoint/2010/main" id="1" dur="indefinite" restart="never" nodeType="tmRoot"/>
+      </p:par>
+    </p:tnLst>
+  </p:timing>
 </p:sld>
 </file>
 
@@ -10882,6 +11085,13 @@
   <p:clrMapOvr>
     <a:masterClrMapping/>
   </p:clrMapOvr>
+  <p:timing>
+    <p:tnLst>
+      <p:par>
+        <p:cTn xmlns:p14="http://schemas.microsoft.com/office/powerpoint/2010/main" id="1" dur="indefinite" restart="never" nodeType="tmRoot"/>
+      </p:par>
+    </p:tnLst>
+  </p:timing>
 </p:sld>
 </file>
 
@@ -11074,6 +11284,13 @@
   <p:clrMapOvr>
     <a:masterClrMapping/>
   </p:clrMapOvr>
+  <p:timing>
+    <p:tnLst>
+      <p:par>
+        <p:cTn xmlns:p14="http://schemas.microsoft.com/office/powerpoint/2010/main" id="1" dur="indefinite" restart="never" nodeType="tmRoot"/>
+      </p:par>
+    </p:tnLst>
+  </p:timing>
 </p:sld>
 </file>
 
@@ -11226,9 +11443,97 @@
               <a:rPr lang="en-US" dirty="0" smtClean="0">
                 <a:cs typeface="Courier New"/>
               </a:rPr>
-              <a:t>Some runners create Rules that each get to execute code before/after/around Statements.</a:t>
-            </a:r>
+              <a:t>Some runners create Rules that each get to execute code before/after/around </a:t>
+            </a:r>
+            <a:r>
+              <a:rPr lang="en-US" smtClean="0">
+                <a:cs typeface="Courier New"/>
+              </a:rPr>
+              <a:t>Statements.</a:t>
+            </a:r>
+          </a:p>
+          <a:p>
+            <a:pPr marL="0" indent="0">
+              <a:buNone/>
+            </a:pPr>
             <a:endParaRPr lang="en-US" dirty="0" smtClean="0">
+              <a:cs typeface="Courier New"/>
+            </a:endParaRPr>
+          </a:p>
+          <a:p>
+            <a:pPr marL="0" indent="0">
+              <a:lnSpc>
+                <a:spcPct val="60000"/>
+              </a:lnSpc>
+              <a:buNone/>
+            </a:pPr>
+            <a:r>
+              <a:rPr lang="en-US" sz="1800" dirty="0">
+                <a:latin typeface="Courier New"/>
+                <a:cs typeface="Courier New"/>
+              </a:rPr>
+              <a:t>p</a:t>
+            </a:r>
+            <a:r>
+              <a:rPr lang="en-US" sz="1800" dirty="0" smtClean="0">
+                <a:latin typeface="Courier New"/>
+                <a:cs typeface="Courier New"/>
+              </a:rPr>
+              <a:t>ublic interface </a:t>
+            </a:r>
+            <a:r>
+              <a:rPr lang="en-US" sz="1800" dirty="0" err="1" smtClean="0">
+                <a:latin typeface="Courier New"/>
+                <a:cs typeface="Courier New"/>
+              </a:rPr>
+              <a:t>TestRule</a:t>
+            </a:r>
+            <a:r>
+              <a:rPr lang="en-US" sz="1800" dirty="0" smtClean="0">
+                <a:latin typeface="Courier New"/>
+                <a:cs typeface="Courier New"/>
+              </a:rPr>
+              <a:t> {</a:t>
+            </a:r>
+          </a:p>
+          <a:p>
+            <a:pPr marL="0" indent="0">
+              <a:lnSpc>
+                <a:spcPct val="60000"/>
+              </a:lnSpc>
+              <a:buNone/>
+            </a:pPr>
+            <a:r>
+              <a:rPr lang="en-US" sz="1800" dirty="0">
+                <a:latin typeface="Courier New"/>
+                <a:cs typeface="Courier New"/>
+              </a:rPr>
+              <a:t> </a:t>
+            </a:r>
+            <a:r>
+              <a:rPr lang="en-US" sz="1800" dirty="0" smtClean="0">
+                <a:latin typeface="Courier New"/>
+                <a:cs typeface="Courier New"/>
+              </a:rPr>
+              <a:t>   Statement apply(Statement base, Description d);</a:t>
+            </a:r>
+          </a:p>
+          <a:p>
+            <a:pPr marL="0" indent="0">
+              <a:lnSpc>
+                <a:spcPct val="60000"/>
+              </a:lnSpc>
+              <a:buNone/>
+            </a:pPr>
+            <a:r>
+              <a:rPr lang="en-US" sz="1800" dirty="0">
+                <a:latin typeface="Courier New"/>
+                <a:cs typeface="Courier New"/>
+              </a:rPr>
+              <a:t>}</a:t>
+            </a:r>
+            <a:endParaRPr lang="en-US" sz="1800" dirty="0" smtClean="0">
+              <a:latin typeface="Courier New"/>
               <a:cs typeface="Courier New"/>
             </a:endParaRPr>
           </a:p>
@@ -12580,6 +12885,13 @@
   <p:clrMapOvr>
     <a:masterClrMapping/>
   </p:clrMapOvr>
+  <p:timing>
+    <p:tnLst>
+      <p:par>
+        <p:cTn xmlns:p14="http://schemas.microsoft.com/office/powerpoint/2010/main" id="1" dur="indefinite" restart="never" nodeType="tmRoot"/>
+      </p:par>
+    </p:tnLst>
+  </p:timing>
 </p:sld>
 </file>
 
@@ -13557,6 +13869,13 @@
   <p:clrMapOvr>
     <a:masterClrMapping/>
   </p:clrMapOvr>
+  <p:timing>
+    <p:tnLst>
+      <p:par>
+        <p:cTn xmlns:p14="http://schemas.microsoft.com/office/powerpoint/2010/main" id="1" dur="indefinite" restart="never" nodeType="tmRoot"/>
+      </p:par>
+    </p:tnLst>
+  </p:timing>
 </p:sld>
 </file>
 
@@ -13793,6 +14112,13 @@
   <p:clrMapOvr>
     <a:masterClrMapping/>
   </p:clrMapOvr>
+  <p:timing>
+    <p:tnLst>
+      <p:par>
+        <p:cTn xmlns:p14="http://schemas.microsoft.com/office/powerpoint/2010/main" id="1" dur="indefinite" restart="never" nodeType="tmRoot"/>
+      </p:par>
+    </p:tnLst>
+  </p:timing>
 </p:sld>
 </file>
 
@@ -13954,6 +14280,13 @@
   <p:clrMapOvr>
     <a:masterClrMapping/>
   </p:clrMapOvr>
+  <p:timing>
+    <p:tnLst>
+      <p:par>
+        <p:cTn xmlns:p14="http://schemas.microsoft.com/office/powerpoint/2010/main" id="1" dur="indefinite" restart="never" nodeType="tmRoot"/>
+      </p:par>
+    </p:tnLst>
+  </p:timing>
 </p:sld>
 </file>
 
@@ -14186,6 +14519,13 @@
   <p:clrMapOvr>
     <a:masterClrMapping/>
   </p:clrMapOvr>
+  <p:timing>
+    <p:tnLst>
+      <p:par>
+        <p:cTn xmlns:p14="http://schemas.microsoft.com/office/powerpoint/2010/main" id="1" dur="indefinite" restart="never" nodeType="tmRoot"/>
+      </p:par>
+    </p:tnLst>
+  </p:timing>
 </p:sld>
 </file>
 
@@ -14261,6 +14601,13 @@
   <p:clrMapOvr>
     <a:masterClrMapping/>
   </p:clrMapOvr>
+  <p:timing>
+    <p:tnLst>
+      <p:par>
+        <p:cTn xmlns:p14="http://schemas.microsoft.com/office/powerpoint/2010/main" id="1" dur="indefinite" restart="never" nodeType="tmRoot"/>
+      </p:par>
+    </p:tnLst>
+  </p:timing>
 </p:sld>
 </file>
 
@@ -14336,6 +14683,13 @@
   <p:clrMapOvr>
     <a:masterClrMapping/>
   </p:clrMapOvr>
+  <p:timing>
+    <p:tnLst>
+      <p:par>
+        <p:cTn xmlns:p14="http://schemas.microsoft.com/office/powerpoint/2010/main" id="1" dur="indefinite" restart="never" nodeType="tmRoot"/>
+      </p:par>
+    </p:tnLst>
+  </p:timing>
 </p:sld>
 </file>
 

</xml_diff>

<commit_message>
new lame matcher demos. organizing imports.
</commit_message>
<xml_diff>
--- a/bending-junit.pptx
+++ b/bending-junit.pptx
@@ -227,7 +227,7 @@
           <a:p>
             <a:fld id="{05AE286E-9F28-6741-8610-9BEE110680A5}" type="datetimeFigureOut">
               <a:rPr lang="en-US" smtClean="0"/>
-              <a:t>10/6/11</a:t>
+              <a:t>2/6/12</a:t>
             </a:fld>
             <a:endParaRPr lang="en-US" dirty="0"/>
           </a:p>
@@ -3629,7 +3629,7 @@
           <a:p>
             <a:fld id="{D140825E-4A15-4D39-8176-1F07E904CB30}" type="datetimeFigureOut">
               <a:rPr lang="en-US" smtClean="0"/>
-              <a:t>10/6/11</a:t>
+              <a:t>2/6/12</a:t>
             </a:fld>
             <a:endParaRPr lang="en-US" dirty="0"/>
           </a:p>
@@ -3720,7 +3720,7 @@
           <a:p>
             <a:fld id="{D140825E-4A15-4D39-8176-1F07E904CB30}" type="datetimeFigureOut">
               <a:rPr lang="en-US" smtClean="0"/>
-              <a:t>10/6/11</a:t>
+              <a:t>2/6/12</a:t>
             </a:fld>
             <a:endParaRPr lang="en-US" dirty="0"/>
           </a:p>
@@ -4023,7 +4023,7 @@
           <a:p>
             <a:fld id="{D140825E-4A15-4D39-8176-1F07E904CB30}" type="datetimeFigureOut">
               <a:rPr lang="en-US" smtClean="0"/>
-              <a:t>10/6/11</a:t>
+              <a:t>2/6/12</a:t>
             </a:fld>
             <a:endParaRPr lang="en-US" dirty="0"/>
           </a:p>
@@ -4244,7 +4244,7 @@
           <a:p>
             <a:fld id="{D140825E-4A15-4D39-8176-1F07E904CB30}" type="datetimeFigureOut">
               <a:rPr lang="en-US" smtClean="0"/>
-              <a:t>10/6/11</a:t>
+              <a:t>2/6/12</a:t>
             </a:fld>
             <a:endParaRPr lang="en-US" dirty="0"/>
           </a:p>
@@ -4632,7 +4632,7 @@
           <a:p>
             <a:fld id="{D140825E-4A15-4D39-8176-1F07E904CB30}" type="datetimeFigureOut">
               <a:rPr lang="en-US" smtClean="0"/>
-              <a:t>10/6/11</a:t>
+              <a:t>2/6/12</a:t>
             </a:fld>
             <a:endParaRPr lang="en-US" dirty="0"/>
           </a:p>
@@ -4940,7 +4940,7 @@
           <a:p>
             <a:fld id="{D140825E-4A15-4D39-8176-1F07E904CB30}" type="datetimeFigureOut">
               <a:rPr lang="en-US" smtClean="0"/>
-              <a:t>10/6/11</a:t>
+              <a:t>2/6/12</a:t>
             </a:fld>
             <a:endParaRPr lang="en-US" dirty="0"/>
           </a:p>
@@ -5138,7 +5138,7 @@
           <a:p>
             <a:fld id="{D140825E-4A15-4D39-8176-1F07E904CB30}" type="datetimeFigureOut">
               <a:rPr lang="en-US" smtClean="0"/>
-              <a:t>10/6/11</a:t>
+              <a:t>2/6/12</a:t>
             </a:fld>
             <a:endParaRPr lang="en-US" dirty="0"/>
           </a:p>
@@ -5341,7 +5341,7 @@
           <a:p>
             <a:fld id="{D140825E-4A15-4D39-8176-1F07E904CB30}" type="datetimeFigureOut">
               <a:rPr lang="en-US" smtClean="0"/>
-              <a:t>10/6/11</a:t>
+              <a:t>2/6/12</a:t>
             </a:fld>
             <a:endParaRPr lang="en-US" dirty="0"/>
           </a:p>
@@ -5534,7 +5534,7 @@
           <a:p>
             <a:fld id="{D140825E-4A15-4D39-8176-1F07E904CB30}" type="datetimeFigureOut">
               <a:rPr lang="en-US" smtClean="0"/>
-              <a:t>10/6/11</a:t>
+              <a:t>2/6/12</a:t>
             </a:fld>
             <a:endParaRPr lang="en-US" dirty="0"/>
           </a:p>
@@ -5806,7 +5806,7 @@
           <a:p>
             <a:fld id="{D140825E-4A15-4D39-8176-1F07E904CB30}" type="datetimeFigureOut">
               <a:rPr lang="en-US" smtClean="0"/>
-              <a:t>10/6/11</a:t>
+              <a:t>2/6/12</a:t>
             </a:fld>
             <a:endParaRPr lang="en-US" dirty="0"/>
           </a:p>
@@ -6117,7 +6117,7 @@
           <a:p>
             <a:fld id="{D140825E-4A15-4D39-8176-1F07E904CB30}" type="datetimeFigureOut">
               <a:rPr lang="en-US" smtClean="0"/>
-              <a:t>10/6/11</a:t>
+              <a:t>2/6/12</a:t>
             </a:fld>
             <a:endParaRPr lang="en-US" dirty="0"/>
           </a:p>
@@ -6583,7 +6583,7 @@
           <a:p>
             <a:fld id="{D140825E-4A15-4D39-8176-1F07E904CB30}" type="datetimeFigureOut">
               <a:rPr lang="en-US" smtClean="0"/>
-              <a:t>10/6/11</a:t>
+              <a:t>2/6/12</a:t>
             </a:fld>
             <a:endParaRPr lang="en-US" dirty="0"/>
           </a:p>
@@ -6947,7 +6947,7 @@
           <a:p>
             <a:fld id="{D140825E-4A15-4D39-8176-1F07E904CB30}" type="datetimeFigureOut">
               <a:rPr lang="en-US" smtClean="0"/>
-              <a:t>10/6/11</a:t>
+              <a:t>2/6/12</a:t>
             </a:fld>
             <a:endParaRPr lang="en-US" dirty="0"/>
           </a:p>
@@ -7258,7 +7258,7 @@
           <a:p>
             <a:fld id="{D140825E-4A15-4D39-8176-1F07E904CB30}" type="datetimeFigureOut">
               <a:rPr lang="en-US" smtClean="0"/>
-              <a:t>10/6/11</a:t>
+              <a:t>2/6/12</a:t>
             </a:fld>
             <a:endParaRPr lang="en-US" dirty="0"/>
           </a:p>
@@ -7569,7 +7569,7 @@
           <a:p>
             <a:fld id="{D140825E-4A15-4D39-8176-1F07E904CB30}" type="datetimeFigureOut">
               <a:rPr lang="en-US" smtClean="0"/>
-              <a:t>10/6/11</a:t>
+              <a:t>2/6/12</a:t>
             </a:fld>
             <a:endParaRPr lang="en-US" dirty="0"/>
           </a:p>
@@ -8054,7 +8054,7 @@
           <a:p>
             <a:fld id="{D140825E-4A15-4D39-8176-1F07E904CB30}" type="datetimeFigureOut">
               <a:rPr lang="en-US" smtClean="0"/>
-              <a:t>10/6/11</a:t>
+              <a:t>2/6/12</a:t>
             </a:fld>
             <a:endParaRPr lang="en-US" dirty="0"/>
           </a:p>
@@ -8317,7 +8317,7 @@
           <a:p>
             <a:fld id="{D140825E-4A15-4D39-8176-1F07E904CB30}" type="datetimeFigureOut">
               <a:rPr lang="en-US" smtClean="0"/>
-              <a:t>10/6/11</a:t>
+              <a:t>2/6/12</a:t>
             </a:fld>
             <a:endParaRPr lang="en-US" dirty="0"/>
           </a:p>
@@ -8734,19 +8734,16 @@
           <a:p>
             <a:r>
               <a:rPr lang="en-US" dirty="0" smtClean="0"/>
-              <a:t>Tulsa </a:t>
-            </a:r>
-            <a:r>
-              <a:rPr lang="en-US" dirty="0" err="1" smtClean="0"/>
-              <a:t>TechFest</a:t>
+              <a:t>Java MUG</a:t>
             </a:r>
             <a:endParaRPr lang="en-US" dirty="0" smtClean="0"/>
           </a:p>
           <a:p>
             <a:r>
               <a:rPr lang="en-US" dirty="0" smtClean="0"/>
-              <a:t>October 7, 2011</a:t>
-            </a:r>
+              <a:t>February 8, 2012</a:t>
+            </a:r>
+            <a:endParaRPr lang="en-US" dirty="0" smtClean="0"/>
           </a:p>
         </p:txBody>
       </p:sp>
@@ -10787,14 +10784,7 @@
                 <a:latin typeface="Courier New"/>
                 <a:cs typeface="Courier New"/>
               </a:rPr>
-              <a:t>@</a:t>
-            </a:r>
-            <a:r>
-              <a:rPr lang="en-US" sz="1800" dirty="0" smtClean="0">
-                <a:latin typeface="Courier New"/>
-                <a:cs typeface="Courier New"/>
-              </a:rPr>
-              <a:t>Rule</a:t>
+              <a:t>@Rule</a:t>
             </a:r>
           </a:p>
           <a:p>
@@ -10809,14 +10799,21 @@
                 <a:latin typeface="Courier New"/>
                 <a:cs typeface="Courier New"/>
               </a:rPr>
-              <a:t>public </a:t>
+              <a:t>public final </a:t>
+            </a:r>
+            <a:r>
+              <a:rPr lang="en-US" sz="1800" dirty="0" err="1" smtClean="0">
+                <a:latin typeface="Courier New"/>
+                <a:cs typeface="Courier New"/>
+              </a:rPr>
+              <a:t>TestName</a:t>
             </a:r>
             <a:r>
               <a:rPr lang="en-US" sz="1800" dirty="0" smtClean="0">
                 <a:latin typeface="Courier New"/>
                 <a:cs typeface="Courier New"/>
               </a:rPr>
-              <a:t>final </a:t>
+              <a:t> name = new </a:t>
             </a:r>
             <a:r>
               <a:rPr lang="en-US" sz="1800" dirty="0" err="1" smtClean="0">
@@ -10830,28 +10827,7 @@
                 <a:latin typeface="Courier New"/>
                 <a:cs typeface="Courier New"/>
               </a:rPr>
-              <a:t> name = new </a:t>
-            </a:r>
-            <a:r>
-              <a:rPr lang="en-US" sz="1800" dirty="0" err="1" smtClean="0">
-                <a:latin typeface="Courier New"/>
-                <a:cs typeface="Courier New"/>
-              </a:rPr>
-              <a:t>TestName</a:t>
-            </a:r>
-            <a:r>
-              <a:rPr lang="en-US" sz="1800" dirty="0" smtClean="0">
-                <a:latin typeface="Courier New"/>
-                <a:cs typeface="Courier New"/>
-              </a:rPr>
-              <a:t>(</a:t>
-            </a:r>
-            <a:r>
-              <a:rPr lang="en-US" sz="1800" dirty="0" smtClean="0">
-                <a:latin typeface="Courier New"/>
-                <a:cs typeface="Courier New"/>
-              </a:rPr>
-              <a:t>);</a:t>
+              <a:t>();</a:t>
             </a:r>
           </a:p>
           <a:p>
@@ -10914,14 +10890,7 @@
                 <a:latin typeface="Courier New"/>
                 <a:cs typeface="Courier New"/>
               </a:rPr>
-              <a:t>(</a:t>
-            </a:r>
-            <a:r>
-              <a:rPr lang="en-US" sz="1800" dirty="0" smtClean="0">
-                <a:latin typeface="Courier New"/>
-                <a:cs typeface="Courier New"/>
-              </a:rPr>
-              <a:t>) {</a:t>
+              <a:t>() {</a:t>
             </a:r>
           </a:p>
           <a:p>
@@ -10966,10 +10935,6 @@
               </a:rPr>
               <a:t>());</a:t>
             </a:r>
-            <a:endParaRPr lang="en-US" sz="1800" dirty="0" smtClean="0">
-              <a:latin typeface="Courier New"/>
-              <a:cs typeface="Courier New"/>
-            </a:endParaRPr>
           </a:p>
           <a:p>
             <a:pPr marL="0" indent="0">
@@ -11806,9 +11771,6 @@
               </a:rPr>
               <a:t> value set</a:t>
             </a:r>
-            <a:endParaRPr lang="en-US" dirty="0" smtClean="0">
-              <a:cs typeface="Courier New"/>
-            </a:endParaRPr>
           </a:p>
         </p:txBody>
       </p:sp>
@@ -12048,10 +12010,6 @@
               </a:rPr>
               <a:t>, …})</a:t>
             </a:r>
-            <a:endParaRPr lang="en-US" dirty="0" smtClean="0">
-              <a:latin typeface="Courier New"/>
-              <a:cs typeface="Courier New"/>
-            </a:endParaRPr>
           </a:p>
         </p:txBody>
       </p:sp>
@@ -12312,9 +12270,6 @@
               </a:rPr>
               <a:t>Subtyping of categories</a:t>
             </a:r>
-            <a:endParaRPr lang="en-US" dirty="0" smtClean="0">
-              <a:cs typeface="Courier New"/>
-            </a:endParaRPr>
           </a:p>
         </p:txBody>
       </p:sp>

</xml_diff>

<commit_message>
additional prime factors theory
</commit_message>
<xml_diff>
--- a/bending-junit.pptx
+++ b/bending-junit.pptx
@@ -227,7 +227,7 @@
           <a:p>
             <a:fld id="{05AE286E-9F28-6741-8610-9BEE110680A5}" type="datetimeFigureOut">
               <a:rPr lang="en-US" smtClean="0"/>
-              <a:t>2/6/12</a:t>
+              <a:t>2/8/12</a:t>
             </a:fld>
             <a:endParaRPr lang="en-US" dirty="0"/>
           </a:p>
@@ -625,13 +625,13 @@
           <a:p>
             <a:r>
               <a:rPr lang="en-US" dirty="0" smtClean="0"/>
-              <a:t>Often</a:t>
-            </a:r>
-            <a:r>
-              <a:rPr lang="en-US" baseline="0" dirty="0" smtClean="0"/>
-              <a:t> we've wanted a way to get at the currently running test's name, for logging purposes, debugging, whatever. Here you go.</a:t>
-            </a:r>
-            <a:endParaRPr lang="en-US" dirty="0"/>
+              <a:t>Don't write tests that hit the </a:t>
+            </a:r>
+            <a:r>
+              <a:rPr lang="en-US" smtClean="0"/>
+              <a:t>file system?</a:t>
+            </a:r>
+            <a:endParaRPr lang="en-US"/>
           </a:p>
         </p:txBody>
       </p:sp>
@@ -652,7 +652,7 @@
           <a:p>
             <a:fld id="{A2044996-AC82-E94F-8AB5-A0DF814C394B}" type="slidenum">
               <a:rPr lang="en-US" smtClean="0"/>
-              <a:t>17</a:t>
+              <a:t>16</a:t>
             </a:fld>
             <a:endParaRPr lang="en-US" dirty="0"/>
           </a:p>
@@ -717,7 +717,11 @@
           <a:p>
             <a:r>
               <a:rPr lang="en-US" dirty="0" smtClean="0"/>
-              <a:t>This rule is a subclass of the same thing </a:t>
+              <a:t>Often</a:t>
+            </a:r>
+            <a:r>
+              <a:rPr lang="en-US" baseline="0" dirty="0" smtClean="0"/>
+              <a:t> we've wanted a way to get at the currently running test's name, for logging purposes, debugging, whatever. Here you go.</a:t>
             </a:r>
             <a:endParaRPr lang="en-US" dirty="0"/>
           </a:p>
@@ -740,7 +744,7 @@
           <a:p>
             <a:fld id="{A2044996-AC82-E94F-8AB5-A0DF814C394B}" type="slidenum">
               <a:rPr lang="en-US" smtClean="0"/>
-              <a:t>18</a:t>
+              <a:t>17</a:t>
             </a:fld>
             <a:endParaRPr lang="en-US" dirty="0"/>
           </a:p>
@@ -805,66 +809,7 @@
           <a:p>
             <a:r>
               <a:rPr lang="en-US" dirty="0" smtClean="0"/>
-              <a:t>Time-sensitive</a:t>
-            </a:r>
-            <a:r>
-              <a:rPr lang="en-US" baseline="0" dirty="0" smtClean="0"/>
-              <a:t> code is usually hard to test. Why? </a:t>
-            </a:r>
-            <a:r>
-              <a:rPr lang="en-US" baseline="0" dirty="0" err="1" smtClean="0"/>
-              <a:t>System.currentTimeMillis</a:t>
-            </a:r>
-            <a:r>
-              <a:rPr lang="en-US" baseline="0" dirty="0" smtClean="0"/>
-              <a:t>(), new Date(), etc. Hard to mock these out.</a:t>
-            </a:r>
-          </a:p>
-          <a:p>
-            <a:endParaRPr lang="en-US" baseline="0" dirty="0" smtClean="0"/>
-          </a:p>
-          <a:p>
-            <a:r>
-              <a:rPr lang="en-US" baseline="0" dirty="0" smtClean="0"/>
-              <a:t>Introduce a Clock interface and inject instances where needed? Could be pervasive.</a:t>
-            </a:r>
-          </a:p>
-          <a:p>
-            <a:endParaRPr lang="en-US" baseline="0" dirty="0" smtClean="0"/>
-          </a:p>
-          <a:p>
-            <a:r>
-              <a:rPr lang="en-US" baseline="0" dirty="0" err="1" smtClean="0"/>
-              <a:t>Joda</a:t>
-            </a:r>
-            <a:r>
-              <a:rPr lang="en-US" baseline="0" dirty="0" smtClean="0"/>
-              <a:t> Time offers </a:t>
-            </a:r>
-            <a:r>
-              <a:rPr lang="en-US" baseline="0" dirty="0" err="1" smtClean="0"/>
-              <a:t>DateUtils</a:t>
-            </a:r>
-            <a:r>
-              <a:rPr lang="en-US" baseline="0" dirty="0" smtClean="0"/>
-              <a:t> methods so that when you ask for timestamps from </a:t>
-            </a:r>
-            <a:r>
-              <a:rPr lang="en-US" baseline="0" dirty="0" err="1" smtClean="0"/>
-              <a:t>Joda</a:t>
-            </a:r>
-            <a:r>
-              <a:rPr lang="en-US" baseline="0" dirty="0" smtClean="0"/>
-              <a:t>, it can give you a fixed point in time.</a:t>
-            </a:r>
-          </a:p>
-          <a:p>
-            <a:endParaRPr lang="en-US" baseline="0" dirty="0" smtClean="0"/>
-          </a:p>
-          <a:p>
-            <a:r>
-              <a:rPr lang="en-US" baseline="0" dirty="0" smtClean="0"/>
-              <a:t>How about a rule to support "freezing" time during a test, and resetting the clock to real time afterward?</a:t>
+              <a:t>This rule is a subclass of the same thing </a:t>
             </a:r>
             <a:endParaRPr lang="en-US" dirty="0"/>
           </a:p>
@@ -887,7 +832,7 @@
           <a:p>
             <a:fld id="{A2044996-AC82-E94F-8AB5-A0DF814C394B}" type="slidenum">
               <a:rPr lang="en-US" smtClean="0"/>
-              <a:t>19</a:t>
+              <a:t>18</a:t>
             </a:fld>
             <a:endParaRPr lang="en-US" dirty="0"/>
           </a:p>
@@ -952,11 +897,19 @@
           <a:p>
             <a:r>
               <a:rPr lang="en-US" dirty="0" smtClean="0"/>
-              <a:t>Code that</a:t>
+              <a:t>Time-sensitive</a:t>
             </a:r>
             <a:r>
               <a:rPr lang="en-US" baseline="0" dirty="0" smtClean="0"/>
-              <a:t> uses system properties is similarly hard. Why? Static dependency, hard to mock. Hard to remember to "clean up" after yourself.</a:t>
+              <a:t> code is usually hard to test. Why? </a:t>
+            </a:r>
+            <a:r>
+              <a:rPr lang="en-US" baseline="0" dirty="0" err="1" smtClean="0"/>
+              <a:t>System.currentTimeMillis</a:t>
+            </a:r>
+            <a:r>
+              <a:rPr lang="en-US" baseline="0" dirty="0" smtClean="0"/>
+              <a:t>(), new Date(), etc. Hard to mock these out.</a:t>
             </a:r>
           </a:p>
           <a:p>
@@ -965,7 +918,7 @@
           <a:p>
             <a:r>
               <a:rPr lang="en-US" baseline="0" dirty="0" smtClean="0"/>
-              <a:t>How about a rule to capture current state of sys props before a test, thereby allowing specific tests to tweak the properties however they want, and know that the sys props will be reset to the state they were in before the test runs?</a:t>
+              <a:t>Introduce a Clock interface and inject instances where needed? Could be pervasive.</a:t>
             </a:r>
           </a:p>
           <a:p>
@@ -973,16 +926,37 @@
           </a:p>
           <a:p>
             <a:r>
+              <a:rPr lang="en-US" baseline="0" dirty="0" err="1" smtClean="0"/>
+              <a:t>Joda</a:t>
+            </a:r>
+            <a:r>
               <a:rPr lang="en-US" baseline="0" dirty="0" smtClean="0"/>
-              <a:t>Alistair Israel has a library of custom rules that might be useful. Find it on </a:t>
+              <a:t> Time offers </a:t>
             </a:r>
             <a:r>
               <a:rPr lang="en-US" baseline="0" dirty="0" err="1" smtClean="0"/>
-              <a:t>GitHub</a:t>
+              <a:t>DateUtils</a:t>
             </a:r>
             <a:r>
               <a:rPr lang="en-US" baseline="0" dirty="0" smtClean="0"/>
-              <a:t>.</a:t>
+              <a:t> methods so that when you ask for timestamps from </a:t>
+            </a:r>
+            <a:r>
+              <a:rPr lang="en-US" baseline="0" dirty="0" err="1" smtClean="0"/>
+              <a:t>Joda</a:t>
+            </a:r>
+            <a:r>
+              <a:rPr lang="en-US" baseline="0" dirty="0" smtClean="0"/>
+              <a:t>, it can give you a fixed point in time.</a:t>
+            </a:r>
+          </a:p>
+          <a:p>
+            <a:endParaRPr lang="en-US" baseline="0" dirty="0" smtClean="0"/>
+          </a:p>
+          <a:p>
+            <a:r>
+              <a:rPr lang="en-US" baseline="0" dirty="0" smtClean="0"/>
+              <a:t>How about a rule to support "freezing" time during a test, and resetting the clock to real time afterward?</a:t>
             </a:r>
             <a:endParaRPr lang="en-US" dirty="0"/>
           </a:p>
@@ -1005,7 +979,7 @@
           <a:p>
             <a:fld id="{A2044996-AC82-E94F-8AB5-A0DF814C394B}" type="slidenum">
               <a:rPr lang="en-US" smtClean="0"/>
-              <a:t>20</a:t>
+              <a:t>19</a:t>
             </a:fld>
             <a:endParaRPr lang="en-US" dirty="0"/>
           </a:p>
@@ -1068,6 +1042,40 @@
           <a:bodyPr/>
           <a:lstStyle/>
           <a:p>
+            <a:r>
+              <a:rPr lang="en-US" dirty="0" smtClean="0"/>
+              <a:t>Code that</a:t>
+            </a:r>
+            <a:r>
+              <a:rPr lang="en-US" baseline="0" dirty="0" smtClean="0"/>
+              <a:t> uses system properties is similarly hard. Why? Static dependency, hard to mock. Hard to remember to "clean up" after yourself.</a:t>
+            </a:r>
+          </a:p>
+          <a:p>
+            <a:endParaRPr lang="en-US" baseline="0" dirty="0" smtClean="0"/>
+          </a:p>
+          <a:p>
+            <a:r>
+              <a:rPr lang="en-US" baseline="0" dirty="0" smtClean="0"/>
+              <a:t>How about a rule to capture current state of sys props before a test, thereby allowing specific tests to tweak the properties however they want, and know that the sys props will be reset to the state they were in before the test runs?</a:t>
+            </a:r>
+          </a:p>
+          <a:p>
+            <a:endParaRPr lang="en-US" baseline="0" dirty="0" smtClean="0"/>
+          </a:p>
+          <a:p>
+            <a:r>
+              <a:rPr lang="en-US" baseline="0" dirty="0" smtClean="0"/>
+              <a:t>Alistair Israel has a library of custom rules that might be useful. Find it on </a:t>
+            </a:r>
+            <a:r>
+              <a:rPr lang="en-US" baseline="0" dirty="0" err="1" smtClean="0"/>
+              <a:t>GitHub</a:t>
+            </a:r>
+            <a:r>
+              <a:rPr lang="en-US" baseline="0" dirty="0" smtClean="0"/>
+              <a:t>.</a:t>
+            </a:r>
             <a:endParaRPr lang="en-US" dirty="0"/>
           </a:p>
         </p:txBody>
@@ -1089,7 +1097,7 @@
           <a:p>
             <a:fld id="{A2044996-AC82-E94F-8AB5-A0DF814C394B}" type="slidenum">
               <a:rPr lang="en-US" smtClean="0"/>
-              <a:t>21</a:t>
+              <a:t>20</a:t>
             </a:fld>
             <a:endParaRPr lang="en-US" dirty="0"/>
           </a:p>
@@ -1152,6 +1160,39 @@
           <a:bodyPr/>
           <a:lstStyle/>
           <a:p>
+            <a:r>
+              <a:rPr lang="en-US" dirty="0" smtClean="0"/>
+              <a:t>We'll see more about Statements</a:t>
+            </a:r>
+            <a:r>
+              <a:rPr lang="en-US" baseline="0" dirty="0" smtClean="0"/>
+              <a:t> when we peek under the hood of a Runner.</a:t>
+            </a:r>
+          </a:p>
+          <a:p>
+            <a:endParaRPr lang="en-US" baseline="0" dirty="0" smtClean="0"/>
+          </a:p>
+          <a:p>
+            <a:r>
+              <a:rPr lang="en-US" baseline="0" dirty="0" smtClean="0"/>
+              <a:t>You can start to see that </a:t>
+            </a:r>
+            <a:r>
+              <a:rPr lang="en-US" baseline="0" dirty="0" err="1" smtClean="0"/>
+              <a:t>Junit</a:t>
+            </a:r>
+            <a:r>
+              <a:rPr lang="en-US" baseline="0" dirty="0" smtClean="0"/>
+              <a:t> classes are quite a bit different from regular old Java classes. They are still like "templates" for instances, but runners scrape annotated pieces off the test class and construct objects that use the instances in interesting ways – </a:t>
+            </a:r>
+            <a:r>
+              <a:rPr lang="en-US" baseline="0" dirty="0" err="1" smtClean="0"/>
+              <a:t>metaprogramming</a:t>
+            </a:r>
+            <a:r>
+              <a:rPr lang="en-US" baseline="0" smtClean="0"/>
+              <a:t>.</a:t>
+            </a:r>
             <a:endParaRPr lang="en-US" dirty="0"/>
           </a:p>
         </p:txBody>
@@ -1173,7 +1214,7 @@
           <a:p>
             <a:fld id="{A2044996-AC82-E94F-8AB5-A0DF814C394B}" type="slidenum">
               <a:rPr lang="en-US" smtClean="0"/>
-              <a:t>22</a:t>
+              <a:t>21</a:t>
             </a:fld>
             <a:endParaRPr lang="en-US" dirty="0"/>
           </a:p>
@@ -1236,14 +1277,6 @@
           <a:bodyPr/>
           <a:lstStyle/>
           <a:p>
-            <a:r>
-              <a:rPr lang="en-US" dirty="0" smtClean="0"/>
-              <a:t>When you find yourself writing lots of tests</a:t>
-            </a:r>
-            <a:r>
-              <a:rPr lang="en-US" baseline="0" dirty="0" smtClean="0"/>
-              <a:t> that differ only in inputs and outputs, consider a parameterized test.</a:t>
-            </a:r>
             <a:endParaRPr lang="en-US" dirty="0"/>
           </a:p>
         </p:txBody>
@@ -1265,7 +1298,7 @@
           <a:p>
             <a:fld id="{A2044996-AC82-E94F-8AB5-A0DF814C394B}" type="slidenum">
               <a:rPr lang="en-US" smtClean="0"/>
-              <a:t>23</a:t>
+              <a:t>22</a:t>
             </a:fld>
             <a:endParaRPr lang="en-US" dirty="0"/>
           </a:p>
@@ -1330,7 +1363,11 @@
           <a:p>
             <a:r>
               <a:rPr lang="en-US" dirty="0" smtClean="0"/>
-              <a:t>This is a popular code kata.</a:t>
+              <a:t>When you find yourself writing lots of tests</a:t>
+            </a:r>
+            <a:r>
+              <a:rPr lang="en-US" baseline="0" dirty="0" smtClean="0"/>
+              <a:t> that differ only in inputs and outputs, consider a parameterized test.</a:t>
             </a:r>
             <a:endParaRPr lang="en-US" dirty="0"/>
           </a:p>
@@ -1353,7 +1390,7 @@
           <a:p>
             <a:fld id="{A2044996-AC82-E94F-8AB5-A0DF814C394B}" type="slidenum">
               <a:rPr lang="en-US" smtClean="0"/>
-              <a:t>24</a:t>
+              <a:t>23</a:t>
             </a:fld>
             <a:endParaRPr lang="en-US" dirty="0"/>
           </a:p>
@@ -1418,43 +1455,8 @@
           <a:p>
             <a:r>
               <a:rPr lang="en-US" dirty="0" smtClean="0"/>
-              <a:t>Hearkens back to the old </a:t>
-            </a:r>
-            <a:r>
-              <a:rPr lang="en-US" dirty="0" err="1" smtClean="0"/>
-              <a:t>Junit</a:t>
-            </a:r>
-            <a:r>
-              <a:rPr lang="en-US" dirty="0" smtClean="0"/>
-              <a:t> 3 style </a:t>
-            </a:r>
-            <a:r>
-              <a:rPr lang="en-US" dirty="0" err="1" smtClean="0"/>
-              <a:t>AllTests</a:t>
-            </a:r>
-            <a:r>
-              <a:rPr lang="en-US" baseline="0" dirty="0" smtClean="0"/>
-              <a:t> with a public static Test suite() method that programmatically built up a </a:t>
-            </a:r>
-            <a:r>
-              <a:rPr lang="en-US" baseline="0" dirty="0" err="1" smtClean="0"/>
-              <a:t>TestSuite</a:t>
-            </a:r>
-            <a:r>
-              <a:rPr lang="en-US" baseline="0" dirty="0" smtClean="0"/>
-              <a:t>.</a:t>
-            </a:r>
-          </a:p>
-          <a:p>
-            <a:endParaRPr lang="en-US" baseline="0" dirty="0" smtClean="0"/>
-          </a:p>
-          <a:p>
-            <a:r>
-              <a:rPr lang="en-US" baseline="0" dirty="0" smtClean="0"/>
-              <a:t>Example</a:t>
-            </a:r>
-          </a:p>
-          <a:p>
+              <a:t>This is a popular code kata.</a:t>
+            </a:r>
             <a:endParaRPr lang="en-US" dirty="0"/>
           </a:p>
         </p:txBody>
@@ -1476,7 +1478,7 @@
           <a:p>
             <a:fld id="{A2044996-AC82-E94F-8AB5-A0DF814C394B}" type="slidenum">
               <a:rPr lang="en-US" smtClean="0"/>
-              <a:t>25</a:t>
+              <a:t>24</a:t>
             </a:fld>
             <a:endParaRPr lang="en-US" dirty="0"/>
           </a:p>
@@ -1541,9 +1543,41 @@
           <a:p>
             <a:r>
               <a:rPr lang="en-US" dirty="0" smtClean="0"/>
+              <a:t>Hearkens back to the old </a:t>
+            </a:r>
+            <a:r>
+              <a:rPr lang="en-US" dirty="0" err="1" smtClean="0"/>
+              <a:t>Junit</a:t>
+            </a:r>
+            <a:r>
+              <a:rPr lang="en-US" dirty="0" smtClean="0"/>
+              <a:t> 3 style </a:t>
+            </a:r>
+            <a:r>
+              <a:rPr lang="en-US" dirty="0" err="1" smtClean="0"/>
+              <a:t>AllTests</a:t>
+            </a:r>
+            <a:r>
+              <a:rPr lang="en-US" baseline="0" dirty="0" smtClean="0"/>
+              <a:t> with a public static Test suite() method that programmatically built up a </a:t>
+            </a:r>
+            <a:r>
+              <a:rPr lang="en-US" baseline="0" dirty="0" err="1" smtClean="0"/>
+              <a:t>TestSuite</a:t>
+            </a:r>
+            <a:r>
+              <a:rPr lang="en-US" baseline="0" dirty="0" smtClean="0"/>
+              <a:t>.</a:t>
+            </a:r>
+          </a:p>
+          <a:p>
+            <a:endParaRPr lang="en-US" baseline="0" dirty="0" smtClean="0"/>
+          </a:p>
+          <a:p>
+            <a:r>
+              <a:rPr lang="en-US" baseline="0" dirty="0" smtClean="0"/>
               <a:t>Example</a:t>
             </a:r>
-            <a:endParaRPr lang="en-US" baseline="0" dirty="0" smtClean="0"/>
           </a:p>
           <a:p>
             <a:endParaRPr lang="en-US" dirty="0"/>
@@ -1567,7 +1601,7 @@
           <a:p>
             <a:fld id="{A2044996-AC82-E94F-8AB5-A0DF814C394B}" type="slidenum">
               <a:rPr lang="en-US" smtClean="0"/>
-              <a:t>26</a:t>
+              <a:t>25</a:t>
             </a:fld>
             <a:endParaRPr lang="en-US" dirty="0"/>
           </a:p>
@@ -1789,7 +1823,7 @@
           <a:p>
             <a:fld id="{A2044996-AC82-E94F-8AB5-A0DF814C394B}" type="slidenum">
               <a:rPr lang="en-US" smtClean="0"/>
-              <a:t>27</a:t>
+              <a:t>26</a:t>
             </a:fld>
             <a:endParaRPr lang="en-US" dirty="0"/>
           </a:p>
@@ -1852,6 +1886,13 @@
           <a:bodyPr/>
           <a:lstStyle/>
           <a:p>
+            <a:r>
+              <a:rPr lang="en-US" dirty="0" smtClean="0"/>
+              <a:t>Example</a:t>
+            </a:r>
+            <a:endParaRPr lang="en-US" baseline="0" dirty="0" smtClean="0"/>
+          </a:p>
+          <a:p>
             <a:endParaRPr lang="en-US" dirty="0"/>
           </a:p>
         </p:txBody>
@@ -1873,7 +1914,7 @@
           <a:p>
             <a:fld id="{A2044996-AC82-E94F-8AB5-A0DF814C394B}" type="slidenum">
               <a:rPr lang="en-US" smtClean="0"/>
-              <a:t>28</a:t>
+              <a:t>27</a:t>
             </a:fld>
             <a:endParaRPr lang="en-US" dirty="0"/>
           </a:p>
@@ -1957,7 +1998,7 @@
           <a:p>
             <a:fld id="{A2044996-AC82-E94F-8AB5-A0DF814C394B}" type="slidenum">
               <a:rPr lang="en-US" smtClean="0"/>
-              <a:t>29</a:t>
+              <a:t>28</a:t>
             </a:fld>
             <a:endParaRPr lang="en-US" dirty="0"/>
           </a:p>
@@ -2041,7 +2082,7 @@
           <a:p>
             <a:fld id="{A2044996-AC82-E94F-8AB5-A0DF814C394B}" type="slidenum">
               <a:rPr lang="en-US" smtClean="0"/>
-              <a:t>30</a:t>
+              <a:t>29</a:t>
             </a:fld>
             <a:endParaRPr lang="en-US" dirty="0"/>
           </a:p>
@@ -2104,10 +2145,6 @@
           <a:bodyPr/>
           <a:lstStyle/>
           <a:p>
-            <a:r>
-              <a:rPr lang="en-US" dirty="0" smtClean="0"/>
-              <a:t>Dive out to build theories for prime factors.</a:t>
-            </a:r>
             <a:endParaRPr lang="en-US" dirty="0"/>
           </a:p>
         </p:txBody>
@@ -2129,7 +2166,7 @@
           <a:p>
             <a:fld id="{A2044996-AC82-E94F-8AB5-A0DF814C394B}" type="slidenum">
               <a:rPr lang="en-US" smtClean="0"/>
-              <a:t>31</a:t>
+              <a:t>30</a:t>
             </a:fld>
             <a:endParaRPr lang="en-US" dirty="0"/>
           </a:p>
@@ -2192,6 +2229,10 @@
           <a:bodyPr/>
           <a:lstStyle/>
           <a:p>
+            <a:r>
+              <a:rPr lang="en-US" dirty="0" smtClean="0"/>
+              <a:t>Dive out to build theories for prime factors.</a:t>
+            </a:r>
             <a:endParaRPr lang="en-US" dirty="0"/>
           </a:p>
         </p:txBody>
@@ -2213,7 +2254,7 @@
           <a:p>
             <a:fld id="{A2044996-AC82-E94F-8AB5-A0DF814C394B}" type="slidenum">
               <a:rPr lang="en-US" smtClean="0"/>
-              <a:t>32</a:t>
+              <a:t>31</a:t>
             </a:fld>
             <a:endParaRPr lang="en-US" dirty="0"/>
           </a:p>
@@ -2297,7 +2338,7 @@
           <a:p>
             <a:fld id="{A2044996-AC82-E94F-8AB5-A0DF814C394B}" type="slidenum">
               <a:rPr lang="en-US" smtClean="0"/>
-              <a:t>33</a:t>
+              <a:t>32</a:t>
             </a:fld>
             <a:endParaRPr lang="en-US" dirty="0"/>
           </a:p>
@@ -2381,7 +2422,7 @@
           <a:p>
             <a:fld id="{A2044996-AC82-E94F-8AB5-A0DF814C394B}" type="slidenum">
               <a:rPr lang="en-US" smtClean="0"/>
-              <a:t>34</a:t>
+              <a:t>33</a:t>
             </a:fld>
             <a:endParaRPr lang="en-US" dirty="0"/>
           </a:p>
@@ -2465,7 +2506,7 @@
           <a:p>
             <a:fld id="{A2044996-AC82-E94F-8AB5-A0DF814C394B}" type="slidenum">
               <a:rPr lang="en-US" smtClean="0"/>
-              <a:t>35</a:t>
+              <a:t>34</a:t>
             </a:fld>
             <a:endParaRPr lang="en-US" dirty="0"/>
           </a:p>
@@ -2549,7 +2590,7 @@
           <a:p>
             <a:fld id="{A2044996-AC82-E94F-8AB5-A0DF814C394B}" type="slidenum">
               <a:rPr lang="en-US" smtClean="0"/>
-              <a:t>36</a:t>
+              <a:t>35</a:t>
             </a:fld>
             <a:endParaRPr lang="en-US" dirty="0"/>
           </a:p>
@@ -2660,6 +2701,90 @@
 </p:notes>
 </file>
 
+<file path=ppt/notesSlides/notesSlide30.xml><?xml version="1.0" encoding="utf-8"?>
+<p:notes xmlns:a="http://schemas.openxmlformats.org/drawingml/2006/main" xmlns:r="http://schemas.openxmlformats.org/officeDocument/2006/relationships" xmlns:p="http://schemas.openxmlformats.org/presentationml/2006/main">
+  <p:cSld>
+    <p:spTree>
+      <p:nvGrpSpPr>
+        <p:cNvPr id="1" name=""/>
+        <p:cNvGrpSpPr/>
+        <p:nvPr/>
+      </p:nvGrpSpPr>
+      <p:grpSpPr>
+        <a:xfrm>
+          <a:off x="0" y="0"/>
+          <a:ext cx="0" cy="0"/>
+          <a:chOff x="0" y="0"/>
+          <a:chExt cx="0" cy="0"/>
+        </a:xfrm>
+      </p:grpSpPr>
+      <p:sp>
+        <p:nvSpPr>
+          <p:cNvPr id="2" name="Slide Image Placeholder 1"/>
+          <p:cNvSpPr>
+            <a:spLocks noGrp="1" noRot="1" noChangeAspect="1"/>
+          </p:cNvSpPr>
+          <p:nvPr>
+            <p:ph type="sldImg"/>
+          </p:nvPr>
+        </p:nvSpPr>
+        <p:spPr/>
+      </p:sp>
+      <p:sp>
+        <p:nvSpPr>
+          <p:cNvPr id="3" name="Notes Placeholder 2"/>
+          <p:cNvSpPr>
+            <a:spLocks noGrp="1"/>
+          </p:cNvSpPr>
+          <p:nvPr>
+            <p:ph type="body" idx="1"/>
+          </p:nvPr>
+        </p:nvSpPr>
+        <p:spPr/>
+        <p:txBody>
+          <a:bodyPr/>
+          <a:lstStyle/>
+          <a:p>
+            <a:endParaRPr lang="en-US" dirty="0"/>
+          </a:p>
+        </p:txBody>
+      </p:sp>
+      <p:sp>
+        <p:nvSpPr>
+          <p:cNvPr id="4" name="Slide Number Placeholder 3"/>
+          <p:cNvSpPr>
+            <a:spLocks noGrp="1"/>
+          </p:cNvSpPr>
+          <p:nvPr>
+            <p:ph type="sldNum" sz="quarter" idx="10"/>
+          </p:nvPr>
+        </p:nvSpPr>
+        <p:spPr/>
+        <p:txBody>
+          <a:bodyPr/>
+          <a:lstStyle/>
+          <a:p>
+            <a:fld id="{A2044996-AC82-E94F-8AB5-A0DF814C394B}" type="slidenum">
+              <a:rPr lang="en-US" smtClean="0"/>
+              <a:t>36</a:t>
+            </a:fld>
+            <a:endParaRPr lang="en-US" dirty="0"/>
+          </a:p>
+        </p:txBody>
+      </p:sp>
+    </p:spTree>
+    <p:extLst>
+      <p:ext uri="{BB962C8B-B14F-4D97-AF65-F5344CB8AC3E}">
+        <p14:creationId xmlns:p14="http://schemas.microsoft.com/office/powerpoint/2010/main" val="990915440"/>
+      </p:ext>
+    </p:extLst>
+  </p:cSld>
+  <p:clrMapOvr>
+    <a:masterClrMapping/>
+  </p:clrMapOvr>
+</p:notes>
+</file>
+
 <file path=ppt/notesSlides/notesSlide4.xml><?xml version="1.0" encoding="utf-8"?>
 <p:notes xmlns:a="http://schemas.openxmlformats.org/drawingml/2006/main" xmlns:r="http://schemas.openxmlformats.org/officeDocument/2006/relationships" xmlns:p="http://schemas.openxmlformats.org/presentationml/2006/main">
   <p:cSld>
@@ -3135,23 +3260,44 @@
           <a:p>
             <a:r>
               <a:rPr lang="en-US" dirty="0" smtClean="0"/>
-              <a:t>Demonstrate with palin</a:t>
+              <a:t>It's</a:t>
             </a:r>
             <a:r>
               <a:rPr lang="en-US" baseline="0" dirty="0" smtClean="0"/>
-              <a:t>drome, same contents.</a:t>
-            </a:r>
-          </a:p>
-          <a:p>
-            <a:endParaRPr lang="en-US" baseline="0" dirty="0" smtClean="0"/>
-          </a:p>
-          <a:p>
+              <a:t> kind of a shame that </a:t>
+            </a:r>
+            <a:r>
+              <a:rPr lang="en-US" baseline="0" dirty="0" err="1" smtClean="0"/>
+              <a:t>Junit</a:t>
+            </a:r>
             <a:r>
               <a:rPr lang="en-US" baseline="0" dirty="0" smtClean="0"/>
-              <a:t>SAM types</a:t>
-            </a:r>
-          </a:p>
-          <a:p>
+              <a:t> bundles </a:t>
+            </a:r>
+            <a:r>
+              <a:rPr lang="en-US" baseline="0" dirty="0" err="1" smtClean="0"/>
+              <a:t>Hamcrest</a:t>
+            </a:r>
+            <a:r>
+              <a:rPr lang="en-US" baseline="0" dirty="0" smtClean="0"/>
+              <a:t>, provides </a:t>
+            </a:r>
+            <a:r>
+              <a:rPr lang="en-US" baseline="0" dirty="0" err="1" smtClean="0"/>
+              <a:t>assertThat</a:t>
+            </a:r>
+            <a:r>
+              <a:rPr lang="en-US" baseline="0" dirty="0" smtClean="0"/>
+              <a:t>() plus a bunch of matchers and uses them internally. If you want to leverage newer versions of </a:t>
+            </a:r>
+            <a:r>
+              <a:rPr lang="en-US" baseline="0" dirty="0" err="1" smtClean="0"/>
+              <a:t>Hamcrest</a:t>
+            </a:r>
+            <a:r>
+              <a:rPr lang="en-US" baseline="0" dirty="0" smtClean="0"/>
+              <a:t> in your tests, you may run into trouble.</a:t>
+            </a:r>
             <a:endParaRPr lang="en-US" dirty="0"/>
           </a:p>
         </p:txBody>
@@ -3173,7 +3319,7 @@
           <a:p>
             <a:fld id="{A2044996-AC82-E94F-8AB5-A0DF814C394B}" type="slidenum">
               <a:rPr lang="en-US" smtClean="0"/>
-              <a:t>10</a:t>
+              <a:t>9</a:t>
             </a:fld>
             <a:endParaRPr lang="en-US" dirty="0"/>
           </a:p>
@@ -3182,7 +3328,7 @@
     </p:spTree>
     <p:extLst>
       <p:ext uri="{BB962C8B-B14F-4D97-AF65-F5344CB8AC3E}">
-        <p14:creationId xmlns:p14="http://schemas.microsoft.com/office/powerpoint/2010/main" val="4238034629"/>
+        <p14:creationId xmlns:p14="http://schemas.microsoft.com/office/powerpoint/2010/main" val="3648421505"/>
       </p:ext>
     </p:extLst>
   </p:cSld>
@@ -3238,11 +3384,11 @@
           <a:p>
             <a:r>
               <a:rPr lang="en-US" dirty="0" smtClean="0"/>
-              <a:t>Expect() is Matcher-friendly</a:t>
+              <a:t>Demonstrate with palin</a:t>
             </a:r>
             <a:r>
               <a:rPr lang="en-US" baseline="0" dirty="0" smtClean="0"/>
-              <a:t> – we'll see that in the examples.</a:t>
+              <a:t>drome, same contents.</a:t>
             </a:r>
           </a:p>
           <a:p>
@@ -3251,17 +3397,10 @@
           <a:p>
             <a:r>
               <a:rPr lang="en-US" baseline="0" dirty="0" smtClean="0"/>
-              <a:t>Watch where you train the rule to expect stuff.</a:t>
-            </a:r>
-          </a:p>
-          <a:p>
-            <a:endParaRPr lang="en-US" baseline="0" dirty="0" smtClean="0"/>
-          </a:p>
-          <a:p>
-            <a:r>
-              <a:rPr lang="en-US" baseline="0" dirty="0" smtClean="0"/>
-              <a:t>Example</a:t>
-            </a:r>
+              <a:t>SAM types</a:t>
+            </a:r>
+          </a:p>
+          <a:p>
             <a:endParaRPr lang="en-US" dirty="0"/>
           </a:p>
         </p:txBody>
@@ -3283,7 +3422,7 @@
           <a:p>
             <a:fld id="{A2044996-AC82-E94F-8AB5-A0DF814C394B}" type="slidenum">
               <a:rPr lang="en-US" smtClean="0"/>
-              <a:t>15</a:t>
+              <a:t>10</a:t>
             </a:fld>
             <a:endParaRPr lang="en-US" dirty="0"/>
           </a:p>
@@ -3292,7 +3431,7 @@
     </p:spTree>
     <p:extLst>
       <p:ext uri="{BB962C8B-B14F-4D97-AF65-F5344CB8AC3E}">
-        <p14:creationId xmlns:p14="http://schemas.microsoft.com/office/powerpoint/2010/main" val="2845334411"/>
+        <p14:creationId xmlns:p14="http://schemas.microsoft.com/office/powerpoint/2010/main" val="4238034629"/>
       </p:ext>
     </p:extLst>
   </p:cSld>
@@ -3348,13 +3487,31 @@
           <a:p>
             <a:r>
               <a:rPr lang="en-US" dirty="0" smtClean="0"/>
-              <a:t>Don't write tests that hit the </a:t>
-            </a:r>
-            <a:r>
-              <a:rPr lang="en-US" smtClean="0"/>
-              <a:t>file system?</a:t>
-            </a:r>
-            <a:endParaRPr lang="en-US"/>
+              <a:t>Expect() is Matcher-friendly</a:t>
+            </a:r>
+            <a:r>
+              <a:rPr lang="en-US" baseline="0" dirty="0" smtClean="0"/>
+              <a:t> – we'll see that in the examples.</a:t>
+            </a:r>
+          </a:p>
+          <a:p>
+            <a:endParaRPr lang="en-US" baseline="0" dirty="0" smtClean="0"/>
+          </a:p>
+          <a:p>
+            <a:r>
+              <a:rPr lang="en-US" baseline="0" dirty="0" smtClean="0"/>
+              <a:t>Watch where you train the rule to expect stuff.</a:t>
+            </a:r>
+          </a:p>
+          <a:p>
+            <a:endParaRPr lang="en-US" baseline="0" dirty="0" smtClean="0"/>
+          </a:p>
+          <a:p>
+            <a:r>
+              <a:rPr lang="en-US" baseline="0" dirty="0" smtClean="0"/>
+              <a:t>Example</a:t>
+            </a:r>
+            <a:endParaRPr lang="en-US" dirty="0"/>
           </a:p>
         </p:txBody>
       </p:sp>
@@ -3375,7 +3532,7 @@
           <a:p>
             <a:fld id="{A2044996-AC82-E94F-8AB5-A0DF814C394B}" type="slidenum">
               <a:rPr lang="en-US" smtClean="0"/>
-              <a:t>16</a:t>
+              <a:t>15</a:t>
             </a:fld>
             <a:endParaRPr lang="en-US" dirty="0"/>
           </a:p>
@@ -3384,7 +3541,7 @@
     </p:spTree>
     <p:extLst>
       <p:ext uri="{BB962C8B-B14F-4D97-AF65-F5344CB8AC3E}">
-        <p14:creationId xmlns:p14="http://schemas.microsoft.com/office/powerpoint/2010/main" val="990915440"/>
+        <p14:creationId xmlns:p14="http://schemas.microsoft.com/office/powerpoint/2010/main" val="2845334411"/>
       </p:ext>
     </p:extLst>
   </p:cSld>
@@ -3629,7 +3786,7 @@
           <a:p>
             <a:fld id="{D140825E-4A15-4D39-8176-1F07E904CB30}" type="datetimeFigureOut">
               <a:rPr lang="en-US" smtClean="0"/>
-              <a:t>2/6/12</a:t>
+              <a:t>2/8/12</a:t>
             </a:fld>
             <a:endParaRPr lang="en-US" dirty="0"/>
           </a:p>
@@ -3720,7 +3877,7 @@
           <a:p>
             <a:fld id="{D140825E-4A15-4D39-8176-1F07E904CB30}" type="datetimeFigureOut">
               <a:rPr lang="en-US" smtClean="0"/>
-              <a:t>2/6/12</a:t>
+              <a:t>2/8/12</a:t>
             </a:fld>
             <a:endParaRPr lang="en-US" dirty="0"/>
           </a:p>
@@ -4023,7 +4180,7 @@
           <a:p>
             <a:fld id="{D140825E-4A15-4D39-8176-1F07E904CB30}" type="datetimeFigureOut">
               <a:rPr lang="en-US" smtClean="0"/>
-              <a:t>2/6/12</a:t>
+              <a:t>2/8/12</a:t>
             </a:fld>
             <a:endParaRPr lang="en-US" dirty="0"/>
           </a:p>
@@ -4244,7 +4401,7 @@
           <a:p>
             <a:fld id="{D140825E-4A15-4D39-8176-1F07E904CB30}" type="datetimeFigureOut">
               <a:rPr lang="en-US" smtClean="0"/>
-              <a:t>2/6/12</a:t>
+              <a:t>2/8/12</a:t>
             </a:fld>
             <a:endParaRPr lang="en-US" dirty="0"/>
           </a:p>
@@ -4632,7 +4789,7 @@
           <a:p>
             <a:fld id="{D140825E-4A15-4D39-8176-1F07E904CB30}" type="datetimeFigureOut">
               <a:rPr lang="en-US" smtClean="0"/>
-              <a:t>2/6/12</a:t>
+              <a:t>2/8/12</a:t>
             </a:fld>
             <a:endParaRPr lang="en-US" dirty="0"/>
           </a:p>
@@ -4940,7 +5097,7 @@
           <a:p>
             <a:fld id="{D140825E-4A15-4D39-8176-1F07E904CB30}" type="datetimeFigureOut">
               <a:rPr lang="en-US" smtClean="0"/>
-              <a:t>2/6/12</a:t>
+              <a:t>2/8/12</a:t>
             </a:fld>
             <a:endParaRPr lang="en-US" dirty="0"/>
           </a:p>
@@ -5138,7 +5295,7 @@
           <a:p>
             <a:fld id="{D140825E-4A15-4D39-8176-1F07E904CB30}" type="datetimeFigureOut">
               <a:rPr lang="en-US" smtClean="0"/>
-              <a:t>2/6/12</a:t>
+              <a:t>2/8/12</a:t>
             </a:fld>
             <a:endParaRPr lang="en-US" dirty="0"/>
           </a:p>
@@ -5341,7 +5498,7 @@
           <a:p>
             <a:fld id="{D140825E-4A15-4D39-8176-1F07E904CB30}" type="datetimeFigureOut">
               <a:rPr lang="en-US" smtClean="0"/>
-              <a:t>2/6/12</a:t>
+              <a:t>2/8/12</a:t>
             </a:fld>
             <a:endParaRPr lang="en-US" dirty="0"/>
           </a:p>
@@ -5534,7 +5691,7 @@
           <a:p>
             <a:fld id="{D140825E-4A15-4D39-8176-1F07E904CB30}" type="datetimeFigureOut">
               <a:rPr lang="en-US" smtClean="0"/>
-              <a:t>2/6/12</a:t>
+              <a:t>2/8/12</a:t>
             </a:fld>
             <a:endParaRPr lang="en-US" dirty="0"/>
           </a:p>
@@ -5806,7 +5963,7 @@
           <a:p>
             <a:fld id="{D140825E-4A15-4D39-8176-1F07E904CB30}" type="datetimeFigureOut">
               <a:rPr lang="en-US" smtClean="0"/>
-              <a:t>2/6/12</a:t>
+              <a:t>2/8/12</a:t>
             </a:fld>
             <a:endParaRPr lang="en-US" dirty="0"/>
           </a:p>
@@ -6117,7 +6274,7 @@
           <a:p>
             <a:fld id="{D140825E-4A15-4D39-8176-1F07E904CB30}" type="datetimeFigureOut">
               <a:rPr lang="en-US" smtClean="0"/>
-              <a:t>2/6/12</a:t>
+              <a:t>2/8/12</a:t>
             </a:fld>
             <a:endParaRPr lang="en-US" dirty="0"/>
           </a:p>
@@ -6583,7 +6740,7 @@
           <a:p>
             <a:fld id="{D140825E-4A15-4D39-8176-1F07E904CB30}" type="datetimeFigureOut">
               <a:rPr lang="en-US" smtClean="0"/>
-              <a:t>2/6/12</a:t>
+              <a:t>2/8/12</a:t>
             </a:fld>
             <a:endParaRPr lang="en-US" dirty="0"/>
           </a:p>
@@ -6947,7 +7104,7 @@
           <a:p>
             <a:fld id="{D140825E-4A15-4D39-8176-1F07E904CB30}" type="datetimeFigureOut">
               <a:rPr lang="en-US" smtClean="0"/>
-              <a:t>2/6/12</a:t>
+              <a:t>2/8/12</a:t>
             </a:fld>
             <a:endParaRPr lang="en-US" dirty="0"/>
           </a:p>
@@ -7258,7 +7415,7 @@
           <a:p>
             <a:fld id="{D140825E-4A15-4D39-8176-1F07E904CB30}" type="datetimeFigureOut">
               <a:rPr lang="en-US" smtClean="0"/>
-              <a:t>2/6/12</a:t>
+              <a:t>2/8/12</a:t>
             </a:fld>
             <a:endParaRPr lang="en-US" dirty="0"/>
           </a:p>
@@ -7569,7 +7726,7 @@
           <a:p>
             <a:fld id="{D140825E-4A15-4D39-8176-1F07E904CB30}" type="datetimeFigureOut">
               <a:rPr lang="en-US" smtClean="0"/>
-              <a:t>2/6/12</a:t>
+              <a:t>2/8/12</a:t>
             </a:fld>
             <a:endParaRPr lang="en-US" dirty="0"/>
           </a:p>
@@ -8054,7 +8211,7 @@
           <a:p>
             <a:fld id="{D140825E-4A15-4D39-8176-1F07E904CB30}" type="datetimeFigureOut">
               <a:rPr lang="en-US" smtClean="0"/>
-              <a:t>2/6/12</a:t>
+              <a:t>2/8/12</a:t>
             </a:fld>
             <a:endParaRPr lang="en-US" dirty="0"/>
           </a:p>
@@ -8317,7 +8474,7 @@
           <a:p>
             <a:fld id="{D140825E-4A15-4D39-8176-1F07E904CB30}" type="datetimeFigureOut">
               <a:rPr lang="en-US" smtClean="0"/>
-              <a:t>2/6/12</a:t>
+              <a:t>2/8/12</a:t>
             </a:fld>
             <a:endParaRPr lang="en-US" dirty="0"/>
           </a:p>
@@ -8736,14 +8893,12 @@
               <a:rPr lang="en-US" dirty="0" smtClean="0"/>
               <a:t>Java MUG</a:t>
             </a:r>
-            <a:endParaRPr lang="en-US" dirty="0" smtClean="0"/>
           </a:p>
           <a:p>
             <a:r>
               <a:rPr lang="en-US" dirty="0" smtClean="0"/>
               <a:t>February 8, 2012</a:t>
             </a:r>
-            <a:endParaRPr lang="en-US" dirty="0" smtClean="0"/>
           </a:p>
         </p:txBody>
       </p:sp>

</xml_diff>